<commit_message>
validate cho màn hình login
</commit_message>
<xml_diff>
--- a/lesson6.pptx
+++ b/lesson6.pptx
@@ -723,12 +723,422 @@
   <inkml:trace contextRef="#ctx0" brushRef="#br0" timeOffset="212325">20950 15688 11311,'-5'-1'-2159,"2"0"-180,21 0 2339,-1 19 0,5-13 0,-9 14 0</inkml:trace>
   <inkml:trace contextRef="#ctx0" brushRef="#br0" timeOffset="212557">20898 16182 9332,'0'13'1529,"0"1"-810,26 4-269,-20-6 90,41 11-540,-17-10 270,11 8 0,7 1-181,-31-3 1,15 14-90,-29-9 0,9 11-269,-35-6-271,-1 4-840,-8-8 1,-10 3 0,2-2-591,3 0 0,-1 0 1970,-4 2 0,-4 3 0,3-4 0,2-3 0,2-3 0,-2 2 0,1-1 0</inkml:trace>
   <inkml:trace contextRef="#ctx0" brushRef="#br0" timeOffset="214660">21818 15993 10501,'51'-1'-90,"-9"0"-270,4 1-1857,-7 0 1587,3 12-89,-1-10 89,-1 10 91,-3-12 539,7 6 0,-17 2 0,4 7 0</inkml:trace>
-  <inkml:trace contextRef="#ctx0" brushRef="#br0" timeOffset="214823">21870 16195 8522,'-18'3'720,"2"-2"-91,5 0-1078,24 0-271,17-1-1529,35 0 2249,-5 0 0,6 0 0,-15 0 0</inkml:trace>
-  <inkml:trace contextRef="#ctx0" brushRef="#br0" timeOffset="215090">22017 15901 9332,'0'-4'899,"25"0"-719,12 3-90,-2 0 0,2 1 0,24 0-90,-19-2 0,-2 4 0,7 16 45,-11-8 0,-3 1 45,2 22-90,1-1-360,-24-3-270,-5 7-89,-7 3-136,-10-4 1,0 0-675,5 21 1449,-18-17 1,-3 0-1,0 17 1,0-27 0,0-1-1</inkml:trace>
-  <inkml:trace contextRef="#ctx0" brushRef="#br0" timeOffset="216028">23748 15187 9691,'1'-8'-89,"0"-1"-1,-1 3-90,-25 3 0,-9 0 90,0 3 0,-2 0 90,-22 0-705,25 9 0,1 0 705,-16-5 0,0 27-90,6-28 0,-10 23 90,20-11 0,-6 9 0,27 2 0,2-8 0,9 4 1320,0-5-1320,25 14 0,3-4 0,-2 0 0,1 0 90,13 10-90,-17-2 0,-5 1 0,-2 11 0,-3 5 0,-3 3 90,-8 5-1614,-10-1 1,-1 0 1523,3 0-45,-16-11 0,-3 0-32,-2 7 32,4-12 0,1-1 135,-4 2-90,8 7 180,8-15 90,8-13 0,10 4-180,-3-17 2976,46-2-3156,-27-6 180,34-1-363,-16-1-177,6-14-450,6 11 900,-10-11 0,2 0 0,-10 11 0,0 2 0,13-6 0,0 0 0</inkml:trace>
-  <inkml:trace contextRef="#ctx0" brushRef="#br0" timeOffset="222773">25553 14881 11400,'34'0'0,"-5"0"0,6 0 0,-4 0 0,4 0-89,4 0 89,0 0-90,0 0 90,0 0 0,11 17 0,-15 2 0,6 1 0,-18 12 0,-5-16 0,-4 17 90,-7 5-90,-3-7 0,-2 26 89,-26-22-134,11-3 1,-1-1 44,-15 9-560,6-14 0,3 0 560,14 15 0,-36 1-180,38 2-352,-28 1 82,29 3 271,-11 0 89,13-12 0,2 1-90,-1 19 135,9 3 0,6 1 0,-2-30 0,1 0 90,13 27 0,2-2-135,13-5 135,-15-13 0,-1-1-135,3 2 360,12 13-180,-27-28 90,7 5-91,-20-19-178,-18 0 89,-14-7 89,-13-2-178,-3 0-271,-11 0-540,14 0 900,7-7 0,0 0 0,-1 4 0,-10-10 0</inkml:trace>
-  <inkml:trace contextRef="#ctx0" brushRef="#br0" timeOffset="223056">26782 15691 9781,'0'-6'0,"0"1"0,0 0 0,0 2-2788,0 0 2788,19 18 0,-14-13 0,14 14 0</inkml:trace>
-  <inkml:trace contextRef="#ctx0" brushRef="#br0" timeOffset="223223">27005 16088 9512,'0'17'899,"0"1"-539,0 0 180,0 3-451,0-7 1,0 8-90,-11-10 0,8 10-90,-23-4-899,12 6-450,-17 0-270,-1 4 1605,-10 5 1,-7 5 0,21-19 0,1 1 0</inkml:trace>
+  <inkml:trace contextRef="#ctx0" brushRef="#br0" timeOffset="-214673.73">21870 16195 8522,'-18'3'720,"2"-2"-91,5 0-1078,24 0-271,17-1-1529,35 0 2249,-5 0 0,6 0 0,-15 0 0</inkml:trace>
+  <inkml:trace contextRef="#ctx0" brushRef="#br0" timeOffset="-214406.73">22017 15901 9332,'0'-4'899,"25"0"-719,12 3-90,-2 0 0,2 1 0,24 0-90,-19-2 0,-2 4 0,7 16 45,-11-8 0,-3 1 45,2 22-90,1-1-360,-24-3-270,-5 7-89,-7 3-136,-10-4 1,0 0-675,5 21 1449,-18-17 1,-3 0-1,0 17 1,0-27 0,0-1-1</inkml:trace>
+  <inkml:trace contextRef="#ctx0" brushRef="#br0" timeOffset="-213468.73">23748 15187 9691,'1'-8'-89,"0"-1"-1,-1 3-90,-25 3 0,-9 0 90,0 3 0,-2 0 90,-22 0-705,25 9 0,1 0 705,-16-5 0,0 27-90,6-28 0,-10 23 90,20-11 0,-6 9 0,27 2 0,2-8 0,9 4 1320,0-5-1320,25 14 0,3-4 0,-2 0 0,1 0 90,13 10-90,-17-2 0,-5 1 0,-2 11 0,-3 5 0,-3 3 90,-8 5-1614,-10-1 1,-1 0 1523,3 0-45,-16-11 0,-3 0-32,-2 7 32,4-12 0,1-1 135,-4 2-90,8 7 180,8-15 90,8-13 0,10 4-180,-3-17 2976,46-2-3156,-27-6 180,34-1-363,-16-1-177,6-14-450,6 11 900,-10-11 0,2 0 0,-10 11 0,0 2 0,13-6 0,0 0 0</inkml:trace>
+  <inkml:trace contextRef="#ctx0" brushRef="#br0" timeOffset="-206723.73">25553 14881 11400,'34'0'0,"-5"0"0,6 0 0,-4 0 0,4 0-89,4 0 89,0 0-90,0 0 90,0 0 0,11 17 0,-15 2 0,6 1 0,-18 12 0,-5-16 0,-4 17 90,-7 5-90,-3-7 0,-2 26 89,-26-22-134,11-3 1,-1-1 44,-15 9-560,6-14 0,3 0 560,14 15 0,-36 1-180,38 2-352,-28 1 82,29 3 271,-11 0 89,13-12 0,2 1-90,-1 19 135,9 3 0,6 1 0,-2-30 0,1 0 90,13 27 0,2-2-135,13-5 135,-15-13 0,-1-1-135,3 2 360,12 13-180,-27-28 90,7 5-91,-20-19-178,-18 0 89,-14-7 89,-13-2-178,-3 0-271,-11 0-540,14 0 900,7-7 0,0 0 0,-1 4 0,-10-10 0</inkml:trace>
+  <inkml:trace contextRef="#ctx0" brushRef="#br0" timeOffset="-206440.73">26782 15691 9781,'0'-6'0,"0"1"0,0 0 0,0 2-2788,0 0 2788,19 18 0,-14-13 0,14 14 0</inkml:trace>
+  <inkml:trace contextRef="#ctx0" brushRef="#br0" timeOffset="-206273.73">27005 16088 9512,'0'17'899,"0"1"-539,0 0 180,0 3-451,0-7 1,0 8-90,-11-10 0,8 10-90,-23-4-899,12 6-450,-17 0-270,-1 4 1605,-10 5 1,-7 5 0,21-19 0,1 1 0</inkml:trace>
+</inkml:ink>
+</file>
+
+<file path=ppt/ink/ink12.xml><?xml version="1.0" encoding="utf-8"?>
+<inkml:ink xmlns:inkml="http://www.w3.org/2003/InkML">
+  <inkml:definitions>
+    <inkml:context xml:id="ctx0">
+      <inkml:inkSource xml:id="inkSrc0">
+        <inkml:traceFormat>
+          <inkml:channel name="X" type="integer" min="-2.14748E9" max="2.14748E9" units="cm"/>
+          <inkml:channel name="Y" type="integer" min="-2.14748E9" max="2.14748E9" units="cm"/>
+          <inkml:channel name="F" type="integer" max="32767" units="dev"/>
+        </inkml:traceFormat>
+        <inkml:channelProperties>
+          <inkml:channelProperty channel="X" name="resolution" value="1000" units="1/cm"/>
+          <inkml:channelProperty channel="Y" name="resolution" value="1000" units="1/cm"/>
+          <inkml:channelProperty channel="F" name="resolution" value="0" units="1/dev"/>
+        </inkml:channelProperties>
+      </inkml:inkSource>
+      <inkml:timestamp xml:id="ts0" timeString="2021-08-01T03:44:27.514"/>
+    </inkml:context>
+    <inkml:brush xml:id="br0">
+      <inkml:brushProperty name="width" value="0.12095" units="cm"/>
+      <inkml:brushProperty name="height" value="0.12095" units="cm"/>
+      <inkml:brushProperty name="color" value="#FF0000"/>
+    </inkml:brush>
+  </inkml:definitions>
+  <inkml:trace contextRef="#ctx0" brushRef="#br0">3388 1377 23189,'0'-5'-3237,"0"2"1378,0 19 885,0 6 515,0 13-56,0-2 211,0-3 166,0 1-1549,0 3 1777,0 1-90,0 2 0,0 16 0,0-13 0,-13 23 406,10-30-209,-11 6 440,14-18-637,0-4 90,0-4-90,0-4-90,0-23 90,17-17 482,-12-14-583,27-12 299,-28 7-319,19 10 0,3-1 409,-7-20-709,9 9 0,2 3 575,-2-4-166,-10 20 0,0 2 95,8-4 0,1 4 0,1 4 1</inkml:trace>
+  <inkml:trace contextRef="#ctx0" brushRef="#br0" timeOffset="389">4158 1587 22830,'23'-15'1166,"7"11"-970,-27-24-3300,22 25 3848,-23-24-2329,19 23 2348,-19-24-1789,7 14 797,-9-11-1479,-22 7 362,2 9 2310,-20 4-1360,8 5 1957,14 19-2004,-6-14 2370,22 33-2721,-15-8 1710,15 8-1109,-6 4-199,8-11-1056,0-1-148,23 0-813,5 11-618,0-13 2139,4-6 1,0-2 860,-3-2 0,3-7 0,3-2 1,8 0-1</inkml:trace>
+  <inkml:trace contextRef="#ctx0" brushRef="#br0" timeOffset="1147">4767 1400 26068,'0'37'-6296,"0"-6"4168,12 8-186,-9-6 1632,10 3-408,0 20 547,1-13-14,2 12-1594,3-20 1650,-17-4 361,13-2 224,-13-5 68,7-5-48,-5-5-1077,1-5 947,-2-4 317,-1-21 263,1-26-269,0-3-11,-1 5 0,-1 0-72,2-4 143,0 6 0,0 1 259,0-1 105,4-8-329,-3 22-327,2 5 502,0 4 216,5 6 1112,0 4 231,9 3-502,-4 18-1822,3-12 1214,-3 29-1907,-1-28 1326,1 36-1739,-1-24-651,0 20-915,-3-12 567,4 7 1685,-6-11-1134,2 5 1705,-5-13-1871,-2-4 1997,-3-21 324,-1-11 308,-1-11-162,0-2 132,0 6-26,0-1-146,16-2 1045,-12 1-826,12 3-118,-2 1 524,-1-2 2,3 10 751,3 1-217,-6 14 727,7 3-1427,-1 2 392,-5 19-2656,1-14 1371,-2 37-1443,2-23-180,-1 22-1386,8 9-923,-5-12 1793,-3-5 0,1-1-1033,3 2 3079,8 9 0,-9-21 1,1-2-1</inkml:trace>
+  <inkml:trace contextRef="#ctx0" brushRef="#br0" timeOffset="1498">5692 1556 23639,'35'0'0,"3"-14"1903,-3 11-1979,-14-24-738,3 24 975,-21-19-1798,13 20 2537,-15-18-2185,4 8 641,-5-6-1306,0 2 423,0 4 391,-19 2-112,15 1 601,-15 2-406,19 2 1281,-14 2 172,10 20 28,-11 5 742,15 24-1170,0-9-505,0 4 739,16-11-2609,1 10 1064,2-9-1794,9 14 1484,-7-23 1455,15 7 0,-5-19 0,-2 2 0</inkml:trace>
+  <inkml:trace contextRef="#ctx0" brushRef="#br0" timeOffset="2081">6077 1457 22920,'0'-7'-4227,"0"0"2278,0 21 975,17 4 318,5 24-421,0-10 493,7 3 435,-26-9-1738,15-3 1700,-8 8-390,0-10-102,2 4-488,-11-12 567,8-6 862,-8-18-142,3-13 381,-4-9-403,0-3 479,0-8 11,0 11-40,0-11-266,0 19-575,14 3 1310,-10 3-853,10 5 1918,-1 7 280,1 3-165,13 4-331,-1 22-1551,-5 5-573,1 14-1269,-8-5 430,1-7-985,-1-2-546,4 10-61,-5-11 517,4 10 1214,-11-20 257,5 1 841,-6-13 439,3-18 865,-2 10 835,3-47-1356,-1 29 318,1-30-144,0 17 8,0 1-253,0-1-389,4-10-823,-3 15-488,8-13 1741,-7 26-225,4 2 771,-5 11 657,1 4-883,0 0-116,2 16-1784,-1-12 1039,1 31-1860,4-5-133,-4 10-1341,10 17-980,-11-24 957,6 11-125,-6-17 1568,2-3 1286,1-4 0,1-4 0,0-2 0</inkml:trace>
+  <inkml:trace contextRef="#ctx0" brushRef="#br0" timeOffset="2904">7118 976 25078,'0'38'-5846,"0"-6"3988,0 11 794,0-8 425,14 25-391,-10-14 738,8 1 0,1-1-463,-2 0-331,-4-6 1,-1-2 661,2-9-463,-8 11 348,0-23-91,0 0-896,0-10 1667,0-23 227,-12-10-611,10-13 427,-10-3-188,12 8 4,0-3 90,17 3 1021,-12 2-663,27 5 1619,-29 5-223,28 5 590,-9 8 872,18 4-1258,-8 30-1472,9 7-1038,-17 13-172,6 1-1212,-11-13 1053,-3 2-1914,-1-2-207,-4-1 377,-2-1 1659,-4-3 230,-1 5 1009,-4-10-465,0 6 320,-19-17 1989,14 0-1450,-30-10 857,15 0 137,-15-22-979,5-4-481,11-13-889,9 4 11,10 7-1373,0 2 1166,0 2-687,16-2 1296,4 12 2071,19 0 186,-1 30-663,-3-13 613,-3 27-1867,-6-28 1354,-1 23-1437,1-24 117,2 21-2031,0-21 1074,3 8 940,14-4-183,-9-6 1461,25-10-880,-27 5 1271,10-29-1371,-19 29 1280,-1-35-1998,-4 23 1052,-6-19-1277,-1 9 54,-6 1-301,-2-7-539,-4 9-166,-1-9-501,-18 17 1133,13-1-1292,-30 11 2739,16 17 344,-1 23-496,6 0-42,14 13-586,0-5 38,0-10-721,15 20 444,-11-24-2025,34 12-333,-17-21 871,5 0 367,7-11 1791,-29-4 1,28-3 0,-14-1-1</inkml:trace>
+  <inkml:trace contextRef="#ctx0" brushRef="#br0" timeOffset="3231">8202 1355 24269,'29'35'-6265,"1"4"3898,-15-9 267,8 2 1430,-20-7 433,18-2 220,-19 0-215,15-3-1310,-16-2 2007,10-2-370,-10-3 364,4 0-1094,-4-7 681,0-22 5,-1-11 244,0-31-350,0 11 281,7 11 0,2 1 408,-5-9-390,30-12 1164,-29 20-1535,35 3 1225,-22 4-1495,36-1 495,-17 12 391,12 0 0,-10 11 1,1 3-1</inkml:trace>
+  <inkml:trace contextRef="#ctx0" brushRef="#br0" timeOffset="7531">13125 729 22830,'0'-9'-5127,"-13"2"5162,10 1-2244,-9 3 3703,12-1-1875,0 1 661,0 0-587,0 18-1289,0 7 1596,0 12-643,0 4 1181,0 18-1616,0-9 1033,0-13 0,0 0-224,0 18-1,0 2-360,0 3 90,0-3-179,0 0 89,0-2 0,0-18 1,0 0-1,0 14 630,0-12 0,0-2 0,0-1 0,0 7 0</inkml:trace>
+  <inkml:trace contextRef="#ctx0" brushRef="#br0" timeOffset="7747">12998 1260 23099,'-5'-9'-7542,"0"0"4896,5 3 2292,0-1 178,0-2-1,19-1 2519,-15 0-2017,40 1 79,-19 0 433,9 3 0,4 2 797,16-2-1507,-4 2 0,1 1 199,13 1 1,-20 2 0,-1 0 0,17 0 0</inkml:trace>
+  <inkml:trace contextRef="#ctx0" brushRef="#br0" timeOffset="8035">13880 1130 23009,'-42'0'1440,"-3"0"-1171,25 16 187,-20-12-202,24 28-1301,-27-4 1538,19 8-856,-5 4-82,14 6-437,6-11-231,4 23-626,5-26-49,20 13 245,8-23-88,12 2 1059,1-15 558,-10-4 595,0-2 375,11-3 469,-12-21 359,14-8 628,-24-13-1940,-3 1-452,-11 8-1161,-6 1-507,0 0-326,0 3-160,-22 2-511,17 7 2358,-38 0 1,15 11 0,-23 1-1</inkml:trace>
+  <inkml:trace contextRef="#ctx0" brushRef="#br0" timeOffset="8349">14278 762 24359,'19'42'-8406,"-15"-6"6582,15 6 129,-2-5 673,-2 28 693,4-13 97,-8-4 0,-2 0-166,1 10-601,-4-21 1,0 2 654,2-3 0,-2-1-328,-3 18 383,2-14 0,1 0 18,-3 1 294,5 12 1,-2-30 0,1 1 0</inkml:trace>
+  <inkml:trace contextRef="#ctx0" brushRef="#br0" timeOffset="8565">14767 1052 24089,'-23'17'1580,"-15"-13"-1269,33 32-3268,-29-19 4186,30 17-2979,-25-3 1772,26-1-1399,-21 2 573,22-1-1305,-8 0-195,10 6 1230,0-9 574,24 9 1,7-20 0,24 2 0</inkml:trace>
+  <inkml:trace contextRef="#ctx0" brushRef="#br0" timeOffset="8897">15078 1358 22470,'7'0'450,"0"0"-181,6 0-269,-1 0 0,13 0 0,-8 0 0,10 0 0,2 0 0,-4 0 90,13-19 673,-19 15 237,5-29-999,-17 14-582,0-6-236,-7-8-780,-18 14 538,-3-11-824,0 14 244,-13-2 339,10 12 1211,-13 1 799,4 22 1056,16 5-591,7 10-748,10 17-410,0-15-737,16 13-962,-12-13-239,30 0-88,-29-1-1158,38-3 1217,-21-2 1940,22-6 1,-6-4 0,-1-4 0</inkml:trace>
+  <inkml:trace contextRef="#ctx0" brushRef="#br0" timeOffset="9265">15685 1305 23189,'-14'-4'-1026,"10"16"-1091,-10 10 2394,31 9-2952,-13 2 1341,12-6 202,1 10 46,-2-10-1074,16 13 963,-18-21 414,7 3-461,-18-13 1342,11-4 1024,-9-1-400,6-4 1512,-4-20-1143,4-8-187,-2-10-300,3-4-52,-2 8 419,2-3-1297,0-1 543,-1 1-1292,2 0 1264,-1 5 489,6-7 394,-5 15 145,8 3-204,-10 16 629,10 21-1978,-10-11 761,6 36-1946,-5-18 109,2 23-292,-1-7-1960,10 21-11,-4-13 3003,8 13 1,-3-20 0,1-2 0</inkml:trace>
+  <inkml:trace contextRef="#ctx0" brushRef="#br0" timeOffset="14016">17017 1178 23999,'38'0'0</inkml:trace>
+  <inkml:trace contextRef="#ctx0" brushRef="#br0" timeOffset="14207">17077 1660 22830,'-10'2'964,"3"0"0</inkml:trace>
+  <inkml:trace contextRef="#ctx0" brushRef="#br0" timeOffset="50247">19193 957 23909,'-20'-26'-5891,"15"1"3534,-29 1 3024,30 3-1337,-28 0 985,28 4-1181,-30-3 1174,16 10-1353,-2-3 1762,-1 9 768,19 0-2568,-5 17 2405,7 9-1696,0 10 774,0 4-867,17-5-522,-12 1 112,28 2-262,-29 0 1639,26-2-1509,-26 1 785,26-3 268,-26-2-212,19 7 202,-16-10-195,3 4-634,-6-13 509,-4-2 125,0-3-784,0-1 92,-17-4-43,-2-1 1415,-15-3 1,16-2 0,5 0 0</inkml:trace>
+  <inkml:trace contextRef="#ctx0" brushRef="#br0" timeOffset="50447">19482 1210 23369,'0'34'-5576,"0"-9"3448,0-1 1064,0-8 515,-16 1 2019,12 0-1553,-11 0 620,15-1-2763,0 1 337,0 5 1889,0-6 0,0 3 0,0-6 0</inkml:trace>
+  <inkml:trace contextRef="#ctx0" brushRef="#br0" timeOffset="50607">19620 769 22290,'-9'-10'-1878,"7"1"1,-7 4 0,9 3 0</inkml:trace>
+  <inkml:trace contextRef="#ctx0" brushRef="#br0" timeOffset="50983">19908 934 22920,'-14'10'1900,"11"0"-4707,-11 0 4222,14-1-3567,0 2 537,0 1 462,0 2 288,0 3-732,0 1-182,0 13 1133,0-7-1387,0 6 2033,13-8-593,-10-3-22,11-1 205,-14-2 230,9-5-214,-6 0-662,12-4 1790,-9-3-158,3-16 1168,0 9 906,-2-27-1879,3 27 1625,-1-29-1525,3 28 2106,-2-27-2642,0 27 1717,1-19-2222,-3 21 111,4-7 1485,-5 9-2136,14 38-375,-8-17-786,0 11 1,1 1-351,2-5 1582,13 20 0,-10-25 0,7 7 0</inkml:trace>
+  <inkml:trace contextRef="#ctx0" brushRef="#br0" timeOffset="51365">20475 694 25438,'0'42'-5576,"0"-1"3627,0-5 885,0 3 516,0 8 32,0 0 302,15 5-561,-11-2-229,10-15 1,0 0 285,-10 16 557,7-11 1,2-2-568,-1 0-560,7 19 286,-5-37 2,-1 4 772,-6-21 1243,5-18 1041,-5-10-1275,5-12 525,-3-5-312,2 4 192,-1 0-302,7-15 578,-6 18-1098,6-9-960,-8 24 1205,5 8 520,-6 4 24,4 27-2066,-4-14 920,1 39-1027,2-20-93,-3 8 1,1 4-1346,5 11 2209,-1-6 0,2 0 1,5 9-1,-6-18 1,-1 0-1</inkml:trace>
+  <inkml:trace contextRef="#ctx0" brushRef="#br0" timeOffset="51999">21700 1112 26068,'23'10'-3529,"14"-7"3824,-32 19-4556,29-19 4298,-30 19-2495,25-12 1643,-25 11-1544,24-2 1878,-24 3 1,18 5 0,-12 1 0</inkml:trace>
+  <inkml:trace contextRef="#ctx0" brushRef="#br0" timeOffset="52131">21658 1625 24179,'0'6'-5576,"0"0"3537,0-2 525,26-2 2089,10-1-783,17-1 447,2 0 0,-9 0 0,2 0 0</inkml:trace>
+  <inkml:trace contextRef="#ctx0" brushRef="#br0" timeOffset="53547">22958 976 22740,'-5'-2'-2945,"-1"0"2726,1 2 1324,0 20-2159,0-14 1774,-2 42-1854,0-22 782,0 27-877,-1-7 1091,3-11 1,0 1-549,-2 20 48,2-11 0,0 0 398,2 5-968,-2 9 1755,3-17-613,0-14 538,1 4-788,0-23-173,1-20-225,15 6 231,-7-30 1,1-6 148,28 11 165,-16-15 0,-1-2 65,18 7 446,2-12 0,-8 22 0,1 1 0</inkml:trace>
+  <inkml:trace contextRef="#ctx0" brushRef="#br0" timeOffset="53955">23708 1253 23549,'-42'0'1439,"-3"-13"-2702,9 10 1449,-3-10-826,10 13 1001,0 0-193,2 15 566,2-11-433,3 29-729,4-29 1421,1 35-1532,9-22 268,2 19-1005,6-9-320,0 0-540,0 10 58,21-9 343,2 14-904,2-21 2108,14 2 210,-21-15 639,19-2 875,-9-4 296,12-1-43,-10-21 777,16-3 363,-24-1-1336,8-28-578,-18 35-275,2-28-1172,-7 20-50,-2 13 11,0-7-597,-3 17 853,1-5-111,-2 21-689,2-10-353,2 28 234,2-6-448,8 20 18,-2-7-737,12 4 2241,-8-22 1,7-2 0,-6-13-1</inkml:trace>
+  <inkml:trace contextRef="#ctx0" brushRef="#br0" timeOffset="54298">24042 1355 23009,'0'13'-5486,"0"6"3538,0 16 884,0-1 335,0-6 393,0 1 32,14 12-568,-11-10-950,21 16 1161,-22-24 362,8 4-640,-3-17 645,1-3 279,8-4 1046,-4-19 903,6-8-434,-4-8-810,1-1 0,0 0 387,2-3-307,0 2 1,-1 0 491,-2 7-439,7-4-646,-10 16-223,4 8 977,-6 2 280,2 24-2710,0 7-585,0 10-615,9 15-6,-5-19 2307,7 11 0,-1-15 1,1-2-1</inkml:trace>
+  <inkml:trace contextRef="#ctx0" brushRef="#br0" timeOffset="54747">25063 1315 23279,'-42'-2'433,"1"1"-405,7 19 1106,4 5-910,12 23-1516,6-13 369,6 3-271,6-14-582,20 10-137,9-10 628,28 4-302,-10-12 1173,-12-10 1,0-1 1024,5 2-229,-5-11 0,-1-5 1585,4-14-117,7-11-885,-24 7 0,-3-2-274,6-13-579,-6 3 0,-3-3-645,-5-12-23,-4 17 0,-2 1-483,-3-20-592,-1-1 230,0 0 488,0 1 420,-19 3-760,15 6 426,-15-10-101,3 24 59,13-5 745,-13 25 685,16 6-561,0 25 0,0 43 542,0 1-405,0-17 0,0 1 460,0 16-207,16 1-1048,-13 1-11,14-31 0,-1-1-473,-12 29 505,13-31 1,3 1-710,-7 6 0,1 0 1290,25 16 0,-19-22 0,0-1 0,11 5 0</inkml:trace>
+  <inkml:trace contextRef="#ctx0" brushRef="#br0" timeOffset="55049">26098 1266 24359,'-48'0'1259,"-2"14"337,9-10-1623,1 29 124,14-29 104,12 36-1486,-11-22 1593,22 21-1728,-11-11 641,14 1-1292,0-1 210,0 0 131,26-2-311,-20-3 839,47-1 107,-31-5 1218,25-4-45,-13-5 967,14-5 411,-12-2-287,14-21 822,-25 15 445,1-52-2619,-18 34 438,-3-32-1237,-5 6-603,-23 10-1430,0-20-139,-5 28-675,-3-4 3238,27 17 1,-10 5-1,14 2 1</inkml:trace>
+  <inkml:trace contextRef="#ctx0" brushRef="#br0" timeOffset="55463">26605 1189 24898,'0'38'-5845,"0"-5"3806,0 4 1065,0-7 245,0 2 303,0-2 212,0-1-104,14 9-1973,-10-13 2022,10 12-358,-5-23 131,-6 3 122,12-13 1329,-8-1-301,3-26-19,5-8 1017,-6-14-1091,5-1 832,-3 8-445,0-1-35,1 0-1180,3-11 175,-3 17 752,4-10-658,-8 30 838,6 0 126,-7 13 178,5 0-86,-4 19-2333,0-14 1195,1 33-1675,5-10-606,-4 10-1233,6 16 117,-8-21 2949,4 11 0,-3-13 0,0 2 0</inkml:trace>
+  <inkml:trace contextRef="#ctx0" brushRef="#br0" timeOffset="56130">27200 1309 22020,'36'-8'2713,"12"-2"-1971,-13 3-160,9 0-227,-18 5-486,1 2-3,-5 0 169,7 17-1032,-9 6-997,9 24-765,-13-6 687,-3-10 1,0 1-2076,2 9 3530,8 14 1,-8-15-1,2 0 1</inkml:trace>
+  <inkml:trace contextRef="#ctx0" brushRef="#br0" timeOffset="75799">12907 3482 26787,'47'12'-1915,"-7"-9"2175,6 19-1590,-10-19 1730,4 7-584,-1 2-156,3-9 682,-1 8-991,1-3 531,-7-4 0,1-1-105,9 7 427,-7-7 1,-1-1-337,-8-2 514,4 0-76,-15 0-169,-4 0 332,-2-13-441,-6-2-675,-2-18-431,-4 8-431,-20-3-274,-4-3 88,0 9 419,-32-12 120,35 18 165,-32-1 1133,24 12 972,0 2 275,1 3 574,-6 15 564,9-11-759,-5 43-1264,18-27 240,2 29-1353,8-20-403,2 3-377,19-1-666,-14 0-761,39-2 731,-38-1 704,26-11 1,6-1 280,-11 8 1170,14-5 1,2-3 0,-2 2 0,15 4 0</inkml:trace>
+  <inkml:trace contextRef="#ctx0" brushRef="#br0" timeOffset="76181">13862 3379 23459,'17'-2'1953,"6"-1"-1692,-21 1-343,16 2 8,-11-1 243,8 1-140,-5 0 37,1 0 384,5 0-668,-3 0 33,11 0 152,-7 13-1240,14 0 228,-8 3-388,9 9-1111,6-1 799,-6 6 448,-4-7 1,0-1-742,6 4 1714,10 9 1,-15-13 0,-1 0 0</inkml:trace>
+  <inkml:trace contextRef="#ctx0" brushRef="#br0" timeOffset="76464">14232 3194 24718,'-8'-3'-2720,"1"1"2569,-1 1 834,1 1-120,-1 0-97,-3 19-837,0 10-237,-3 11-314,0 7 504,-1-6-329,-2 5-520,-1 3-458,-1 2-72,0 2 442,6-17 0,1 1 1313,-4 20 0,7-23 1,0-1-1,2 11 1</inkml:trace>
+  <inkml:trace contextRef="#ctx0" brushRef="#br0" timeOffset="77031">14807 3430 23729,'6'20'-7719,"-2"18"5931,-1-18 893,0 37 521,0-17 249,1-5 1,0 0-82,-1 6 38,5 10-1713,-5-18 2274,0-1-377,-1-3 181,0-2-254,-2-5 198,2-2 25,-2 0-71,1-7-1008,-1-1 409,-14-30 480,11-8-395,-11-14-166,0-3-62,11-17 593,-10 9-54,11 3 1,4 0 277,-2-12-119,-2 21 0,4 0 155,14-11 846,-12 3-42,32 6 1498,-9-5-1253,9 18 1145,9-3-452,-20 22 394,8 3-266,-14 6-821,-1 0 260,-2 22-2784,-4 4-325,-2 13-679,-5 9 274,-2-18-416,-22 10 1213,15-13-335,-36-1 1331,35-1 144,-39-2 1905,25-1-1353,-8-4 45,-4-4 1,27-3 0,-15-3 0</inkml:trace>
+  <inkml:trace contextRef="#ctx0" brushRef="#br0" timeOffset="77365">15392 3364 23729,'6'14'-7907,"0"-3"5095,0 2 1555,0-9 2510,1 21-2040,0-13 379,-1 12 18,2-3-1912,-3 4 2524,2-1-116,-1 12 208,-2-9-1245,0 6 1216,-2-6 65,-1-9 285,1 6 158,-2-15-492,2 1-60,-2-8-815,1 0 229,2-2 1990,-2-21-1689,0-2-6,0-13-177,-1 4-219,1 9-21,-1 0-27,1 2 660,0 2 0,0 1 0,-1 3 0</inkml:trace>
+  <inkml:trace contextRef="#ctx0" brushRef="#br0" timeOffset="77768">15315 2885 24808,'-9'-9'-5959,"-1"1"4355,3 1 566,0 2 572,3 1-246,2 1 389,1-1 0,1 4 0,0-1 1</inkml:trace>
+  <inkml:trace contextRef="#ctx0" brushRef="#br0" timeOffset="78432">15598 3174 23549,'15'14'-4114,"-3"5"729,6 10 1822,-14 2 748,14-4 183,-3 19-122,-1-11 66,3 13-1593,4-17 1866,-18 0 732,15-3-266,-9 9-227,4-12 48,-2 11 421,-6-18 137,0 2-103,-3-11-371,-2-2-10,0-23 395,0-6 27,0-13 19,0-19 22,0 15-193,0-15-308,18 12 521,-13 0-634,26 2 338,-10-10-84,-3 16 357,27-9 1,-28 27 0,23-1 0</inkml:trace>
+  <inkml:trace contextRef="#ctx0" brushRef="#br0" timeOffset="78764">16293 3530 23189,'9'5'-3381,"1"0"2707,1-3 1023,2-1 309,-1-1-120,1 0-90,8-19-42,-6 15 287,12-28 86,-13 16-207,4-1-147,-8-11-1073,-2 25 1321,-3-26-1530,-2 9-283,-2-6-318,-1-6 333,-15 15-1,11-7-613,-28 13 2324,28 1-3210,-26 8 3673,26 17-851,-10 9 625,14 24-1182,0-7-355,0 4-1045,28 1-1056,11-13 3078,-12-12 0,3-2 0,31 4 0,-11-3 1</inkml:trace>
+  <inkml:trace contextRef="#ctx0" brushRef="#br0" timeOffset="79096">17462 3111 26787,'-9'-2'-2764,"0"-1"1639,4 2-83,-1-1-3289,0 1 4517,1 15 0,-1-11 1,2 11-1</inkml:trace>
+  <inkml:trace contextRef="#ctx0" brushRef="#br0" timeOffset="79218">17530 3623 23459,'9'0'-570,"-2"0"1,-3 0-1</inkml:trace>
+  <inkml:trace contextRef="#ctx0" brushRef="#br0" timeOffset="85230">19217 3248 23189,'-20'40'-2893,"16"0"317,-31-6 3791,31 2-2492,-21 5 1544,22 1-1109,-6 3 439,9 0-1283,0-1 813,0-4 728,0-4-1229,0-4 1254,20-6-1098,-15-4 664,30-6 1089,-15-5 40,19-6 776,-9-25 503,1 14 176,-10-43-1241,0 26 778,1-27-319,0 10-1125,-8 9 0,-1 0 3,7-17-305,-6 9 1,-1-1-1049,2-2-39,2-10 1436,-7 24-720,-1 5 659,0 7 84,-1 5 550,0 5 540,2 4 290,3 1-469,-2 23-2268,7 8-68,-7 13-147,2 1-1401,-1 10 183,-3-13 391,-1-5 0,1 0 1534,2 4 1,5 11 0,-3-19 0</inkml:trace>
+  <inkml:trace contextRef="#ctx0" brushRef="#br0" timeOffset="85530">20117 3403 23189,'-41'-3'760,"-1"18"1304,1 7-1446,5 23-1326,14-11-48,9 2-421,13-12-238,0-1-181,0-1 57,22-3-540,-17-2-552,44-3 2228,-27-7 374,23 2 538,3-8 1043,-12 4-194,16-25 930,-27 16-512,3-33 109,-20 13-2486,-2-9-769,-24-9-1030,13 17-862,-36-12 1159,11 25 1770,-10-11 1,2 21 0,12-6 0</inkml:trace>
+  <inkml:trace contextRef="#ctx0" brushRef="#br0" timeOffset="85749">20410 3351 23549,'3'-6'-1907,"1"1"2339,2 5 252,7 18-3283,-2 3 465,7 1 1085,-3 18-315,2-22-428,2 21-981,10 4 375,-3-9 2075,-3-5 0,1-2 1,8 4-1,10 7 1</inkml:trace>
+  <inkml:trace contextRef="#ctx0" brushRef="#br0" timeOffset="85981">21082 3365 23369,'-36'-1'648,"4"0"-645,16 21-484,-9-15 1400,15 35-2436,-14-22 2048,9 17-1274,-1-7-58,3 1-217,1-1-712,-7 21 812,7-19-1354,-6 19 1565,10-33 578,-1-1 1,4-11 0,0-4 0</inkml:trace>
+  <inkml:trace contextRef="#ctx0" brushRef="#br0" timeOffset="86163">20687 3360 22740,'-2'-12'-6016,"0"3"3777,22 4 5702,6 17-3364,12-8 782,1 27-1644,-8-26 1306,3 35-2789,15-7 2181,-10 12-455,-7-15 1,1 0-2578,7 6 2964,9 9 0,-14-17 1,0-3-1</inkml:trace>
+  <inkml:trace contextRef="#ctx0" brushRef="#br0" timeOffset="86363">21662 3374 23729,'-36'19'2592,"-2"6"-2361,7 24-2045,2-7 511,3 4-375,7-7-71,1 1 1552,3 2 0,3-1 1,4 0-1</inkml:trace>
+  <inkml:trace contextRef="#ctx0" brushRef="#br0" timeOffset="86786">22677 3010 24629,'6'-16'-1488,"-4"0"-912,5 24 482,-7 13 938,0 14 148,0 9-84,0 12-64,0-10-718,0-4 1,0 0 135,0 9 964,0-17 0,0 0-644,0 13 1242,0-1 0,0-3 0,0 0 0</inkml:trace>
+  <inkml:trace contextRef="#ctx0" brushRef="#br0" timeOffset="86946">22430 3525 23819,'0'-24'-6386,"0"-9"4168,21 7 2577,15-17-237,13 22 342,7-6 1,-7 15 0,2 1 0</inkml:trace>
+  <inkml:trace contextRef="#ctx0" brushRef="#br0" timeOffset="87304">23640 3637 22470,'8'-22'-3433,"4"-13"2230,6 8 2040,7-22-945,0 6 305,-3-1-289,-7 13 583,1-14-988,-5 10 1134,1-22-649,-7 26-563,-2-14-204,-3 25-150,0-2 630,0 14-560,0 56 299,0-20 198,0 9 1,0 2-410,0 2 45,14 1-837,-11 1-218,24 13 630,-24-14 184,13-11 1,1-2 925,-3 0 1,18 2 0,-12-15 0</inkml:trace>
+  <inkml:trace contextRef="#ctx0" brushRef="#br0" timeOffset="87600">24178 3248 23729,'-25'-16'-4038,"5"3"2548,7 2 309,10 3-1009,-11 19 3875,32 22-2986,-13 6 758,20-6 1,4 0-1115,-6 4 1344,3-13 0,2 0 67,4 9-67,0-3 1146,0-2-2157,5 5 2105,-13-10 69,4 3-1244,-16-14-236,-22-5 1007,-9-22-612,-28-4 602,8-2-171,-6-12-175,1 6 1,10-9-1,-7-1 1</inkml:trace>
+  <inkml:trace contextRef="#ctx0" brushRef="#br0" timeOffset="87714">24222 3107 23009,'47'-22'2955,"-3"0"-2199,8-1-401,-12 6-73,14-1-660,-16 9-454,-2 4-680,0 3 1524,-3 1 1,-3 1 0,-2 0 0</inkml:trace>
+  <inkml:trace contextRef="#ctx0" brushRef="#br0" timeOffset="88354">25585 3104 23999,'0'-12'-6476,"0"0"4978,0 6 613,0 16 247,-13 16 1444,9 10-992,-9 10 351,5-7-1357,6 4 1284,-6 0 280,8 17-372,0-19 0,0 11-923,0-24 744,0-4-371,0-5 145,0-5-47,0-5-1000,0-2 1272,0-21 90,0-6 180,14-13 700,-11 1-577,22 5 1249,-12-1-539,18-12 456,-7 11 245,14-13-13,-14 24 309,6 2-596,-9 12 459,0 4-1647,-2 0 627,2 16-1849,-3-12 819,2 32-2571,9-6-136,7 22-600,1-9 3142,5-6 1,-8-15 0,4-2 0</inkml:trace>
+  <inkml:trace contextRef="#ctx0" brushRef="#br0" timeOffset="88782">26458 3258 22920,'-26'-12'-2956,"-18"6"3433,25 1-614,-20 5 750,11 0-204,2 0-117,12 18-315,-10-14 458,20 33-1038,-17-11 527,20 9-1173,15 8-1056,-9-18 224,39 9 693,-11-16 656,9-4-222,12-5 2138,-26-8-972,8 2 1272,-23-22 676,-2-1 67,-11-18-2435,-18 6-817,13 4-91,-26 11 490,27 29-248,-10 43-34,14-1 277,8-16 0,3 1-110,0-3 1,0-1 21,13 19 656,-5-18 1,-4-1-278,-10 11-415,29-1-24,-19 9-160,4-16 534,-2 5-223,-15-22 1034,4-5-779,-6-5-326,0-4-821,-20-4 1741,-3-1 0,-2-24 0,8-5 0</inkml:trace>
+  <inkml:trace contextRef="#ctx0" brushRef="#br0" timeOffset="89214">27102 3241 23459,'-24'-3'-210,"-2"0"141,-25 20 1566,6 4-596,6 21-1274,17-8-293,10 1-319,12-8-701,0-3 254,0 1-427,20 4-948,8-9 931,-3 2 312,27-16 1724,-29-1 71,38-5 1365,-24 0 0,8-15 595,-18 12 95,-4-28-1440,-4 26 1284,-5-41-2655,-7 27 186,-3-23-784,-4 18-473,0 4-595,0 2 426,-17 4 847,12 1-1782,-24 6 3268,26 21-898,-8 12 575,11 23-335,22-9-687,-17 0 246,37-14 438,-24-3 4,19-2-910,-7-3 638,3-8-80,0 4 744,-1-11 1,-2 5 0,-2-8 0</inkml:trace>
+  <inkml:trace contextRef="#ctx0" brushRef="#br0" timeOffset="89480">27597 3357 23549,'0'-22'-5576,"-17"1"3071,12-2 894,-12 8 1627,17 24-262,0 18 96,16 34-428,1-9-1640,2 5 1591,11-14 591,-25-1 565,28 1-886,-17 13-91,3-13 433,3 19 122,-14-32-18,3 9 91,-5-24-710,-6-1-82,-19-11 1867,-10-2 245,-11-1-69,-4-19-1939,-10-3 764,10-13 1,-10 1 0,16 6 0</inkml:trace>
+  <inkml:trace contextRef="#ctx0" brushRef="#br0" timeOffset="89630">27392 2714 23819,'52'0'-1889,"7"0"1148,-26 9 1,1 0 690,3-7 0,0 0 1,2 8-1,0-1 1,0-9-1,0 0 0</inkml:trace>
+  <inkml:trace contextRef="#ctx0" brushRef="#br0" timeOffset="90656">22583 3410 22830,'12'5'-2482,"-9"-1"-1184,18-4 5102,-6 1-535,4-1-281,3 0-203,-4 0-486,1-12-375,1 9 262,2-9 694,1 12 0,0 0 1,0 0-1</inkml:trace>
+  <inkml:trace contextRef="#ctx0" brushRef="#br0" timeOffset="98364">12092 952 21840,'-13'4'3036,"1"1"-1713,-3 4-1074,-1 0 188,0 1 212,-1 0-564,-1-1-18,-1 2 391,-1 0-448,-2 0-113,3 2 179,-12 6 32,10-1-339,-10 8 23,13-5-359,-2 4 53,2 3-136,-10 19-446,6-7 613,4-1 1,1 1-692,-4 13 720,5-5 1,2 2-646,-1 15 638,6-23 0,0 1-621,1 22 639,5-32 1,1 1 40,-1-1 0,1 2-23,1 16 0,1 2 83,-1-12 1,1 1 128,-2 5 1,1 6 0,4-5-180,6-1 0,2 1 144,-3 6 1,-1 5-1,1-3-109,3-2 0,3-1 142,-2-6 0,2 2 0,-2-2-53,-3 7 0,0-3-22,10 2 0,2 1-5,-5-3 1,0 3 70,1-4 1,2 2 0,-1-2-7,3 6 0,2 2 102,3 1 0,2 6 0,-2-7-51,-1-8 1,0-2 142,-4-7 1,1 0-1,0-3-210,1 0 1,-1-4 106,0 0 0,1-2-12,0-3 1,0-1-6,-2-1 1,1-2-302,22 19-145,-3-5 825,0-6 1,-4-6 0,-2-3 0</inkml:trace>
+  <inkml:trace contextRef="#ctx0" brushRef="#br0" timeOffset="99081">11965 3447 22920,'-14'-4'-1207,"-3"1"1138,-14 16 2062,-2 6-920,7-2-459,-15 35-895,16-26 169,7 3 1,0 2-190,-10 10 467,1 4-184,1 6-620,9-12 1,0 1 4,5-9 1,2 2 41,-5 22 1,2 2 174,8-22 1,2 0-115,-2 26 1,4 1-73,11-24 0,0-1-139,-9 13 0,3-2-44,19-12 0,3-2 99,-13 1 1,0 0 70,12-1 0,4 1 299,7 13 1,1 1 30,-9-13 1,3 0 221,4 2 0,5 3 1,-2-5 202,-3-3 1,1-2 90,12 10 0,1-3 246,-13-13 1,-1-2 39,1 1 0,1-1 1,0-2 1,2-1-132,18 8 0,2-2 100,-14-6 1,2-1-366,4 0 1,5 1-1,-4-2 79,-5-2 1,-2-2-26,15 4 0,-2-2-89,-20-5 0,-2-1 3,-1-1 1,-1-1-47,27 7-524,-25-8 0,-1-1-281,13 1 891,3-2 1,-26-4 0,-4-1 0</inkml:trace>
+  <inkml:trace contextRef="#ctx0" brushRef="#br0" timeOffset="99446">13063 5054 23639,'-7'-3'-2811,"1"1"1593,1 0 694,2 1 733,2-1-1694,18 2 2390,4 18-1552,1 2-750,17 2 1075,-21 9-905,18-18 1507,-10 15-644,8 1 878,-11-6-1493,13 18 785,-26-17-485,8 21-697,-17-17 1839,4 10-1521,-33 6 1881,20-10-855,-27-2 0,-7 0 834,9 5-845,-12-3 0,-2-1 1052,-1 5-527,17-13 0,2-1 0,-6 9 0,2-1 0</inkml:trace>
+  <inkml:trace contextRef="#ctx0" brushRef="#br0" timeOffset="99830">14543 5362 25528,'-51'-11'-954,"2"1"548,13 1 167,-2-1 81,2 3 13,-2 0 153,4 2-1,3 4-105,3-1 517,7 2-23,3 0 84,6 0-2,5 17-893,3 1-437,28 18-816,-18-8-144,34 0 725,-35-8-1015,26 6 714,-28-8-505,22 10 1056,-22-14-224,8 13 408,-32-15 2654,15 9-2366,-36-12 2103,37 1-2739,-40-2 1551,17-3 0,-16-2 1,5-2-1</inkml:trace>
+  <inkml:trace contextRef="#ctx0" brushRef="#br0" timeOffset="100232">15000 5305 24269,'0'-5'-5127,"-18"1"6369,-9 2 3,-12 0-240,-3 2-298,6 0-266,-17 18 531,15 1-499,-10 3 1856,21 10-2165,6-27 346,9 28-1367,-2-14 330,12 8-1307,-4 3-242,32-15 148,7 8-96,14-14 1788,-1 2-506,-12-8 1442,2-2-329,-2-1 1103,9-17 421,-15 13-425,5-27 167,-14 12-685,-10-15-1400,-1 2-490,-8 6-681,0 8-338,0 29-1809,0 6 1076,0 28 478,15-14-833,-11 5 1330,27-12 1618,-27-1 1,30-2 0,-12-2 0</inkml:trace>
+  <inkml:trace contextRef="#ctx0" brushRef="#br0" timeOffset="100513">15442 5397 23549,'5'-9'-1885,"-2"-1"144,3 9 3521,-3-3-1320,4 4-34,-1 0-6,3 0-240,1 17-2070,10 1 974,-6 3 199,13 8-1057,-11-12 421,4 2 1,-5 5-500,-1-21 1670,-1 15 425,0-17 1052,0 7-476,-1-8 440,6 0-19,-6-18-1385,10-7 1380,-11-9-2523,4-1 1688,-7 8-2031,1-1 1629,-2 2 1,0 1 0,-1 2 0</inkml:trace>
+  <inkml:trace contextRef="#ctx0" brushRef="#br0" timeOffset="100802">15967 5408 23009,'18'20'-6101,"2"-1"4662,-1-3 917,2-7 1292,-2 4-624,9-11 1021,-6 6-797,12-8-280,-15 0 1728,5 0-358,-11-20-528,0 16 596,-3-30-1161,-2 31 717,-2-28-1657,-3 12-668,-2-14-269,-19 4-554,-2 6 843,-19 12-27,1 4 1918,16 27-1246,-8-15 2143,27 39-1790,-9-23 1155,12 21-1363,0 12-214,17-12-1121,-4-4 1,4 0 1509,25 5 1,-16-14 0,1-2 0,20 10 0</inkml:trace>
+  <inkml:trace contextRef="#ctx0" brushRef="#br0" timeOffset="101463">17878 5537 24179,'-23'-14'-3655,"17"2"-889,-36 3 5755,38 2-2722,-47 2 2965,30 3-297,-40 18 178,28-12-1096,-19 31 1074,24-7 785,-3 10-1868,18 0 755,6-9-1881,4-1-311,22 8-1437,-15-9 288,54 1 1056,-33-14 921,12-10 1,3-2 509,1 2 581,15-28 1105,-7-7-136,-14-14-797,-10 13 0,-2 0 689,-1-10-1524,-9 2 0,-2-1-510,-4-11-175,-4 16 0,-1 1-583,-2-18-866,0 0 379,-17-1 1185,16 15 0,-2 1-270,-15 10 0,-1-1 121,17-14 0,-1 1 50,-33 1 338,32-11 377,-13 34-173,17 16 258,18 51-486,-13 1 378,11 4 0,4 1-150,-7-23 1,-2 1-179,0 12 0,2-1-198,7-11 1,-2-3-479,-14 34 216,12-35 1,2 0-778,-8 12 0,-1-1 1492,18 16 0,-15-21 0,0-1 0,4 7 0</inkml:trace>
+  <inkml:trace contextRef="#ctx0" brushRef="#br0" timeOffset="101948">18503 4970 24449,'0'42'-5756,"0"-5"3717,0 5 885,0-5 605,0 2 214,14 0-651,-10-1 583,10 13-1718,-2-14 1422,-9 20 597,15-30-394,-16 6 218,5-15-522,-4-3 815,-2-4-355,3-4-469,-2-2 632,0-3 421,4-16 827,6-8-26,-1-10 329,6-2 29,-1 8-165,2 1 685,4 1 650,12-1-865,-5 12 129,26 0-573,-21 13-775,-2 8 0,1 1-43,3-5 126,13 30-1049,-8-5-442,-15 8-644,10 15-906,-27-20 126,1 20 701,-28-23 1613,14 7-1196,-44-14 3136,22 0-679,-31-4-581,19-5 0,0-1 698,-24 2-948,8-4 1,0-3 0,-9-2-1,23-5 1,0 1 0</inkml:trace>
+  <inkml:trace contextRef="#ctx0" brushRef="#br0" timeOffset="111597">6723 7231 25708,'-21'-15'-4178,"15"0"-15,-29 4 5506,31 2-3027,-10 2 2612,1 4 165,10 18-1120,-19-11 448,20 41-675,-12-20 1976,13 30-2072,-5-17 0,0 1 1399,2 23-1398,0-3 1,0 1-315,2-24 0,1-1 287,-1 13 1,1-1-2178,1 19 1506,0 0-1184,0-4 1289,0-21 1,0 0-219,0 17 1156,0 8 0,0-30 0,0-5 0</inkml:trace>
+  <inkml:trace contextRef="#ctx0" brushRef="#br0" timeOffset="111750">6268 7838 23189,'25'-13'2080,"-3"-1"-1539,12 5 0,4 0-838,15-4 79,-16 4 0,1 0-658,23-3 846,2 1 1,1 1-1,1 0 1</inkml:trace>
+  <inkml:trace contextRef="#ctx0" brushRef="#br0" timeOffset="112086">7307 7727 23639,'-17'31'-1821,"12"-1"-744,-24 8 3263,18-5-1099,3 3 1,2 2-476,-3 1 479,6-3 0,6-1-786,14-6-1076,-12 4 815,34-15 1766,-20-6-1337,19-4 1513,-7-5 457,0-2 213,0-1 493,9-16 1059,-11-8-633,10-20-1431,-26 7-63,6-16-785,-18 21-860,3-10-118,-4 16-246,-16 3-1181,12 4 367,-12 4 767,-1 3-303,2 7 1912,-5 17 1,10 7 0,10 15 0</inkml:trace>
+  <inkml:trace contextRef="#ctx0" brushRef="#br0" timeOffset="112380">8185 7655 24539,'-44'0'899,"16"21"-462,-4-15 205,28 37-2994,-26-26 3197,27 21-2397,-9-11 1062,12 2-1107,0 0 1,0-3-164,23 9-371,-17-13 1998,27-8 1,5-3-869,-10 1 1479,7-8 0,1-2 174,3 1 761,2-3 94,-4-19 533,-3 14-146,-6-33-1101,-4 34-398,-6-47-1377,-9 34-862,-3-37-162,-25 39-556,15-14 2189,-39 27 1,36-8-1,-17 10 1</inkml:trace>
+  <inkml:trace contextRef="#ctx0" brushRef="#br0" timeOffset="112556">7918 8422 24629,'19'-12'-423,"4"-7"1,19-20 0</inkml:trace>
+  <inkml:trace contextRef="#ctx0" brushRef="#br0" timeOffset="113016">7678 7699 24898,'0'38'-6205,"0"-4"4076,0 17 1065,0-12 205,0-1 0,0 1-646,0 11 1444,0-6 0,0-1 0,0 8 1,0 15-1</inkml:trace>
+  <inkml:trace contextRef="#ctx0" brushRef="#br0" timeOffset="113630">9683 7539 25978,'-17'35'-2905,"13"-4"348,-13 4 2374,17-4-1620,0 2 301,0 3-535,0 15 802,20-12-2603,10 17 3684,12-30 0,3 4 0,-9-17 0</inkml:trace>
+  <inkml:trace contextRef="#ctx0" brushRef="#br0" timeOffset="113896">10260 7625 24089,'-42'0'719,"17"21"-347,-6 1 35,15 3-1334,-3 26-134,7-34 750,12 38-994,19-33-498,-15 5 60,35-17 1125,-34 2-1956,38-10 3076,-15 4-56,18-25 601,-9-5 826,-17-22-2054,-9-13 424,-28 17-2713,12-5 2300,-32 27-1624,32 2 1622,-35 10 0,34-4 0,-14 4 0</inkml:trace>
+  <inkml:trace contextRef="#ctx0" brushRef="#br0" timeOffset="114234">10913 7578 24089,'-42'0'899,"17"13"479,-13-10-1296,16 26-804,-3-4 503,-3 7 15,25 4-1358,-7-9 693,10-2-907,0 0-517,29-2 559,-22-2 1173,30-8 1,5-2 98,-11 3 262,6-7 0,1-2 1406,4-2-365,0-3 665,-5 0 91,9-15 288,-17-3-175,3-29-1694,-23 16-619,-4-12-688,-25 19-446,14 0-817,-43 1 1146,25 3-1244,-27 0 2403,-4 2 0,15 6 0,-13-1 0</inkml:trace>
+  <inkml:trace contextRef="#ctx0" brushRef="#br0" timeOffset="114514">11668 6998 23549,'4'21'-7236,"0"20"5145,-2-19 991,2 27 633,1 16 52,-1-11 289,-1-6 1,0 1-138,1 7-821,-3-19 1,1-1 588,3 9-608,-2 0 1110,3 10 0,-2-16 1,2 7-1</inkml:trace>
+  <inkml:trace contextRef="#ctx0" brushRef="#br0" timeOffset="114736">11950 7356 24718,'-37'16'3046,"16"14"-5101,-10-25 2351,27 26-2708,-18-18 3241,20 14-2585,-6-5 764,8 3-1324,0-2-1931,24 10 3985,-18-9 1,43 5-1,-18-11 1</inkml:trace>
+  <inkml:trace contextRef="#ctx0" brushRef="#br0" timeOffset="114934">12352 7515 23999,'0'33'-6296,"0"4"4078,0-6 1154,0 4 245,0-11-236,20 2-225,-15-2-129,15 0-1596,-2-3 3032,-13-3 1,27-2-1,-14-2 1</inkml:trace>
+  <inkml:trace contextRef="#ctx0" brushRef="#br0" timeOffset="115086">12418 7217 22830,'-3'-5'-2517,"2"1"1,-3 2 0</inkml:trace>
+  <inkml:trace contextRef="#ctx0" brushRef="#br0" timeOffset="115456">12755 7574 22920,'19'3'-1555,"12"0"1642,-17-2 95,15-1 75,-7 0 5,12 0-140,-8 0 150,15-14 356,-18 11 49,2-11-18,-11 14-567,-5-11 109,-3 2-403,-4-10-723,-21 3-208,15 3-1511,-29-1 1646,29 9-1077,-27-2 1760,16 6 553,-3 19 190,7 6 131,11 11-1112,0-1-17,0 7-857,16-9 495,-12 10-1167,33-14-308,-31-2 2106,40-3 0,-24-4 0,22 0 0</inkml:trace>
+  <inkml:trace contextRef="#ctx0" brushRef="#br0" timeOffset="115750">13580 7417 24089,'0'-14'-5666,"-21"2"4976,16 3-1665,-16 2 3227,7 3-13,10 1-1387,-11 16 1619,15 6-2597,15-1 1262,3 33-922,1-30 1679,13 28-1723,-27-23-49,30 1 1586,-30-1-2108,26-1 2425,-28-2-502,20-2 876,-16 3-1621,4-7 469,-7 4-217,-4-11-440,-23 1 2646,18-4-1666,-44-1 1043,27 1-787,-43 3 0,25-3 1,-16 2-1</inkml:trace>
+  <inkml:trace contextRef="#ctx0" brushRef="#br0" timeOffset="118132">15822 7982 24539,'19'-21'360,"12"16"911,-27-38-3983,26 21 3646,-18-21-2032,15 4 1007,-6-2-253,1-4-240,1-2-30,-2 0-303,-2-1 1578,-3 1-1715,-1 1 1145,-8 13 1,-2 0-762,3-17 474,-4 9 0,-2 2-536,-2-5-15,0-7-71,-15 22-541,11 6 391,-12 5 364,2 6 591,-3 6 654,-1 28 608,6-1-894,5 12 1,4 4-176,1 13 163,-3-13 1,0 3-100,3 4 0,4 0-355,8-11 0,2 2-306,1 23 0,1-1-305,-2-25 1,3-1-308,13 19 0,-1-1-300,-6 2 906,3-19 1,2-4 39,4 6-208,-2-7 818,0-5 212,8-2 486,-9-11 385,18-1 435,-20-23 778,14-6-277,-19 3-375,3-20-825,-11 33 1346,-3-32-2461,-2 33 1163,-1-25-1930,-4 19-710,2-4-48,-3 8 197,2 6 2025,0 15-3335,0-11 1880,3 28-1425,1-28 2269,9 41-1206,0-29 628,7 22-601,-1-27 84,4 7 1570,2-15 915,6 8-308,-1-11-204,3 0 1129,12 0-480,-11-21 1115,17-5-1155,-29-10-279,5-12-1181,-21 18-111,-1-7-564,-7 5-1010,-1 12 45,0-4-218,0 14-297,-13 4 1704,10 19-250,7 12-297,0 22 451,35-5 281,-11 10-484,13-19 716,-2 4-158,-9-15-331,1-4 317,0-7 1164,1 1-59,-1-11 382,0 5 355,8-6-363,-10-21 410,10-7-124,-19-12-1069,-1 2-246,-11 8-253,-4 0-829,-2 1-82,-2 1-541,0 3-342,0 6-14,0 0 869,-15 10 559,11 23 345,-11 15 649,15 13-837,0 21 98,18-23-444,-8-7 1,1 0-364,11 0 371,12 12-332,-12-25 487,17-4 200,-3-11 1494,-4-23 662,-12 14 842,-1-52-1472,-13 33-381,1-32-92,-6 10-896,-1 12-909,0-12-491,0 24-1020,0 25-1665,35 34 2548,-26 7 1367,15-10 0,3-2 1,-5 2-1,16 8 1</inkml:trace>
+  <inkml:trace contextRef="#ctx0" brushRef="#br0" timeOffset="118413">16660 7343 24539,'34'-18'2176,"23"3"-1418,-35 2-530,30 3-64,3 4-380,-13 2-53,21 17-793,-34-10-66,-3 31-4145,-12 2 4794,-12 11 1,-14 10 0,-10-12 0</inkml:trace>
+  <inkml:trace contextRef="#ctx0" brushRef="#br0" timeOffset="119579">19170 7323 26248,'2'35'-6808,"-1"6"4542,-1-8 1409,0 9-161,0 11 100,0-9-72,0-4 0,0 0-112,0 10-821,0-8 1,0 1 1948,0 7 0,0 11 1,0-21-1</inkml:trace>
+  <inkml:trace contextRef="#ctx0" brushRef="#br0" timeOffset="119734">18865 7677 23639,'0'-15'-6475,"25"0"9618,-1 3-1680,27 0-971,-2 4-538,4-1 58,-7 6 1,1 1 0,-11 0 0,0 1 0,13 0 0,0 0 0</inkml:trace>
+  <inkml:trace contextRef="#ctx0" brushRef="#br0" timeOffset="120048">19945 7684 23639,'-19'5'3056,"-9"0"-2550,-21 0-451,8 0 7,3 4 144,15 1 192,3 3-383,4 5-144,7 2-1051,-7 6 310,14 2-788,-7 20 180,9-13-531,22 26-814,-16-30 531,35 7 939,-13-14 777,8-9 334,15-3 1235,-20-9 44,20-25 1231,-23 16 228,6-42-1188,-16 27-152,-4-25-992,-5 10-1219,-4-19-217,-4 12-121,-8 9 0,-4 1-2231,-14-4 170,2-6 3132,-20 19 1,38 4 0,-18 2 0</inkml:trace>
+  <inkml:trace contextRef="#ctx0" brushRef="#br0" timeOffset="120363">20567 7223 24449,'0'20'-5307,"0"28"3359,0 5 1282,6-8 0,2-1-433,-5 5 569,5-5 0,-2-1-527,-6 8 70,0 14-2408,8-4 1989,-6-14 1359,5 8 1,-4-21-1,1-3 1</inkml:trace>
+  <inkml:trace contextRef="#ctx0" brushRef="#br0" timeOffset="120564">20732 7529 24359,'0'-8'-6476,"0"1"4348,0 24 974,-14-14 3875,11 37-3653,-10-23 1219,13 20-1463,0-7-1500,0 14 1597,23-10 1030,-17 9 1,39-16-1,-19-1 1</inkml:trace>
+  <inkml:trace contextRef="#ctx0" brushRef="#br0" timeOffset="120904">21133 7793 23279,'-14'-5'-2571,"29"0"4910,-11 5-2326,34 0 49,-20-11 431,13 8-402,-16-24-779,11 13 1253,-13-16-545,-5 9-1315,-8-1-212,0 6 451,-20 1-205,15 0-804,-15 1 1597,-1-1-1236,16 5 600,-30 0 1380,31 25 177,-10 8 345,14 14-1472,0 4 54,21 9-1204,4-10 573,-1-7 1,2-1 1395,14 5 0,0 6 0,-11-17 0</inkml:trace>
+  <inkml:trace contextRef="#ctx0" brushRef="#br0" timeOffset="121254">21688 7620 23639,'0'10'-6206,"0"5"4078,17 4 923,-13 13 202,25-12 1249,-25 16-959,22-8 299,-15-11-2145,9-3 2918,-4-13 1081,-5 4-685,0-22 556,-2 12 595,1-32-1241,1 20 792,0-18 453,5-4-1235,-4 10-898,6-15 731,-11 29-375,3-11-1543,-7 24 2722,1-8-1584,0 10 1281,1 0-176,0 17-2336,2-13 539,5 48-1133,-1-28-367,4 32-1093,-3-19 3162,1 3 0,2 0 0,1-1 1</inkml:trace>
+  <inkml:trace contextRef="#ctx0" brushRef="#br0" timeOffset="121746">23170 7251 25438,'-5'-11'-7954,"-1"3"6132,3 19 2325,14 11-1860,-7 12 927,10 4-346,2-5 165,-12 2-1120,25 0 2192,-17 2-870,11-4-276,0 0 1049,-1-4-478,13 5 1098,-5-12-109,17 3-72,-16-18 185,4-1 382,-11-6-457,-3-16 24,-1 12-2,-2-33-1595,-1 17 804,-1-20 1,0 5 0,0-2 0</inkml:trace>
+  <inkml:trace contextRef="#ctx0" brushRef="#br0" timeOffset="122152">24157 7305 23279,'-48'9'2143,"19"-1"-916,-10 7-246,13-1-774,0 7-507,-9 1 338,31 2-1713,-20 3 1481,22 0-1601,-7 3 274,9-2-718,0 10 26,23-11 117,6 8-313,15-20 2781,-2 0-927,-8-11 1664,-2-2-202,1-2 779,-2 0-180,-1-14 881,-4 10-298,3-25-753,-11 11 164,3-15-1562,-15 2-2145,-1 4-94,-5 29-824,0 9 2513,19 28 0,6-4 0,20 2 0</inkml:trace>
+  <inkml:trace contextRef="#ctx0" brushRef="#br0" timeOffset="122430">24753 7469 24988,'-35'-7'-1272,"2"1"924,4 6 910,13 14-153,6 4-1170,10 16-733,19-16 422,-14 12-927,39-27 2315,-22 23-1654,37-18 992,-19 4-239,23-7 1060,-30-5 1122,7-14 521,-21 11 148,-9-26-3202,2 26 2743,-11-39-3617,5 25 131,-28-31-1568,-10 24 3059,3 5 0,-3 1 0,-20-1 1,-2-5-1</inkml:trace>
+  <inkml:trace contextRef="#ctx0" brushRef="#br0" timeOffset="122599">24147 6928 24898,'22'-10'1357,"34"-2"-1952,-29 5 551,12 0 0,4 2 0,7 1 0,-16 1 0,0 0 0</inkml:trace>
+  <inkml:trace contextRef="#ctx0" brushRef="#br0" timeOffset="123113">25938 7146 25888,'0'-23'-6566,"0"3"4528,0 4 1153,0 7 337,0 26 122,0 34 122,0 2 190,0-9 0,0 0-1482,0 4 1596,18 11-568,16-6 303,9-18 349,-5-10 0,1-3 604,13-5-187,-4-8 0,1-2 822,8-4-619,-20-1 0,-1-4 620,21-17 1299,-19-4-822,3-24-1192,-28 10-1182,-22-14-1213,4 22-370,-44-10-34,20 16-98,-30 3 1994,11 5 1,-2 2 0,1 4-1</inkml:trace>
+  <inkml:trace contextRef="#ctx0" brushRef="#br0" timeOffset="123540">26968 7304 24718,'-34'-10'-2010,"-10"2"1698,14 3 619,-5 2 188,13 2-194,5 20-38,5 3-663,6 21-928,6-11 257,24 8-580,2-19 680,3 6-339,13-18 1092,-25 6-990,19-12 1905,-11 10-328,-2-12 1136,-3 3 197,1-4-358,-6 0 33,1-16-1069,-10-1 258,-2-15-1828,-4 4-365,-17 3 1283,0 4 1,-3 11 0,7 4-1</inkml:trace>
+  <inkml:trace contextRef="#ctx0" brushRef="#br0" timeOffset="124697">27883 7346 25888,'-53'-5'-235,"3"1"439,1 4 186,9 17 860,10 3-896,14 11-1252,3-3 132,12-4-741,-3-2 461,4 3-407,16-1-377,-12-1-906,29 8 1020,-7-11 885,-3 5-133,33-9 1918,-34-7-573,39-1 769,-33-6 233,9-2-158,-25-17-1146,0-3 222,-12-19-1885,-23 1-1532,-4 8 3004,-1 2 1,-18 11-1,16 0 1</inkml:trace>
+  <inkml:trace contextRef="#ctx0" brushRef="#br0" timeOffset="124970">28325 6726 23819,'-13'48'-4163,"9"-10"1778,-9 6 2011,13-8-778,0 5 384,0 21-50,0-14-313,0 13-1635,0-22 2632,0-1 1,0-5 0,0-1 0</inkml:trace>
+  <inkml:trace contextRef="#ctx0" brushRef="#br0" timeOffset="125229">28720 7037 25078,'-22'-4'-1009,"-14"1"1604,12 1-385,-18 16 1031,1 7-399,8 19-1221,14-4-423,9 2-761,10-6-28,0-2-1407,0 14 741,25-11-1886,0 17 3623,4-23 0,13 2 1,-14-13-1</inkml:trace>
+  <inkml:trace contextRef="#ctx0" brushRef="#br0" timeOffset="125397">29048 7358 25258,'1'-11'-7825,"0"22"2812,-1 5 4741,0 23 1,0-20 0,0-2 0</inkml:trace>
+  <inkml:trace contextRef="#ctx0" brushRef="#br0" timeOffset="125552">29055 6897 21570,'14'-7'1472,"4"1"0</inkml:trace>
+  <inkml:trace contextRef="#ctx0" brushRef="#br0" timeOffset="125898">29402 7428 23459,'18'1'-58,"0"0"259,1-1 168,1 0-40,1 0-289,-2-17 253,-2 13 380,2-29-965,-10 29 1046,2-34-1843,-11 25-395,-23-40-696,0 28 752,-20-26-69,21 27-528,-9-10 860,17 16-1252,-10-1 1885,12 28 1517,6 25-787,6 6-1254,9-4 0,1 0-820,-5 4 1814,14-13 0,3-1 0,-3 8 1,20-2-1</inkml:trace>
+  <inkml:trace contextRef="#ctx0" brushRef="#br0" timeOffset="126180">30037 7137 24359,'-18'-8'-3537,"4"2"2500,6 2 717,6 20-935,17 7-233,10 22 213,2-8 608,14 1-810,-13 3 447,8-8 440,2 20-503,-25-22 59,1 17 861,-14-23 298,0 7-379,0-15-944,-25-1 2104,19-3-380,-40-1 1,27-4 0,-19-1 0</inkml:trace>
+  <inkml:trace contextRef="#ctx0" brushRef="#br0" timeOffset="127170">17555 9408 24988,'0'30'-6475,"0"2"4346,0-2 885,-16 5 1971,12 4-1337,-4-6 0,-1 1-173,-1 18-189,9-6 1,-1 0 600,-8 5 0,10 13 1,0-23-1</inkml:trace>
+  <inkml:trace contextRef="#ctx0" brushRef="#br0" timeOffset="127352">17217 9989 24629,'-2'-14'-7014,"23"2"10620,-16-1-4194,48 2 1737,0-7-928,-20 10 0,3 0-335,3-2 1,1-1 203,5-2 0,-1 1 0,-9 2 0,0 1 0,11-4 1,-1 1-1</inkml:trace>
+  <inkml:trace contextRef="#ctx0" brushRef="#br0" timeOffset="128530">14632 9921 23999,'0'-6'-4767,"0"0"2819,0 25 974,0 9 425,17 16-845,-12 3 1194,13-9-605,1-1-1258,-2 16 1437,6-17 411,14 18 4,-23-29-45,18 2 1304,-10-13-422,-7-7 746,10 0 297,-8-7 374,11-18-151,-8-10-957,6-9-144,-6-7-1171,-2 9-214,-1-6-1459,7-20 1940,-8 13 1,5-11 0,-9 20 0</inkml:trace>
+  <inkml:trace contextRef="#ctx0" brushRef="#br0" timeOffset="128902">15605 10040 24359,'0'-33'-4587,"-17"14"2767,13-6 211,-26 22 3367,27-16-2905,-22 18 2361,12-7-1192,-2 26-261,-4-13 2302,17 39-1945,-13-22 1382,13 27-2846,-5-9 1996,7 3-2192,0 1 979,0-2-795,25 16-1392,2-17 2579,-2-11 1,0-1-1092,2 1 1135,7 3-76,-30-16-222,11-4 644,-5-4-159,-8-1 71,8-2-267,-36 1 1681,-5-4-411,-17 0-358,6-2 403,7-1-1053,5 1 260,-2-1 1,7 0 0,0 0 0</inkml:trace>
+  <inkml:trace contextRef="#ctx0" brushRef="#br0" timeOffset="129414">18347 9384 26338,'-39'-2'-199,"16"19"999,-7-13-272,17 44-2404,-13-21 1965,6 31-1094,1-6 230,0 7-364,0 4 447,10-30 0,0 0-482,1 0 0,1 2-619,-2 13 1,1 1 1195,2-13 1,0 0-718,-1 10 0,2-1 1191,-1 13 1,2-6 0,1-2 0</inkml:trace>
+  <inkml:trace contextRef="#ctx0" brushRef="#br0" timeOffset="129876">18713 9928 24898,'2'-13'-4896,"0"3"3118,-2 1 344,0 4 753,-22 0 1769,0 3-143,-22 16 553,6 6-1056,5 17 228,15-6-49,8 6-307,10-15-854,24 6-924,1-17 743,23-2-152,-5-9 431,-4-16 1549,-16-4-241,0 1 781,-21-14-1164,6 16 556,-8-12-1869,0 8-390,-16 25 1663,13 20-2363,-13 13 1036,16 11-807,0-6 1568,0 6-720,23 2 204,-17 0 399,14-14 0,2-1-2258,-2 15 2032,-2-9 1,-1-2-976,2 1 815,-7 8 154,-5-22-72,-5-3 1024,5-5-994,-27 3 1592,15-11-1490,-33 2 892,9-11 0,-16-18 1,-4-7-1</inkml:trace>
+  <inkml:trace contextRef="#ctx0" brushRef="#br0" timeOffset="130068">19368 9942 24449,'11'0'90,"2"14"-4440,-5 3 915,2 19 1480,-7-8 979,1 3-136,-2-9 115,1 3-1693,0-3-347,1-1 2901,1-2 1,2-2-1,-1-2 1</inkml:trace>
+  <inkml:trace contextRef="#ctx0" brushRef="#br0" timeOffset="130247">19473 9426 23099,'0'-12'-8364,"0"4"8231,22 22 0,-17-10 1,17 13-1</inkml:trace>
+  <inkml:trace contextRef="#ctx0" brushRef="#br0" timeOffset="130619">20150 9736 24808,'-24'7'3297,"17"2"-4603,-37 2 2595,17 13-1418,1-4 177,-16 9 143,37-6-1522,-31 1 1756,32 1-2276,-22 10 1784,24-9-2386,-7 18 822,9-21-665,22 8-420,-17-14 1156,40-2 73,-24-5 1391,23-3-65,-10-4 1221,3-2 29,11-16 1090,-11 11-12,14-28 774,-28 7-1374,1-18-826,-18 6-1106,-3 2-481,-3 13-448,0 2-705,0 4 205,0 3-726,0 2-301,0 38 1045,0-1 647,0 24 906,14-2 0,2-21 1,13 7-1</inkml:trace>
+  <inkml:trace contextRef="#ctx0" brushRef="#br0" timeOffset="130952">20590 9900 23999,'0'34'-6116,"0"3"3988,0-3 254,14-3-442,4-14 2069,13-6 1028,-6-26 999,-4 12-1452,-4-33 511,-2 18 538,2-21-296,1 7 838,2-2-305,6-13-933,-6 13-1085,3-6-123,-9 21 1133,-1 8-263,-3 4 1027,0 7-769,-1 0-126,2 16-1714,6 16-722,-2 9 687,-2-5 0,1 1-1217,3 12 747,-4-16 1,1 0 1338,2 1 1,1-2 0,15 15 0,-10-17 0,-1-1 0</inkml:trace>
+  <inkml:trace contextRef="#ctx0" brushRef="#br0" timeOffset="131213">22108 9331 25978,'-19'-4'-1212,"-11"2"1332,16 1 158,-2 22-400,5 9-806,11 13-630,0 5 547,0-7-676,0 5 192,0 2-468,0 1-265,17 0-626,-12 0 1225,25-3-240,-15 12 465,1-19 1226,6 7 0,-20-22 0,8-2 1</inkml:trace>
+  <inkml:trace contextRef="#ctx0" brushRef="#br0" timeOffset="131346">21873 9755 24359,'-9'-26'-9173,"2"2"6028,7 0 2289,0 3-628,26-7 2607,11 8-562,15-3 1,0 11-1,-13 2 1</inkml:trace>
+  <inkml:trace contextRef="#ctx0" brushRef="#br0" timeOffset="131630">22575 9708 24629,'-21'5'1736,"-14"0"-1215,30 4-2260,-26 4 2817,17 1-1119,-3 3-188,7-1-420,10 0-857,0 1-817,0 8 235,0-9 596,24 9-994,7-15 1704,24-1 560,-11-7 403,-6-2 1236,-12 0-91,-3-19-92,-3-2 111,-9-22-1365,-2-1-1007,-26 8-1562,12 0 2147,-33 15 0,32-1 0,-14 3 0</inkml:trace>
+  <inkml:trace contextRef="#ctx0" brushRef="#br0" timeOffset="131900">22993 9725 23099,'0'13'-6115,"0"3"4076,0 2 975,0 4 425,0-1 214,0 2 211,0 10-15,0-8-1367,0 12 1506,0-18-90,0 2 90,0-12-90,0 0-269,0-5-901,13 0 1800,6-2 78,-2-23 0,13 16 1,-12-15-1</inkml:trace>
+  <inkml:trace contextRef="#ctx0" brushRef="#br0" timeOffset="132046">23245 9696 24629,'14'-11'2335,"5"-6"-2508,-5 15 648,8 11-1882,-9-5 687,4 35-1891,1-4 625,-6 10 421,-2-12 0,0 0-1677,-2 5-890,3 24 395,-6-32 3486,-2 5 0,-2-16 0,-1-2 0</inkml:trace>
+  <inkml:trace contextRef="#ctx0" brushRef="#br0" timeOffset="132284">22393 9264 24629,'-7'-16'-8314,"3"3"5812,2 1 1785,2 3 649,0 3 173,27 2 2028,5 2-680,16 2-1453,-5 0 1921,-10 17-1343,-1-13 391,-1 29-1851,-2-29 1231,0 27-3566,-3-28 2876,-1 29 0,-1-20 0,-1 13 0</inkml:trace>
+  <inkml:trace contextRef="#ctx0" brushRef="#br0" timeOffset="132432">22880 9112 25258,'24'-17'164,"16"3"528,-23 3-1385,20 2-116,-8 3 751,3 2 0,0 2 1,0 2-1</inkml:trace>
+  <inkml:trace contextRef="#ctx0" brushRef="#br0" timeOffset="132797">24127 9292 27417,'-6'-1'-1073,"21"22"-3441,-12 11 2319,35 13 1078,-32 6 225,28-7-7,-31 5-148,21 3-1980,-21 1 1156,7-15 1,2 1 507,-2 17 703,-4-19 0,0 0 611,6 7 0,-11 0 0,3-4 0</inkml:trace>
+  <inkml:trace contextRef="#ctx0" brushRef="#br0" timeOffset="132931">24000 9836 24539,'0'-34'-7106,"0"1"4348,0 1 885,24 3 2542,-18 1-376,26 9 0,6 2 0,-6-9 0,5 9 0,-1 0 0</inkml:trace>
+  <inkml:trace contextRef="#ctx0" brushRef="#br0" timeOffset="133480">24885 9567 24359,'-23'19'1441,"17"-1"-4209,-34-1 4787,35 1-3559,-31 1 2653,31 1-2190,-28 2 1673,29 2-1800,-20 0 1000,21 14-188,-6-9-1432,9 19 1340,22-22-2342,8 10 1979,12-19-581,3 1 1540,7-13-461,-10-1 1015,-5-13 0,0 0 794,7 4-411,-15-13 1,-2 0 890,8 13 31,-3-34-1329,-6 21 598,-6-19-1309,-4 10-359,-8-1-358,-2-7-827,-5 9-130,-1-10 258,-18 21 520,1 2-685,-5 24 2883,9 12-1369,13 19-457,0-6 377,19-11-216,-15 5-139,31-17 1183,-11 21-1422,9-22-374,0 6 709,1-16 1983,-8 4-461,15-20 1533,-19 10-468,4-25-1591,-9 25 1884,-5-32-2407,0 20 1345,-1-25-2288,-2 16 617,-1-7-1275,-3 20 568,0-5 158,-3 16 992,3-4 766,-2 22-2510,4-13 1603,0 33-1631,7-6-30,0 10-1185,11 14 458,-5-24 1877,15 15 0,-12-25 1,6 4-1</inkml:trace>
+  <inkml:trace contextRef="#ctx0" brushRef="#br0" timeOffset="133668">25677 9007 25978,'0'-10'-9831,"0"3"9039,0 20 0,18 8 0,5 18 0</inkml:trace>
+  <inkml:trace contextRef="#ctx0" brushRef="#br0" timeOffset="133862">25120 10568 27057,'-1'12'-6596,"1"-3"7367,-1-4 1,21-21 0,4-8 0</inkml:trace>
+  <inkml:trace contextRef="#ctx0" brushRef="#br0" timeOffset="134846">26500 9783 24808,'-11'-16'-6207,"8"0"3885,-8 5 2370,11-1-115,0 3-37,0-2 81,0 0-39,0 2-1534,0 1 1956,0 2 162,0 1-603,0 0-549,12 2 1984,3 2-244,0 17-2291,17-12 1265,-17 27-1954,17-27 1703,-9 33 122,3-19 1,-4 19 0,1-8 0</inkml:trace>
+  <inkml:trace contextRef="#ctx0" brushRef="#br0" timeOffset="135031">26432 10159 25168,'58'0'-1259,"-9"0"-90,4-14 354,-10 11 1016,4-11 1,2 14 0,0 0 0</inkml:trace>
+  <inkml:trace contextRef="#ctx0" brushRef="#br0" timeOffset="135413">27732 9811 26068,'-18'11'1818,"4"-24"-6174,28 2 5414,-10-19-2960,22-3 2172,-23 7-1329,25-2 1652,-15-13-1673,4 11 291,-7-9 1233,-10 8-2319,0 7 1742,0-10-1198,-17 18 1108,13-4-1635,-26 12 2446,27 2-2149,-10 28 2092,13-3-531,0 26-270,0 18-179,17-9-287,-15-14 1,0 0 155,14 20-2119,2 1 1588,-14-3 678,32-3 0,-21-5 1,15-2-1</inkml:trace>
+  <inkml:trace contextRef="#ctx0" brushRef="#br0" timeOffset="135713">28273 9580 25078,'-12'-13'-6382,"10"2"2913,-10 5 4026,12 1-1145,0 23 47,23 8 215,-18 13-278,43 3-711,-28-8 920,23 0 1198,-10 1-1459,0-2 740,-2 0-94,-2-5 158,-3 0 143,-5-5-511,-3-4 263,-3 1-1313,-7-8-40,-1-1-324,-24-8 2226,-8-1-315,-23-2 1,7-16-1,-3-4 1</inkml:trace>
+  <inkml:trace contextRef="#ctx0" brushRef="#br0" timeOffset="135838">28232 9567 23279,'29'-34'-553,"-3"1"312,27 3 1502,-6 2-992,-12 11 0,0 1 41,22-5-1201,-11 5 1,1 3 907,5 3 0,13 1 1,-24 7-1</inkml:trace>
+  <inkml:trace contextRef="#ctx0" brushRef="#br0" timeOffset="136297">29278 9499 25438,'0'43'-5756,"0"-4"3628,20 3-182,-16-5 1431,16 2 17,-3 22 201,0-14 156,3 14-1820,-8-22 1651,-1-4 119,-9-4 1104,15 4-914,-16-14-279,8 3 497,-8-17 201,3-19 1117,-1 8 673,3-48-1075,1 26-416,1-10 0,0-2 945,4-4-336,7-13 912,-1 11-434,-5 13-977,10-1-412,-10 23 1541,11 4-45,-9 5-363,13 18-1398,-12 12-1000,6 11-492,-9 4-273,-1-8-854,0 2-1706,9 17 142,-4-15 3891,8 9 1,-3-22-1,0-2 1</inkml:trace>
+  <inkml:trace contextRef="#ctx0" brushRef="#br0" timeOffset="136736">30105 9671 24179,'0'-10'-5846,"-14"4"5848,10 23-760,-17 8 1880,19 11-2191,-5 11 516,7-18-369,19 16-1450,-14-21 1984,28 3-198,-16-9 246,14-9 22,-6 0 1264,-3-9 435,-11-21-1,-4-1 318,-7-20-1220,0 5-837,0 7 470,-13 12-1551,10 25 1330,-10 25-676,13 10 321,0-2 0,0 0-98,0 17 563,0-18 0,0 1-90,0 18 180,0-1 185,0-3-1120,0-3 305,0-4 900,0-6-180,0-4 179,0-9-179,0-5-360,0-2-1439,0-9-899,-16-2 2783,-3-9-122,-1-22 1,-7 16-1,13-16 1</inkml:trace>
+  <inkml:trace contextRef="#ctx0" brushRef="#br0" timeOffset="137602">30773 9479 26068,'-14'-8'-4092,"10"2"339,-28 3 5427,11 2-408,0 15-78,-8 8-352,17 10-1745,-3 18-547,7-13 948,8 10 325,0-10-1574,25-3-369,-19 1-584,43 5 1030,-16-12 1067,24 6 477,-10-24 882,-4-1 429,-16-9 511,-1 0 140,-4-20 115,-5 15 50,-7-39-1616,3 26 716,-12-36-1843,6 23 440,-7-21-1284,0 26 0,-15-5-592,11 14-380,-10 28 3989,14 7-2606,0 32 1034,18-10-993,-13 2 210,28-1 448,-15-13-194,14 14 430,-15-23-2127,10-2 2491,-17-13 231,10-4 1801,0-17-233,-8 13 888,5-37-229,-6 7-1277,-4-12-35,1-15-1036,-6 26-376,-1-10-1110,-1 20-256,0 2-707,0 6 1740,0 4-142,0 21 257,0 13 121,0 14-213,16 3-560,-12-5 420,25 0-189,-9 13-146,6-13 656,13 15 32,-17-26 390,15 2 263,-19-17 1295,5-4-186,-13-3 335,-4-16-326,-2-7-783,-3-10-132,-1-2 152,0-4-893,-17 8-1081,13-5-374,-13 14-177,4 1 570,10 31 1518,7 10-678,0 24 173,29 5-96,-21-18 1,0 0 123,22 21 60,-11-9 1,-1 1-310,4 8 330,-6-11 0,-1-1-1220,0 2 1155,2 8 12,-8-17-139,-6-12-595,-2 2-877,-28-17 2626,-28-19-568,-2 9 0,18-10 1,1-3-1,-8 0 1</inkml:trace>
+  <inkml:trace contextRef="#ctx0" brushRef="#br0" timeOffset="137789">30920 9128 25528,'49'-3'-421,"1"1"-441,0 0-181,2 2-25,-16-1 1,-1 2 949,21 17 1,-22-16-1,0 0 1,12 15-1</inkml:trace>
+  <inkml:trace contextRef="#ctx0" brushRef="#br0" timeOffset="138246">31833 9893 24449,'32'-55'-1568,"0"3"1,-4 1 0</inkml:trace>
+  <inkml:trace contextRef="#ctx0" brushRef="#br0" timeOffset="163646">1648 13276 25528,'34'-30'182,"-14"4"-913,5-1 722,-21 5-2093,24-5 2638,-17-1-1216,18-16 494,-11 7-299,-5 4 0,-1-1-376,0-10-29,1-15-168,-10-7 854,-1 14-565,-1 6 1,-2 0 66,-16-9-108,15 20 1,0 0-31,-14-10-599,-3 4 372,14 4 585,-26-3 194,28 13 12,-22 0 347,21 16-345,-9 5 1248,6 3 562,0 1 446,-2 39-1280,4-11-41,5 34-419,0-26 1,0-1-156,0 21 245,0-5 0,0 1-1092,0 9 309,6-21 1,2 1-198,-8-2 0,3-2-45,23 19-129,-19-10 0,-2 0-215,9 3 6,1-7 1,-1-1-557,-1 4-72,19 11 1604,-12-18 0,3-5 0,1 1 0</inkml:trace>
+  <inkml:trace contextRef="#ctx0" brushRef="#br0" timeOffset="163979">2505 12958 25168,'-42'0'720,"17"17"62,-5-13-421,26 30-2693,-26-30 2890,15 46-1640,-3-29 1076,7 28-1149,11-13-442,0-10-292,22 13-538,7-21 2800,24 3-1468,-10-15 1769,-2-1-559,0-23 1643,-11 14 32,12-34-142,-23 12-450,-3-25-1383,-12 11-537,-4-1-962,0 15-246,-21 0-1128,15 3-1435,-32-5 4164,16 12 1,1-4 0,4 10 0</inkml:trace>
+  <inkml:trace contextRef="#ctx0" brushRef="#br0" timeOffset="164495">3215 12730 25258,'-24'18'1236,"-18"-14"-964,37 32-3143,-39-32 3526,22 42-1333,-4-28 1153,0 24-1099,24-8-1114,-7-10-469,26 15-628,9-19 2219,24 7-825,-7-16 1552,3-1-852,-12-8 1020,-1-2 1278,-2 0-558,7-17 2083,-12-5-966,6-21-1061,-23 9-893,-1-13-496,-8 20-668,0-7-325,0 13-179,-16 4-831,12 2 91,-12 4 1351,2 1 820,10 24 116,-10 13 1002,36 34-1634,5-3 205,-15-26 1,3 1 242,15 6 1,-2 0 446,-6 21-822,9-9 1,1 0-45,-7 6 217,-6-13 0,-3-2-1340,-5 2 2088,1 6-532,-12-15 157,0-12-1419,-23 6 2318,-10-19 288,-12-1-266,-2-7-508,10-2 1,2-21 0,0-6 0</inkml:trace>
+  <inkml:trace contextRef="#ctx0" brushRef="#br0" timeOffset="164696">3910 12860 25078,'4'44'-6562,"-2"-11"4263,-1 1 1349,-1-10 358,0 3-372,0 0-355,0 1 61,0-3-1868,0-3 3165,0-1 0,0-3 1,0 0-1</inkml:trace>
+  <inkml:trace contextRef="#ctx0" brushRef="#br0" timeOffset="164879">3897 12442 25528,'0'-11'-6655,"0"3"4346,0 3-2263,-7 3 4466,5 15 0,16-9 0,12 10 0</inkml:trace>
+  <inkml:trace contextRef="#ctx0" brushRef="#br0" timeOffset="165247">4508 12780 24988,'0'12'-5216,"0"1"3268,0 1 973,0 0 427,0 0 212,0 0-58,0 1 256,0 1-1369,0 1 1417,0 1 180,14 8-568,-10-5 65,10 3-44,-4-7-26,-7-4 18,7-1 142,-4 0-1592,-5-6 1531,4-21 1523,-5-13-636,0-25 224,0 9 295,16-7 135,-12 24-356,25-5 1706,-17 23-238,13 0-687,-5 9 14,0 0-180,5 17-1465,-7 5-2608,17 24 881,-16-9-1529,6 5 2743,-7-10 1,0 0 0,1 1 0</inkml:trace>
+  <inkml:trace contextRef="#ctx0" brushRef="#br0" timeOffset="165435">5435 13120 26967,'0'0'0</inkml:trace>
+  <inkml:trace contextRef="#ctx0" brushRef="#br0" timeOffset="168263">5807 12116 24359,'-28'32'-490,"-20"3"1968,26 7-2388,-24 4 1294,11 5-461,15-13 0,-1 5 0,2-2-237,1-1 1,2-1 157,-2 3 0,1 4 0,3-1-411,5 6 0,3-3-19,2-9 1,1-2-307,0 12 1,3-2-191,17 17-1126,-13-3 1155,14-31 0,-1 0-861,-12 28 819,14-31 0,1 0-420,-15 27 117,40-6-108,-26-1 1436,20-5 1,-11-3 0,-1-3 0</inkml:trace>
+  <inkml:trace contextRef="#ctx0" brushRef="#br0" timeOffset="168780">6392 12869 24988,'-34'-2'-6,"0"16"2123,7 5-1945,3 12-1036,9-2-163,-1-4 400,14 1-1058,-8 10 413,10-9-548,0 13-682,24-21 735,-17 1-176,39-14 2421,-16-2-321,23-18 1861,-11 10-668,2-41 535,-29 27-95,11-40-991,-19 30 688,3-11-1867,-6 6-620,-4 11-1204,0-9 531,-14 19 391,10 24 543,-11 4 1342,15 28-950,9-11 0,4 2-841,11 25 691,0-2 1,1 2 207,-7-21 1,-1-1-27,2 12 1,-2 1-78,-5-16 1,-1-1-87,0 0 1,0-1-1377,7 30 1854,-9-22 1,0 0 381,0 16-196,-5-13 0,-1-2 257,-3-2 96,-27 7 748,20-23-748,-48-5 1411,31-5-370,-24-7-471,10-4-247,1-3-691,2-20 0,4 1 0,3-20 0</inkml:trace>
+  <inkml:trace contextRef="#ctx0" brushRef="#br0" timeOffset="169301">7255 12934 24179,'-25'-1'705,"-14"1"-661,22-1-58,-14 1 425,34 0-18,11 0 171,22 0-366,0 0-198,-7 0 49,0 0-41,-5 0 62,0 0 20,-3 0-180,10-14 696,-6-5-293,8 0 66,-9-12-644,-3 18 668,-2-14-798,-3 8 195,-3 2-118,-3 1-659,-1-4 37,-5 6-534,-1-7 603,-3 10-1039,-18 0 1272,-6 6 472,-13 2 321,14 20 548,-6 5 325,16-1-441,-4 32-282,8-30-283,17 15 0,4 2-1175,-6-4 60,21-4 0,6-3-725,-7-2 521,12-9 0,4-3-141,3 0 803,-4-6 0,1-3 719,9-2 169,-16-2 0,-1-2 866,13-15-398,1 12 0,0-33 0,0 9 0</inkml:trace>
+  <inkml:trace contextRef="#ctx0" brushRef="#br0" timeOffset="169529">8287 12491 25258,'-22'-17'-4303,"5"3"2423,3 5 2270,11 2-2287,-11 20 3529,14 9-2347,0 24 179,17-2-1793,-13 4 1749,29-9 67,-29 0-337,30-1 883,-19-1-2918,14-1 2230,-8-2-861,7 10 1288,-9-13-1344,13 11 431,-19-23 1088,1 2 0,-10-13 0,-3-2 1</inkml:trace>
+  <inkml:trace contextRef="#ctx0" brushRef="#br0" timeOffset="169663">8123 12784 23819,'-8'-17'-7782,"1"2"4688,7-1 2958,0-4-90,26 5 2565,-3-4-2136,10 10 0,5 2-239,13-5 101,-16 4 0,1 2 0,20-2 0,1 2 1</inkml:trace>
+  <inkml:trace contextRef="#ctx0" brushRef="#br0" timeOffset="170012">8843 11698 24539,'44'0'359,"-18"21"-3403,10-16 3555,-17 41-3451,20-25 2748,-13 11 1,-1 3-754,16 11 617,-14-14 0,0 3-549,-1 3 0,-2 1-115,-5-9 1,-1 2 645,10 24 0,-2 1-697,-13-22 1,-1 0 1178,2 25 0,-2 1-485,-6-25 1,-4 0 408,-10 25 0,-3 1-359,11-25 1,-5-2 229,-21 12 0,-7 1-836,3 0 0,-2-2 1203,-7-9 0,-4-1 0,-4 11 0,0-1 1,10-14-1,0 0 0</inkml:trace>
+  <inkml:trace contextRef="#ctx0" brushRef="#br0" timeOffset="170797">10725 12440 26158,'-32'0'-2339,"5"0"1260,9 0-1,6 15 920,0-12 0,3 24 0,-1-10 0</inkml:trace>
+  <inkml:trace contextRef="#ctx0" brushRef="#br0" timeOffset="170925">10620 12861 25438,'0'9'-1439,"0"0"0,0-5 0,0-1 0</inkml:trace>
+  <inkml:trace contextRef="#ctx0" brushRef="#br0" timeOffset="171945">12185 11849 26697,'11'-16'-628,"-8"2"-1451,8 6 3906,-4 5-442,-5 20-3574,9-13 1826,-10 41-1064,7-1-852,-6 15 884,1-12 1,-1 0-3,0 16-820,-2-8 1,0 1-1179,0 11 3436,0-25 1,0 0-1,0 11 1,0-3 0</inkml:trace>
+  <inkml:trace contextRef="#ctx0" brushRef="#br0" timeOffset="172097">11968 12544 24539,'-1'-28'-6017,"1"-1"3934,0-3 1185,28-2 2489,-5-4-1006,29-1 640,-9-2-1105,6 0-1065,-9 12 1,1 1 1396,-8 7 1,0 0-148,11-7 0,0 2 1,-11 9-1,-1 1 0,1 1 1,0-1-1</inkml:trace>
+  <inkml:trace contextRef="#ctx0" brushRef="#br0" timeOffset="172812">12938 11743 23999,'-40'0'2339,"16"18"-1642,0 7-775,21 12-2221,-7 3 1196,10-4-170,0 5 251,0 5-574,0 3-1,0 3-193,17 3-330,-13-1 1831,13 2-788,-17-2 1077,13 0-565,-9-4 76,9-3-1042,-5 11 806,1-19 260,7 12-269,-4-30-268,0-2 285,-4-14 1512,2-2 241,6-18 1139,-2-10-847,16-24 348,-10 5-491,-1 13 0,1 1 817,4-3-249,7-8-633,-12 20-67,0 10-101,-1-1 234,0 11-236,-2-5 433,0 6-842,7 18-1447,-4 8-524,12 25-479,-12-9-801,6 5 340,-6-15 61,-1-1-472,0-2 742,1-4 1232,-1-3 591,3-4 110,7-5 1324,-3-6 44,13-3 703,-13-20 337,5 12-90,-10-35-958,-2 21 522,-3-22-468,-1-3-954,-5 10-507,-1-16-945,-5 24-21,-3-4-600,0 37 783,0 8-544,17 28 42,-12-10 561,26 1 26,-28-13 227,29-10 1140,-18 10-1098,16-19 1695,4 16-537,-8-17 1540,19 4-456,-19-24 374,16-5 360,-22 0-1866,5-18 1055,-14 24-1690,-2-20 277,-3 13-1041,-1-6-47,-2 7-1115,-2 27-1118,-1 17 1018,0 22-1167,16 14 153,3-21 3000,1 8 0,20-17 1,-10-3-1</inkml:trace>
+  <inkml:trace contextRef="#ctx0" brushRef="#br0" timeOffset="173029">14697 12341 25168,'-17'-7'-1973,"13"1"-1665,-28 3 5205,13 1-706,-14 22 472,15 5-1307,6 12-1261,12 10-991,17-16 224,-13 9 1235,40-13-684,-23-4-692,25-1 102,-11-5 407,2-2 1746,-2-8 0,-2 2 0,-2-3 0</inkml:trace>
+  <inkml:trace contextRef="#ctx0" brushRef="#br0" timeOffset="173262">13873 12080 24449,'-13'-13'-4150,"4"3"2181,5-7-60,22 8 4989,7-6-1058,-2 8-1479,20 0-521,-15 5-811,11 2 214,6 36 632,-22-11 0,5 35 0,-12-19 1</inkml:trace>
+  <inkml:trace contextRef="#ctx0" brushRef="#br0" timeOffset="173412">14090 12988 24988,'-7'20'-2254,"5"-3"-184,-6-6-2738,8-3 5157,16-4 1,-12-2 0,11-2 0</inkml:trace>
+  <inkml:trace contextRef="#ctx0" brushRef="#br0" timeOffset="173696">15542 12053 27507,'-17'46'-3550,"4"-8"2264,13 6-676,-8 19 1279,5-9 346,-1-17 1,0 1-64,4 16-195,0 0-1271,16-2 250,-12-2 267,26-3 367,-26-4-1236,27 9 860,-7-17-597,15 10 991,-4-27 1201,-4-3 0,-9-11 0,1-3 0</inkml:trace>
+  <inkml:trace contextRef="#ctx0" brushRef="#br0" timeOffset="173997">15925 12665 24808,'9'-13'-644,"3"3"1753,-3 10-865,4 0-98,-3 0-48,2 0 61,0 13-1723,2-9 990,2 24-990,8-10 183,-3-1-541,16 11 388,-11-15 202,34 3 734,-25-7 1234,-1-6 1,-1-6 14,-3-16 1844,16-4-214,-23-12-823,3 2-130,-13 7-749,-3 1-555,-2 0-392,0-3-812,-4 13-175,1-8-334,-3 21 2263,1-6-1266,0 8 1355,1 0 91,1 16-2175,1-11 898,3 24-2505,6-9 1081,-5-2 1420,10 13 0,-11-18 0,5 13 0</inkml:trace>
+  <inkml:trace contextRef="#ctx0" brushRef="#br0" timeOffset="174179">16393 12033 25438,'0'-17'-8904,"0"2"5696,0 25 2810,23-11 0,-18 38 1,17-13-1</inkml:trace>
+  <inkml:trace contextRef="#ctx0" brushRef="#br0" timeOffset="174516">16895 12649 23729,'12'2'-768,"8"0"536,-3-1 433,15 1 50,-12-2-40,18-17 774,-13 13-646,5-24-331,-8 25 588,-3-21-621,0 21 817,0-32-1059,-9 22 686,0-26-2005,-10 21 382,-20-8-473,14 13-812,-33 0 2321,15 9-463,-15 2 1123,15 19 65,-5-13 832,18 45-1228,-4-29 438,7 43-173,8-31-2107,0 10-1412,25-7 540,4-11 2294,28 6 1,-11-19 0,1-1 0</inkml:trace>
+  <inkml:trace contextRef="#ctx0" brushRef="#br0" timeOffset="174851">17438 12579 24629,'3'-8'-2745,"0"2"1356,1 6 2603,1 0-397,1 0-331,1 0-140,-1 14-2325,3-10 1171,-1 21-537,1-22 1778,0 20-2603,3-10 661,-1 2-406,8 0 540,-7-13 3464,3 4-2156,-3-6 2256,-1 0-1556,3-14 1448,0 10 203,1-25-818,3 25 861,10-28-2192,-6 13 1155,14-12-1114,-18 13-166,5 8 827,-5 10-1432,-6 0 1225,6 14-2319,-8 8-936,4 17-66,-7-6 38,1 0-227,-4-11-2200,-3-3 4665,0 2 0,-1-5 0,0 1 0</inkml:trace>
+  <inkml:trace contextRef="#ctx0" brushRef="#br0" timeOffset="175046">16850 11987 26068,'-3'-38'-5966,"1"2"3887,22 4 3276,-15 3-1638,39 2 2289,-38 4-2358,46 5 1466,-28 6-1161,24 5 1030,-13 4-461,-5 3-1655,-1 24 1084,-5-1 0,-11 26 0,-3-6 0</inkml:trace>
+  <inkml:trace contextRef="#ctx0" brushRef="#br0" timeOffset="175179">17068 13097 26877,'-6'23'-4297,"1"-4"1846,5-5-4452,0-6 6636,0-3 1,0-3 0,0 0 0</inkml:trace>
+  <inkml:trace contextRef="#ctx0" brushRef="#br0" timeOffset="175768">19227 12846 26517,'24'-8'2846,"11"0"-2322,-32-3-2919,36-4 3568,-19-4-1419,19-4 581,7-18-456,-12 6 52,-7 4 1,0-3-907,0-9 464,-7 6 0,-3-1 777,-3-9-2112,1-13 738,-13-4-844,-1 17 1046,-9 4 1,-1 0-869,4-6 877,-13 8 0,-1 1-848,14 0 755,-27-16 359,15 40 221,1 14 1630,-6 20 628,20 42-1370,-7-10-129,8-13 1,2 1 320,-1 25-518,0 3-10,-1-33 0,2 1-750,8 12 0,5-2-672,-2-11 0,4 0-555,11 17 0,4-3 610,14 0 471,-11-15 1,1-3 388,7-5 224,16-1 315,-17-18 267,2-3 1,-1-2 0,-1 0-1</inkml:trace>
+  <inkml:trace contextRef="#ctx0" brushRef="#br0" timeOffset="176480">20150 12551 25438,'4'-13'-2333,"-1"4"1464,-23-5-150,15 27 976,-30 15 1324,17 11-1398,0 20-132,4-20-850,14 13 198,0-6-134,0-13 22,22 14-760,6-27-388,26 3 1759,-12-17 968,-1-3 23,-12-3 1007,-1-18 261,-3 13 173,-1-33-164,-6 21-404,-3-19-766,-4-5-1046,-5 8-148,-3-18-957,-3 24-402,0-8 97,-14 24 901,11 18 138,-11 20 454,31 22-1480,5-9 880,-1-14 0,4-3 97,12 2 503,4-2-305,8-7 791,-12-14-361,-3 3 0,-1-2 539,4-17 3727,21-6-815,-29 2-697,2-20-1096,-18 22-152,-5-19-1207,-4 10-76,-4-7-1210,0 8-1152,-17-2-285,12 9 157,-13 24 3130,18 5-2322,0 27 825,20-1-240,6-14 929,-1 6-127,20-27 1988,-27 17-1338,20-18-1264,-12 5 1873,-4-7 642,-1 0 805,0-18-671,-7 14 1233,-2-33-3636,-8 10 1293,-4-9-1853,0 1 367,0 12-821,0-2-1,-16 12 455,13-5-1560,-13 41 3243,16-8-722,0 32 181,0-6-29,-1-5 1,2 2-39,18 22-130,-17-18 1,0 0-191,17 18 109,-7-2-484,-10-19 1,-1 1 323,12 17 74,-12-20 0,-2-2-69,1 8-309,0-5-125,0-4-1633,-18-1 2514,-10-12 596,-10-2 0,-8-15 1,8-3-1</inkml:trace>
+  <inkml:trace contextRef="#ctx0" brushRef="#br0" timeOffset="176699">20002 12243 25708,'23'-17'1771,"20"2"-209,-23 1-1388,23 1 326,-10 3-162,19-2-306,-13 7-242,13 0 133,-20 4-575,-3 1-1640,8 18 307,-11-14 13,7 26 1484,-9-14 0,-8-1 0,2-2 0</inkml:trace>
+  <inkml:trace contextRef="#ctx0" brushRef="#br0" timeOffset="176863">20743 11824 25888,'4'-19'-3954,"-1"4"2458,1 6 108,-3 22-1709,-1 21 540,0 13 2324,17 13 1,-13-7-1,13 5 1</inkml:trace>
+  <inkml:trace contextRef="#ctx0" brushRef="#br0" timeOffset="177263">22643 11948 27057,'-4'-28'-7108,"0"2"5101,2 2 1437,1 9 207,-1 31 535,2 7-367,0 33 48,0-4-1539,0 10 1851,-1-28 1,2 1-254,5 1 0,1 2-270,-6 16 0,1 0 48,4-13 1,0 0-697,-1 24 1,-2-2 19,-1 2 64,4-16 0,-1-2-40,-3-3 88,2 7 900,-4-27 1,0-5 0,0-4-1</inkml:trace>
+  <inkml:trace contextRef="#ctx0" brushRef="#br0" timeOffset="177385">22465 12544 24988,'-10'-42'-8212,"7"3"6288,-7 4-24,10 4 875,28-7 1909,-21 14-1076,29 7 0,7 4 523,-9 4 0,4 4 0,2 3 0,9 1 0</inkml:trace>
+  <inkml:trace contextRef="#ctx0" brushRef="#br0" timeOffset="177681">23425 12461 26068,'-59'0'899,"12"0"-719,5 0-90,9 0 90,0 13 869,0-9-1057,2 21 6,2-22 389,-4 36-784,17-21 326,-9 32-637,23-24-927,-5 6-148,29-13 113,-16-2-749,43-3 1495,-8-3 647,13-5 213,-17-3 1,-1-3 793,6-17 293,-10 7 0,-1-3 557,-2-21-555,-2 0 336,-13-10-2446,-13 11-1741,-14-28 105,-20 29 2486,5 5 1,-3 3 0,-21 2 0,-2-5 0</inkml:trace>
+  <inkml:trace contextRef="#ctx0" brushRef="#br0" timeOffset="177979">23922 12014 26787,'0'-10'-5756,"-17"-1"5321,13 4-1713,-12 19 4428,16 6-3099,0 42 260,0-9 196,8 0 0,0 2-545,-6-18 0,0 2 689,14 25 0,2 1-477,-5-26 0,-1-2 483,-2 12 0,3-2-1386,7-15 1,0-3 528,-6 25-515,17-4-1744,-3 6 3292,-7-17 1,5-1-1,-8-17 1</inkml:trace>
+  <inkml:trace contextRef="#ctx0" brushRef="#br0" timeOffset="178181">24308 12386 26068,'-19'-17'-4598,"14"5"290,-27 2 5923,28 6-2612,-23 1 2352,9 3-247,-7 16 122,2-12-892,10 32-164,1-19 1224,6 19-3675,2 7 1868,4-10-2709,27 20 28,-21-24 2775,24-8 0,4-2 0,-12-1 0,31 2 0</inkml:trace>
+  <inkml:trace contextRef="#ctx0" brushRef="#br0" timeOffset="178496">24422 12671 26248,'17'-10'2167,"-13"-3"-5186,29 12 3588,-30-9-1927,34 5 2054,-21-6-156,31-1 59,-19 1 127,10-3-476,-14 4 1356,-1-1-1071,-5 0 923,-1 0-1478,-6-1-297,-3-1-518,-5-7-1061,-2 1 230,-21-10-712,-2 10 471,-2-4 142,-10 9 571,30 1-875,-25 3 2083,26 2-930,-18 4 1644,19 19-324,-7 13-355,9 11-521,23 3-1443,-17-8 1274,41 0-982,-27-1 795,22-2-1312,-6-5 606,1-2 1609,4-6 0,-1-8 1,1-3-1</inkml:trace>
+  <inkml:trace contextRef="#ctx0" brushRef="#br0" timeOffset="178831">25232 12471 26158,'17'34'-8627,"-13"0"6507,30-16 2881,-30 12-1869,24-14 1119,-25 10-1294,14-11 1274,-15-24-1189,8-19 2734,-7-9-490,6-6-757,-1 10 1237,13-19-986,-4 16 1356,20-19-701,-14 30 160,8 3-218,-8 14 890,-1 8-825,0 0-494,8 23-1668,-7-18-443,-4 24 1,-2 6-2262,2-10-975,3 37 4048,-11-25 0,-4 0 1,0 0-1</inkml:trace>
+  <inkml:trace contextRef="#ctx0" brushRef="#br0" timeOffset="179482">26658 11778 27327,'0'-15'-5576,"0"1"4167,0 6 885,0 1-25,0 31 123,0-2 122,0 29-14,0-3-1278,0 10 1416,0 4-139,10-28 0,0 0-116,-9 0 1,2-1-218,15 1 0,-1-1-608,-13 31 29,18-23 1,1-1-130,-15 17 311,14-16 1,1-3-353,-10-1 1277,5 8 1,-8-30-1,-10 1 1</inkml:trace>
+  <inkml:trace contextRef="#ctx0" brushRef="#br0" timeOffset="179621">26510 12386 25438,'-9'-21'-8966,"1"2"5694,8 2 3139,0 2-127,26 2 2671,-2 1-1020,26 2-1453,-13 3 1,0 2-385,23 0 793,-3 2 1,1 0 43,-22 3 0,-2 0 0,12 0 0,0 0 1,15 0-1</inkml:trace>
+  <inkml:trace contextRef="#ctx0" brushRef="#br0" timeOffset="179946">27432 12307 24808,'6'10'-6868,"-3"5"4292,-1-8 920,-2 6 1591,0 0 113,0 0-169,0 2 188,0 1-1573,-12 9 2806,9-6-623,-10 10 644,13-13-1681,16 5 11,9-11 1020,-3-1-97,23-7 729,-25-1-879,23-1 768,4-16 348,-11 12 548,17-30 312,-25 7-1060,4-9-313,-14-3-1191,-3 12-215,-2 1-165,-1-3-837,-5 15 893,0-9-876,-5 38-596,-1 2 362,16 17-111,-13 2 49,29-8 256,-30 1-443,34-1-1426,-5 7 929,9-11 2601,3 2 1,-11-17 0,-1-4 0</inkml:trace>
+  <inkml:trace contextRef="#ctx0" brushRef="#br0" timeOffset="180295">27818 11870 25438,'0'-7'-5666,"0"1"3897,14 3 4707,-1 2-1614,2 20-3167,-5 5-537,-10 12 921,0 0-1037,0-7 1596,0-1-89,0-1-2271,0-3 3079,-17-3 1,13-10 0,-13-3-1</inkml:trace>
+  <inkml:trace contextRef="#ctx0" brushRef="#br0" timeOffset="180445">28068 11636 25168,'37'-22'1863,"0"5"-877,2 8-1743,18 4-503,-12 20-844,-7-4 1,0 4 1777,4 19 1,-14-13 0,-1 0-1,9 15 1</inkml:trace>
+  <inkml:trace contextRef="#ctx0" brushRef="#br0" timeOffset="180685">29078 12033 27777,'-40'-8'-1362,"-2"1"1062,3 23 2097,3 13-1801,15 9-1196,0 8-210,19-9-1623,-5 16 537,7-12-1481,20 21 3650,9-31 0,11 3 1,3-17-1</inkml:trace>
+  <inkml:trace contextRef="#ctx0" brushRef="#br0" timeOffset="180995">29467 12196 26068,'-23'-12'-2498,"17"2"-1259,-38 4 5236,15 3-427,-18 3-221,5 19 466,18 7-1389,10 24-1174,14-9 249,22 14 739,9-23-375,-3-8 1,3-2-350,21-1 340,3-2-629,6-8 1070,-16-10 736,-8 4 0,-1-4 1039,0-21 1253,7-3-905,-30-24-1847,-3 13-503,-10-3-856,-22 13-1754,-7-8 308,1 9-1046,-33-1 3518,52 11 1,-45 7-1,32 1 1</inkml:trace>
+  <inkml:trace contextRef="#ctx0" brushRef="#br0" timeOffset="181316">30062 12252 25348,'-17'-14'-3629,"12"-5"46,-32 17 5562,10-7-1487,-15 9 583,3 0-397,19 18-206,8 1-1197,29 20-336,-12-10 1197,38-10-947,-21 4-135,24-20 804,-8 20-931,1-21 879,-1 12 159,-1-13 2329,-3 4-750,5-5-708,-15 0 805,-3-16-1371,-15-3-213,-6-19-1805,-24 8 399,18 0-2007,-37 3 95,20 8 2979,-16-8 1,17 19 0,7-2-1</inkml:trace>
+  <inkml:trace contextRef="#ctx0" brushRef="#br0" timeOffset="181612">30623 11614 27147,'0'-18'-6206,"0"3"4078,0 2 1603,0 4-23,-13 28 1891,10-2-1444,-11 29 203,14 20-1699,0-8 1372,0-6 1,0 1-226,0 12 146,-1-24 1,2-1-477,14 13-1761,-11-5 1025,11-3-2001,-1 10 3348,2-16 0,1 6 0,-4-18 1</inkml:trace>
+  <inkml:trace contextRef="#ctx0" brushRef="#br0" timeOffset="181863">31088 12094 25978,'-17'-17'-4748,"12"2"1223,-33 2 4728,15-2-1147,-2 6 663,-11 0-124,17 6 75,-11 2-711,3 20 1853,12-15 941,4 31-3358,5-30 1759,6 33-2767,-3-10 215,21 9-1874,8 7 651,-3-21 136,26 5 154,-27-12 1392,26-3-823,-13-2 2061,1-6 0,-3 2 1,1-4-1</inkml:trace>
+  <inkml:trace contextRef="#ctx0" brushRef="#br0" timeOffset="182015">31313 12235 26517,'0'6'-5486,"17"-8"7694,-12 26-6797,25-6 2928,-27 13-1223,23-13 2697,-24 13 0,18-28 0,-9 12 1</inkml:trace>
+  <inkml:trace contextRef="#ctx0" brushRef="#br0" timeOffset="182213">31427 11690 26967,'-11'-15'-7534,"3"2"4105,8 6 1178,17 2 3229,5 20-1177,15 20 1,1 3 0,-3 11 0</inkml:trace>
+  <inkml:trace contextRef="#ctx0" brushRef="#br0" timeOffset="182518">31707 12257 24449,'14'11'-4802,"-2"-4"3696,18-2 2035,-11-3 17,21-2-184,-17 0-218,18-12 448,-20 9-801,5-10 1482,-9 0-166,-6 0-1309,-3-14-823,-5 8-475,-3-2-137,-20 7-326,16-1-667,-16 3 717,2-3 31,13 6-313,-27-1 1892,29 6-1410,-10 23 466,13 3-670,0 24 430,0-14 779,19 1 0,-14-12 1,14-1-1</inkml:trace>
+  <inkml:trace contextRef="#ctx0" brushRef="#br0" timeOffset="182796">32413 12116 25708,'-22'-9'-2602,"4"3"1765,6 1 569,10 3-863,-17 1 1741,17 21-1490,16 5-483,-8 11-509,31 11 844,-12-16-70,9 10 207,0-11 718,-9-1-1352,-2-1 1426,5 7 469,-9-9-221,2 10-506,-14-19-451,-1 3-2013,-27-5 2330,16-5 1036,-43 2 1,22-6 0,-24 0 0</inkml:trace>
+  <inkml:trace contextRef="#ctx0" brushRef="#br0" timeOffset="183937">7543 14894 26068,'-45'-3'-441,"-6"0"271,12 25 1401,-1-17-999,25 45-1621,-14-27 1543,24 25-1431,-22-10 898,25 0-961,-8 1 312,30 15-1763,-15-15 1496,16-14 0,5 0 836,13 16-1280,13-11 2000,-20-9 1,-2 0-859,4-3 1356,-5 4-705,-6-13 1501,-20-1-1538,10-3 537,-13 0-457,0-1-891,0 0-815,-20 1 1960,-8-2-12,-23 1 0,0-3 0,-3 0 0</inkml:trace>
+  <inkml:trace contextRef="#ctx0" brushRef="#br0" timeOffset="184648">7970 15049 25168,'5'-6'808,"-2"2"-484,-19 2-504,-5 17 984,-17 4 87,-1 19-992,17-7-299,-5 1 189,24-7-1002,-7 6 333,10-5-745,0 4-784,26-8 177,-20-8 1534,26-6 0,6-5 645,-10 0 185,11-11 0,2-2 1727,-1 6-757,10-32 831,-21 31-38,-3-33-870,-6 22 794,-1-30-2197,-10 20-465,-1-17-667,-8 22-306,0-3-27,0 12-142,0 1 923,-15 7 381,11 14 501,-12 14 603,16 22-706,0-4 194,21 2-797,-16-13 289,29-3 469,-30-2-2031,24 4 949,-7-16-381,17 6 1765,-5-18 1070,8 3 704,-16-28-4,5 18 63,-12-39-814,-4 38 1438,-1-37-1606,-2 27-244,-5-23-1061,-2 15-642,-3 23 1102,20 14-1597,-16 30 423,32 0-1379,-15-16 1648,-1 8-1194,24-24 2528,-28 7-909,35-11-181,-28-7 1526,9-15 1509,-16 12-472,1-30-988,-6 28 1859,1-35-3231,-5 22 1509,-3-17-1723,-2 2-1023,-3 6-717,0-1 52,0 32 788,0 17-2577,0 34 2225,27-6 1564,-11-14 1,3-2 0,32 8 0,-26-15 0,1 0-1</inkml:trace>
+  <inkml:trace contextRef="#ctx0" brushRef="#br0" timeOffset="185115">9953 14993 25888,'-27'-8'-1625,"-25"2"1875,29 5 235,-25 1-37,3 17 718,13 9-995,-8 26-457,27-8-750,2 3 461,11-15-1069,18-4-345,-13-2 902,25-14 0,5-4-264,-5 12 704,14-15 1,3-2 653,0 4 450,-7-12 0,-2-7 1153,4-14 356,8-11 180,-23-5-966,-5 7-1208,-3-3 53,-6-22-987,-5 11 563,-5 7 1,-1-2-1332,-2-7 986,-8 7 0,0 1-903,4-8 714,-11-11-365,-2 21 55,12 4 762,-12 5-179,4-1-218,10 12 1356,-17 1 32,18 38-177,-5 40-127,17-27 1,1 3-118,-10 27 1,3 1-418,14-27 1,1 1-271,-9 27 1,-4 1 447,3-27 0,1-1-410,3 10 1,-3-1-908,-8 12 116,19-8-460,-18-5 1794,13 4 0,-15-18 0,5 4 1</inkml:trace>
+  <inkml:trace contextRef="#ctx0" brushRef="#br0" timeOffset="185279">9777 14865 25348,'-8'-32'-8100,"2"4"4932,29-7 4242,-18 13-2007,50-4 2268,-26 17-1115,31 4-47,-9 4 0,1 1 1,3 0-1</inkml:trace>
+  <inkml:trace contextRef="#ctx0" brushRef="#br0" timeOffset="185612">10882 14884 26068,'-43'0'629,"0"0"-359,-14 0-270,17 18 1058,-9-13-814,23 31-965,5-8 256,11 20-827,4-8-521,51 8-43,-15-23 1240,4-8 1,4-3-108,-4-2 0,-1-1-44,21 1 781,-10-5 0,-1-2 73,4-2 549,-12-1 1,-3-4 942,1-18 396,-1 15-262,-22-32-1878,-4 11-542,-6-19-505,-20 7-1344,-7-5-98,2 19 651,-8 8 0,1 2-1270,8-1 3041,-32 0 0,28 7 1,3 2-1</inkml:trace>
+  <inkml:trace contextRef="#ctx0" brushRef="#br0" timeOffset="185795">11235 14096 26428,'0'-5'-6026,"-20"2"7300,15 21-2636,-33-13 934,27 26 1,3 5-2198,-14-4 2538,7 4 1,3 3-1,9 13 1,-10 4 0</inkml:trace>
+  <inkml:trace contextRef="#ctx0" brushRef="#br0" timeOffset="186329">12372 14602 26158,'8'-10'-677,"-6"2"-1608,6 3 3968,-30 2-1711,-4 2 119,-1 22 300,-14-16-2,35 36-2004,-32-24 2015,33 36-717,-12-19-861,17 14-174,29 2-608,-4-11 998,11-5 0,5-1-610,10 5 1653,-3-8 1,0 0-1730,9 3 1907,-20-12 1,-2-2-383,8 4 1302,-7-2 114,-6-5-525,-7 1-630,-10-5-375,-6 2-796,-32-9 2213,19 2-924,-52-5-52,28 1-39,-31-2-722,12 0 452,2-1 459,0 0 1,6 0 0,1 0 0</inkml:trace>
+  <inkml:trace contextRef="#ctx0" brushRef="#br0" timeOffset="186661">13218 14733 25078,'-22'-15'-3776,"17"3"-653,-36 0 5706,36 2-3227,-37 0 3001,36 4-1590,-38-1 1345,24 5-889,-4 16 1740,29 8-1432,29 22-779,-4-16 0,3 0 976,-5-5 0,0 1-839,11 8 0,-3-1 868,5 7-1247,7 7 31,-22-7-1576,-3-13 2846,-13 10-1025,0-20-335,-37 6 1882,20-12-721,-50 2 333,34-5 85,-27-1-433,14-3 130,-1 0 1,6-2-1,1 0 1</inkml:trace>
+  <inkml:trace contextRef="#ctx0" brushRef="#br0" timeOffset="187101">13900 14728 24898,'-20'-17'-4325,"15"3"156,-33 3 5437,34 2-2970,-31 1 3232,20 3-1051,-12 2 427,14 16-986,7 9 476,6 21 179,0-5-1699,17 16 1026,6-22-1674,-1 6 93,19-14 627,-25-6-746,22-8 2232,-13 3 113,-1-12 1018,0 6 148,4-7 185,-8 0 321,5-20-799,-16 2 190,3-20-2048,-10 7-69,0 5-982,-2 28-1038,17 29-463,-13 10 198,13 8 2186,-4-9 1,2-13-1,12 8 1</inkml:trace>
+  <inkml:trace contextRef="#ctx0" brushRef="#br0" timeOffset="187480">14302 14818 24629,'0'-12'-5307,"0"0"3269,0 24 974,20 9 459,-15 15-184,26 0 456,-28-8-45,18-2-1347,-18 0 1439,16-3 78,-11-2-1057,2-4 542,0-7 782,-5-4-306,2-22 1226,0 12 1304,1-33-1694,7 5 666,-1-11 526,12-17-182,-9 25 112,11-18-167,-11 27-992,5 4-1047,-1 7 2085,-4 13-730,14 14-486,-11-7-735,-2 24 1,-1 5-1254,6-5 799,-9 3 0,1 3-475,1-5 0,1-2-1613,11 16 901,-4-11 0,1-2-1234,6-2 3166,10 1 0,-13-22 0,1-3 0</inkml:trace>
+  <inkml:trace contextRef="#ctx0" brushRef="#br0" timeOffset="187867">15092 14227 25888,'-8'-17'-6648,"5"4"5129,18 24 1819,8 19-1002,4 14 46,10 9 224,-33-3 133,36 2-1415,-24 6 1671,0-29 0,2 0-67,5 28-943,0-1 514,-1-4 352,-8-20 1,0-1-260,5 11-252,8 13 152,-14-33 218,2 1 103,-10-16 615,1-3 542,-4-4 1251,4-17-935,-3 13 539,9-48-731,-2 28-380,1-7 0,1-1 402,2-2 48,6-3-452,-2 15-971,-5 11 1495,7 1-252,-11 25-1799,6 11-575,-10 8-295,1 5-278,-5-10-278,-1 0-460,0-1 2315,0 5 1,0-17 0,0 2 0</inkml:trace>
+  <inkml:trace contextRef="#ctx0" brushRef="#br0" timeOffset="188062">14457 13504 26428,'-33'-3'-911,"0"1"-59,3 25 564,1-3-347,2 25-1848,3-2 2374,0 10 0,4 6 0,1 5 0</inkml:trace>
+  <inkml:trace contextRef="#ctx0" brushRef="#br0" timeOffset="188579">16918 14314 26607,'0'-13'-4856,"15"3"8092,4 6-1474,-1 18-3487,10-10 1931,-12 55-2165,1-28 801,-3 14 0,-3 4-1598,-4 8 1237,0-4 1,-1 0-363,-3-19 0,-2-1-91,-1 11 0,0-1 1894,0 17 1,0-3 0,0-2 0</inkml:trace>
+  <inkml:trace contextRef="#ctx0" brushRef="#br0" timeOffset="188751">16743 14721 26068,'25'-29'-893,"1"3"1435,9 9 1,5 3 473,18-5-1456,-4 7 0,1 2-29,-18 6 0,-2 1-240,12 1 1,0 1-1007,19 1 1647,-1 15 1,-4-11 0,0 11 0</inkml:trace>
+  <inkml:trace contextRef="#ctx0" brushRef="#br0" timeOffset="189012">17930 14690 24718,'-34'-10'-909,"-18"8"1728,32-7-1926,-22 9 1688,12 0-193,-1 0-21,4 17 204,0-12-251,4 25-365,10-8-636,2 13 260,30-3-2032,15 1 750,11-21 1099,8 9-565,12-20 527,-14 6 680,-11-16 0,-1-2 1103,2 5-521,-18-19 1,-2-4 804,1 7-241,-12-31-2347,-3 21 93,-7-2-1555,-22 1 2191,16 0 0,-40 4 0,15 1 0</inkml:trace>
+  <inkml:trace contextRef="#ctx0" brushRef="#br0" timeOffset="189312">18668 14145 27237,'0'-18'-6385,"0"4"4526,0 5 974,0 32 337,0-1 122,0 30 122,0-5 190,0-6 0,0 1-765,0-8 0,0 1 170,8 27 0,2 0-20,-1-24 0,1-2-120,-1 12 1,3-1-109,3-16 1,0-1-1399,0 26 2209,15-6 1,-6-5-1,1-6 1</inkml:trace>
+  <inkml:trace contextRef="#ctx0" brushRef="#br0" timeOffset="189511">19052 14474 25258,'-17'-12'-4551,"13"2"285,-28 4 5968,18 2-943,-11 3 290,7 18-181,6-13 136,2 34-2816,2-18 1137,4 22-581,1 12 828,3-12 0,24 15 1,5-18-1</inkml:trace>
+  <inkml:trace contextRef="#ctx0" brushRef="#br0" timeOffset="189829">19295 14865 25528,'9'-15'-1750,"4"3"2669,1 2-56,6 8-374,1-18-545,3 11 941,13-16-732,-8 10 388,11-6 356,-6 0-829,-10 5-566,10-14 77,-19 13 20,-1-5-982,-10 6-112,-4-1-642,0 1 126,0-3 198,-25 2 498,19-1-377,-37-8 843,21 10 272,-14-8 1112,16 16 323,7 16 1026,13 15-2154,0 13-1303,14 19 1065,10-17-634,-3-4 0,2-1-449,18 5-39,3 8 1502,-10-19 0,2-7 0,0-1 0</inkml:trace>
+  <inkml:trace contextRef="#ctx0" brushRef="#br0" timeOffset="190148">20075 14656 25528,'1'-13'-4882,"0"-2"2592,1 14 5499,-1-3-4079,2 4 1900,1 14-2830,2-10 1433,2 27-1711,-1-15 1171,3 17 370,1-7-2519,-1 1 1577,8 4-697,-4-15 2197,11 14-694,-8-28 2256,4 10-431,-4-12 1113,-2 0-63,-1 0 193,7-23-363,-8-5-172,12-27-430,-14 11-1665,11-9 701,-12 24-1141,5-4 44,-2 15 262,-2 10 780,10 1 844,-8 7-1822,16 24-1219,-11 4-1523,11 16 3060,-8-4 1,2-8 0,0 0 0</inkml:trace>
+  <inkml:trace contextRef="#ctx0" brushRef="#br0" timeOffset="190979">21953 14467 25888,'0'-27'-6116,"0"2"4168,0 6 1333,0 6 876,0 2-687,0 31 302,20 26-782,6 7-219,-8-19 0,1-2 797,16 9 330,-9-2-319,0-2 34,9 10 62,-10-17 370,10 8 583,-20-23-372,5-4 509,-12-8-348,4-19-39,3-17-316,0-8-1022,-1 3 0,0 0-55,3-14 1024,-7 17 0,0-1 0,3-12 1,-2 0-1</inkml:trace>
+  <inkml:trace contextRef="#ctx0" brushRef="#br0" timeOffset="191345">23035 14570 24988,'-18'-35'-7243,"14"1"5703,-33 11 2282,32-2-1581,-32 2 1349,32 0-1307,-27-1 1074,16 8-1894,-11 2 2853,4 10 240,10 40-1274,5-10 213,4 12 0,5 4-966,16 5 248,-13 18-156,22-32 0,4-2 399,-6 16-415,10-11 0,2-3-618,-3 1 617,10 10 147,-17-25 655,-11-1-1390,-3-10-820,-38-21 468,-4-4 1608,-17-4 0,4-14 1,9 11-1</inkml:trace>
+  <inkml:trace contextRef="#ctx0" brushRef="#br0" timeOffset="192423">24337 14149 26787,'0'50'-6205,"-14"-8"5654,11 10-655,-10-7 913,13 4-1194,-8 3 177,6 0-151,-5 1-941,7-1 1233,0-1 923,0-2 1,17-3 0,4-2 0</inkml:trace>
+  <inkml:trace contextRef="#ctx0" brushRef="#br0" timeOffset="192612">24060 14563 25258,'0'-9'-5486,"0"1"3358,21 5 5018,-15-1-1375,46 4-1084,-25-2-649,32 2-509,-11 0-442,5 0 1506,1 17-85,-1-13 0,4 27 0,0-14 0</inkml:trace>
+  <inkml:trace contextRef="#ctx0" brushRef="#br0" timeOffset="192896">24988 14571 24269,'-44'-12'-146,"18"-5"-1691,-10 15 2932,11-5-1225,-15 21 1719,2 8-745,17 20-1393,8-5-368,13 1-238,19-10 425,-15 0-1100,48-2 1507,-1 6-480,-19-21 0,3-2 326,14 3 0,-2-2 785,11-4 56,-10-2 0,-1-4 1252,2-23 861,11 17-1220,-37-24 1,-5-3-1137,5 6-178,-10-11 1,-5-3-1031,-4-3-445,-11 8 0,-5 0-1709,-21-7 76,-9-9 2663,-6 20 0,13 4 0,0 3 0</inkml:trace>
+  <inkml:trace contextRef="#ctx0" brushRef="#br0" timeOffset="193280">25907 14005 26158,'0'-15'-5936,"0"4"4257,0 3 1604,0 4-563,0 25 302,0 13 139,0 0 0,0 2-31,0 26-570,0-16 0,0 0 708,0 12-45,0-20 0,0 0-405,0 12-180,0-1-269,0-4-450,0-1-180,0-4-90,0-4 1709,0-6 0,0-4 0,0-4 0</inkml:trace>
+  <inkml:trace contextRef="#ctx0" brushRef="#br0" timeOffset="193679">26083 14463 26607,'23'32'-7358,"7"-2"5666,12-15 2475,1 8-903,-9-21 995,3 16-959,0-17 665,3 7-1033,-2-8 2225,-1 0-298,-2 0-904,-4 0 358,-2 0-784,-7-17 812,-4 12-403,-4-27-830,-7 13-577,-4-18-454,-3 8-200,-22-7-207,-1 18 658,-4-4-190,-10 10 254,14 3 1112,-12 3 678,4 3 407,8 3 391,-6 18 830,8 7-1345,-2 24-503,15-6-1198,4 4-272,4-11-830,23-1-359,-17 2-463,50-4 512,-30-1-271,33-4 1292,-26-11 1,0-2-202,22 6 1399,-21-11 1,0-1 0,10-1 0,-1-4 0</inkml:trace>
+  <inkml:trace contextRef="#ctx0" brushRef="#br0" timeOffset="194312">26255 14157 25168,'0'-5'-5036,"0"0"3267,0 3 435,-14 0 1197,-4 20 244,-19 9-65,7 12-1436,-2 3 1276,8-7 0,1 3 0,1 2 0</inkml:trace>
+  <inkml:trace contextRef="#ctx0" brushRef="#br0" timeOffset="194929">26965 14392 25798,'-5'0'1349,"1"0"-719,1 0-540,1 16-2340,1 14 730,1 4 260,0 6 225,0-4-472,13-9-673,-9 14 336,9-20-274,-6 7-38,-5-18 1412,6-19 2159,-8-12-1415,0-14 0,19-13 1336,4 17 218,0-12 50,16 14 1053,-24 2-1159,20 3-511,2-3 1061,-7 13 232,9 0-780,-13 12-981,1 2-187,23 24-2124,-19 8 38,-1-1 0,-2 2-1852,-3 21 3115,-10-24 0,1 0 1,6 14-1,-1 1 1</inkml:trace>
+  <inkml:trace contextRef="#ctx0" brushRef="#br0" timeOffset="195197">28382 14096 27957,'-21'-8'-2603,"5"18"4632,16 16-5033,22 11 534,-16 9 978,29-5 276,-32 4-88,23 2-467,-18-13 0,0 0-367,8 19 0,-4-12 1,-1 0 818,-3 2 309,3 8 1000,-5-24 1,-6-4-1,0-3 1</inkml:trace>
+  <inkml:trace contextRef="#ctx0" brushRef="#br0" timeOffset="195467">28197 14444 24179,'0'-32'-6116,"19"-7"6479,-14 11 154,26 9 0,6 3 1761,-4 2-1634,3 7 0,1 3-120,11 2-290,-2 2-144,2 19 437,-17-7 1,1 2-461,16 22-412,-12-13 1,-1 0-1324,2 5 371,12 6 222,-28-8-451,3-13 472,-12 8-695,-6-41 877,-17 0-890,7-20 205,-12 2-447,16 8 797,0 0 340,0 0 870,0 1 1,16 4-1,4 2 1</inkml:trace>
+  <inkml:trace contextRef="#ctx0" brushRef="#br0" timeOffset="195761">29383 14365 25348,'9'8'-4524,"-21"-2"7868,-10-6-2734,-27 0-154,9 0-302,-2 0 20,16 0-43,12 17-338,-7-13 2120,18 27-3952,-8-12 1479,28 13-1712,12-2 770,11-12 603,4 0 241,10-16 796,-13 5-863,8-7 2144,-17 0-1220,-6 0 1803,-3 0-1129,-5-18-1467,-9-3-449,-3-20-1466,-26 9 2184,15 0 1,-39 9-1,15 0 1</inkml:trace>
+  <inkml:trace contextRef="#ctx0" brushRef="#br0" timeOffset="196153">29733 14294 24359,'11'6'-3089,"1"-4"4019,-1 8-2583,4-2 1473,-3 1-556,8 11-16,-10-5-311,7 18-969,-10-9 884,3 6-827,-7-9 1534,1 0-792,0 2 421,-1-6 257,0-1-344,0-7 423,0-6 323,2 0 1229,3-3 607,1-20-458,3 15 1461,0-33-1637,4 20 860,1-17-28,3 5-127,-1 0-791,10-11-1287,-8 12 781,4-5-1380,-10 17 1692,-2 9-165,-3 3 651,0 5-891,-2 0 93,-1 18-2531,2 9-421,0 9-486,8 18 284,-4-21-2367,18 20 4531,-11-25 1,14 3 0,-9-15 0</inkml:trace>
+  <inkml:trace contextRef="#ctx0" brushRef="#br0" timeOffset="196530">30507 14227 23819,'-27'0'90,"11"22"-1211,5 3-267,11 14-773,0-5 601,18-9-33,-13-1 447,33-1-86,-8 5-310,10-10 1169,8 4 457,-14-15 1288,-1-1 259,-16-21 1271,-8-4-726,-9-20-2270,-16-1-776,12 7 61,-13-1-297,17 17 4,0 17-169,0 29 283,9 3 1,0 4 461,-7-2 0,1 1 282,13 20 0,2-1 297,-7-18 0,-1-1-163,0 12 0,1-1 9,4-14 1,-3-2-870,-9 29 158,8-4-299,-11-5 76,0-3-456,0-5 1773,-17-5 1,13-3 0,-13-4 0</inkml:trace>
+  <inkml:trace contextRef="#ctx0" brushRef="#br0" timeOffset="197249">11650 16433 25798,'0'-6'-4946,"-19"1"6411,1 3-559,-21 1 62,21 21-540,-14-15 387,28 37-1905,-27-9 1027,19 13 313,-4 2-1028,7-10-547,9 1-780,0 0-331,23 1-1257,-18-2 2576,20-19 0,7-2 1027,-3 3 1,1-1 0,8-5 0,1-3 0,6 2 0,-1 1 0</inkml:trace>
+  <inkml:trace contextRef="#ctx0" brushRef="#br0" timeOffset="197545">12610 16486 24359,'-50'-1'838,"4"-1"-810,17 18 989,-6-12-747,18 26-1245,-3-5 702,7 19-756,13-4-567,0 3 60,0-12-7,0 2-569,0-1 662,19 10 67,-15-11-92,27 11 593,-29-23 577,10 4-441,-12-14 387,-21-1 2150,15-5-1366,-39 0 1050,10-2-879,-12 0-129,0-1 0,13 0 0,1 0 1</inkml:trace>
+  <inkml:trace contextRef="#ctx0" brushRef="#br0" timeOffset="198029">13400 16674 25528,'-21'-7'-1459,"15"2"-1627,-36 1 4370,9 3-392,-11-1-292,-5 2-232,-1 15 520,13 1-147,-17 22 43,29-10 642,3 19-2177,15-18-331,7 10-612,20-14-251,-15-1-691,43-5 865,-7-2 645,14-9 990,-16-3 1,-2-4 648,7-19 1080,13 13-22,-22-41-233,-3 21-482,-13-10 1,-1-3-847,7-11 50,-11 17 0,-1-2-468,-5 0 0,-1 1-797,0-18 301,-3 10 0,-2 0-378,-2-5 888,-11 9 1,0 0-1248,5-3 707,-16-8-564,6 20 446,12 5 432,-13 4 995,5 5-586,10 24 1016,-10 19 553,12 15-1091,0 14 266,20-6-1171,-14 8 215,11-28 1,0 1-204,-15 0 0,0 2-1016,19 15 1,2 1-67,-13-12 1,1 0 1504,12 11 0,1-1 1,-9-16-1,-1-1 0,1-1 1,0 0-1</inkml:trace>
+  <inkml:trace contextRef="#ctx0" brushRef="#br0" timeOffset="198696">14242 16811 25798,'25'-36'-1218,"18"2"2195,-37 1-3227,44-1 3396,-30-4-1700,22-1 921,-15 0-504,-2 1-60,1-17-63,-14 14-747,6-11 1481,-17 3-2214,5 14 1390,-26-21-1684,14 26 500,-31-12 457,15 22 376,-14 0 889,1 14 434,7 17 1552,11 18-1485,7 31-109,10-2-1205,-2-10 1,4 1-282,9-16 0,3 0-393,-5 12 1,3-1 1154,11-10 0,2-2 1,-5 1-1,0 0 1,3 0-1,0 1 1</inkml:trace>
+  <inkml:trace contextRef="#ctx0" brushRef="#br0" timeOffset="199001">15558 16604 27507,'54'-13'1961,"-8"9"-2485,5-9 378,-6 0-449,5 9-1382,2-9 408,3 1 1541,0 10 1,2-10-1,0 12 1</inkml:trace>
+  <inkml:trace contextRef="#ctx0" brushRef="#br0" timeOffset="199329">15888 16194 26517,'-17'-6'-1808,"2"-1"1475,6 1-90,4 2-675,27 1 2672,22 3-820,7 14-711,-13-7 0,0 0-421,4 10 326,13 10 77,-19-13 371,-1 17-426,-3-7-1549,-3 4 128,-4 2 94,-2 2-125,-2 16-193,-8-9 806,-6-6 0,-3 0-920,-3 8 938,-12-8 1,-2 0-479,7 5 680,-17-13 0,0-1 1028,17 7 0,-37 0 0,15-2 0</inkml:trace>
+  <inkml:trace contextRef="#ctx0" brushRef="#br0" timeOffset="199920">17015 16334 25348,'21'-14'1498,"-4"0"-1288,-6 3-395,-8 0-1765,15 4 2987,-16 1-1114,4 3 0,-6 2 0,0 1 0</inkml:trace>
+  <inkml:trace contextRef="#ctx0" brushRef="#br0" timeOffset="200679">17022 16326 25258,'-8'-3'-1068,"-1"0"606,7 18-1224,34 25-65,-23 1 898,18-12 1,2 0 443,-12 9-697,20 4-637,-9 1 507,2 2-375,1-1 970,2-2 418,-9-14 0,1-2 584,15 11-588,-6-13 0,1-3 1062,7-5-317,14-4 724,-19-11 261,0-16 1093,-4 11-820,1-33-271,-7 17 90,-2-23-1107,0-9-334,-10 9-27,-8 8 0,-1-1-910,-4-7-17,-11 9 1,-1 1-1426,5-2 827,-14-7-1167,4 15 1211,11 10 303,-11 2 471,15 30-76,0 14-521,19 31 195,5-5-315,-3-14 1,3-2-108,14 10 1471,-18-17 1,0-2 0,12 7 0,2-3 0</inkml:trace>
+  <inkml:trace contextRef="#ctx0" brushRef="#br0" timeOffset="201229">18283 16394 24808,'-21'-11'-3349,"15"2"-272,-35 2 5152,19 4-626,-13 15 944,16 13-1559,8 8-830,11 27-1057,24-20 970,-10-1 0,2 2 348,28 7-476,-22-15 0,-1 0-952,10 11-928,1-2 1129,-5-5 668,0-2 545,-13-6 309,10-5 25,-14 0-1699,5-10 1564,-33-2 2024,-7-31-1242,-21-1 528,11-21-946,14 5 41,10 5-863,33-3 2364,-17 14-1102,28 4 1,7 2-370,-5-5 666,15 5 1,4 1 167,4-3-59,-21 6 0,2 0 165,-1 0 0,-1 0 1620,17-7-2341,-11 2 1,-1-1 153,-1-4-701,7-7-98,-25 6-143,-9 0-477,-4 0-77,-7-10-816,-20 7-115,-10-15-775,3 19 494,-22-10 440,18 18 781,-1 0 436,-9 9 1014,23 21 368,-5 9 596,10 27-1081,30-10-1842,-15 4 49,35-15-141,-35 3-516,41-2-200,-26-1-813,24-2 2694,-11-4 0,1-4 0,1-2 1</inkml:trace>
+  <inkml:trace contextRef="#ctx0" brushRef="#br0" timeOffset="201561">19212 16436 24988,'0'-11'-4856,"0"1"2727,19 22 2107,7 11-508,-1 13-481,21 3 882,-18 13-702,12-11-42,-18-4 1,-2 0 351,1 2-11,5 21-482,-18-32 238,3 0 214,-10-12 221,2-27 1583,-18-14-1582,11-17 679,-12-10-230,14 17 1,4-1 621,21-23-116,-7 6 0,5 0 192,3 21 0,3 0-307,14-20 1,1 1-609,-14 22 1,1 3 409,9-7 1,0 1-95,16-3 435,-3 7 0,-2 8 1,-1 3-1</inkml:trace>
+  <inkml:trace contextRef="#ctx0" brushRef="#br0" timeOffset="201762">20487 16664 27327,'6'1'-6966,"0"0"6787,-3 0 1,-1 0 0,-1-1 0</inkml:trace>
+</inkml:ink>
+</file>
+
+<file path=ppt/ink/ink13.xml><?xml version="1.0" encoding="utf-8"?>
+<inkml:ink xmlns:inkml="http://www.w3.org/2003/InkML">
+  <inkml:definitions>
+    <inkml:context xml:id="ctx0">
+      <inkml:inkSource xml:id="inkSrc0">
+        <inkml:traceFormat>
+          <inkml:channel name="X" type="integer" min="-2.14748E9" max="2.14748E9" units="cm"/>
+          <inkml:channel name="Y" type="integer" min="-2.14748E9" max="2.14748E9" units="cm"/>
+          <inkml:channel name="F" type="integer" max="32767" units="dev"/>
+        </inkml:traceFormat>
+        <inkml:channelProperties>
+          <inkml:channelProperty channel="X" name="resolution" value="1000" units="1/cm"/>
+          <inkml:channelProperty channel="Y" name="resolution" value="1000" units="1/cm"/>
+          <inkml:channelProperty channel="F" name="resolution" value="0" units="1/dev"/>
+        </inkml:channelProperties>
+      </inkml:inkSource>
+      <inkml:timestamp xml:id="ts0" timeString="2021-08-01T04:12:02.437"/>
+    </inkml:context>
+    <inkml:brush xml:id="br0">
+      <inkml:brushProperty name="width" value="0.12095" units="cm"/>
+      <inkml:brushProperty name="height" value="0.12095" units="cm"/>
+      <inkml:brushProperty name="color" value="#FF0000"/>
+    </inkml:brush>
+  </inkml:definitions>
+  <inkml:trace contextRef="#ctx0" brushRef="#br0">2773 1057 5955,'0'-13'9830,"-16"0"-5431,12 2-2256,-12 2-3059,16 1 3126,0 1-581,0 3-361,0 0 2073,0 3-2531,0-1 976,0 17-1474,0 0-312,0 18 0,0 0 0,0 7 0,0 8 0,0 6 0,0 4 0,0 3 0,0-1 0,0-1 0,0-5 0,0-3 0,0 10 0,0-19 0,0 4 0,0-24 0,0-6 0,0-5 0,0-5 0,0-25 0,0-12 0,0-16 0,19-5-186,-9 19 1,1 1-1162,12-20-285,3 8 1,-1 2-481,-4-5 1000,3 17 0,3 3-1830,5-5 2493,1 4 1,1 6 0,-1 2 0</inkml:trace>
+  <inkml:trace contextRef="#ctx0" brushRef="#br0" timeOffset="332">3497 1158 8024,'-19'-15'5354,"2"3"-4065,-5 29-444,-1-13-1708,21 32 3596,-18-19-2368,18 20 1294,-7 6 1104,9-10-1007,0 11 141,0-7-78,25-12-595,4 9-2478,14-23 226,-2-1-1424,-10-10-312,2 0-218,-1 0-90,10-21 758,-14-8 2115,4-26 481,-22 10 1514,-4 0 158,-6 13 758,0 4-89,-20 2-1556,15 4-1074,-36 4-1655,13 5 1259,-12 6 1,15 3 0,12 4-1</inkml:trace>
+  <inkml:trace contextRef="#ctx0" brushRef="#br0" timeOffset="707">4035 1082 5686,'-21'-6'2922,"1"1"-2261,-5 27 1536,11 5 217,14 12 466,0-2-823,0-8-514,0 0 1529,27 0-1918,-21 0 987,47-3-2659,-15 6-246,15-12-384,-16-8 1,-1-1-1394,11-5 1112,-8-3 0,0-1-1563,5-2 1378,8-19-257,-20 14 1272,-6-32 1326,-4 20 41,-6-19 869,-5 6 644,-6-3 416,-3-16 286,-2 12-671,-22-12-996,-2 11-1696,-3 11-1134,-10-6-1131,15 21 2170,-13 1 1,15 10 0,7 1 0</inkml:trace>
+  <inkml:trace contextRef="#ctx0" brushRef="#br0" timeOffset="1378">5030 1057 5506,'8'11'9241,"-3"-8"-9023,1 24 3311,-2-14-1491,0 16-475,0-7-477,-1 2-19,0 2 1771,-2 0-1799,2 2 897,1 9-1706,-1-10-5,3 14-401,-4-22 164,4 6-557,-4-16 75,3-1-520,-2-7-1105,0-1-832,1 0 98,2-19 2574,-2-9 185,6-26 203,-4 9 274,4-2 364,0 5 1339,-3 11 998,9-1-880,-8 14-2441,10 11-1602,-6 0 32,2 23 622,-1-12-834,-1 32 1880,1-17-511,-1 18 792,0-7 36,0 0 1299,6 11-18,-5-12-1034,10 5 931,-11-13-1764,3-10-399,-6-1-94,-3-10-1546,0 0 150,0 0 20,0-15 2200,0 11-750,5-44 1502,-2 23-1,-1-9 0,0-2 333,3-4 1659,1-11-75,-3 20 236,-1 4-2404,0 5 943,5 5-2115,-5 8-244,4 4-893,-5 5-780,2 20 1880,4 5-336,1 12-56,3 1-1379,8 4 1147,-3-10 1384,11 7 0,-5-17 1,3-3-1</inkml:trace>
+  <inkml:trace contextRef="#ctx0" brushRef="#br0" timeOffset="1644">6230 1035 7035,'-19'-9'4817,"15"1"-601,-29 4-5760,17 2 774,-11 1-79,13 21 2234,-1 3-237,13 22 1851,12 1-1271,-5-9-791,29-1 379,-29-13 1120,32-3-1480,-32-1-254,31-4-1819,-32-1 599,24-5-1971,-26 2 1726,9-4-2067,-11 8 1504,-28-4 1261,20 4 0,-51-1 0,20-1 1</inkml:trace>
+  <inkml:trace contextRef="#ctx0" brushRef="#br0" timeOffset="3928">2832 2919 5775,'-9'-7'6971,"0"0"-5512,2 2-286,1-1-241,1 2-283,3 20 1293,1 22-380,15 6 932,-11 14-1299,10 0-193,-13-10-910,0-7 0,0 0 770,0 8-156,0 13-1215,0-21 518,0 8 1,0-15-1,0 6 1</inkml:trace>
+  <inkml:trace contextRef="#ctx0" brushRef="#br0" timeOffset="4294">2972 2996 3707,'29'-16'4470,"1"0"-2936,5 1-1197,1 1-254,6 1 96,1 1-295,6 1-164,3 1 717,9 1-1157,3 3 321,-27 3 0,0 0 77,1 1 1,3-1 158,2 1 1,4-1 0,-2 1-106,9 0 1,6-1 203,-11 1 1,9-1-1,3 0 1,-2 0 0,-5 1-95,2 0 1,-5 0 0,6-1 128,-7 1 0,7 0 1,3-1-1,1 0 0,-4 1 1,-6-1-68,9 1 0,-6-1 1,5 1 75,-3-1 0,7 1 0,1-1 0,-1 1 0,-6 0-5,5 0 0,-5 0 0,5 0 34,-4 0 0,7 0 0,1 0 0,-1-1 0,-6 2-24,6-1 0,-5 1 1,3 0 2,-4 0 1,4-1-1,0 1 1,0-1-3,3 1 0,1 1 0,-1-1 1,-3 0-4,-12 1 1,-3-1 0,1 1 0,5-1-12,0 1 0,5 0 0,2-1 0,1 1 0,-4 0 0,-4 0 32,-1 0 0,-5 0 1,-1-1-1,6 1-35,9 0 0,6 0 0,2 0 0,-2 0 0,-7 0 9,3 0 1,-6 0-1,2 0-12,-3 0 1,2 0 0,0 0 0,-5 0-13,-3 0 1,-3 0 0,-1 0-84,1 0 1,-1 0 0,1 0 60,-4 0 1,1 0 0,1 0-236,14 0 0,4 0 0,-5 0-60,7 0 0,0 0 362,-13 0 1,3 0 0,-6 0 0,-3 0 0,-3 0 0,-2 0 0,0 0 0</inkml:trace>
+  <inkml:trace contextRef="#ctx0" brushRef="#br0" timeOffset="4845">3510 3902 4426,'34'2'1820,"-2"1"-1266,-3-1-239,0 0 79,7-1-322,3-1-9,7 0-60,8 0 87,11 0 4,-30-6 0,5-2-4,2 3 1,6 0 0,-1 1-53,10-4 0,5-1-2,-7 1 1,7-1 0,2 0-1,-6 2 11,-3 2 0,-3 2 0,3-2 17,0-2 0,3-2 0,0 0 0,-2 2 10,2 0 0,-3 2 1,1 0 22,3-2 0,1 1 0,0 0-75,0 0 1,0 0 0,1 0-18,1 0 1,1 0 0,0 1-60,1-1 0,0 1 0,0 0 9,1 0 1,-1 1 0,6-1 29,-15 2 0,5 0 0,1 1 0,0-1 0,-4 1-76,1-1 1,-4 1-1,2 1 1,4-1 74,0 0 0,5 1 0,4 0 0,-1 0 0,-3 0 1,-5 0-54,-1 1 0,-5-1 0,-1 1 0,3 0 12,-1 0 1,1 0-1,2 0 1,0 0-1,-2 0-32,11 0 0,-1-1 0,-2 1 1,-2 1-23,3 3 1,-3 1-1,5-1-73,-8-3 0,5 0 0,2-1 0,-2 0 1,-6 1 67,2 3 0,-5 1 0,5-1-60,-7-1 0,5-1 1,1 0-1,-2 1 0,-5-1-37,1 2 0,-5-1 1,4 1 226,5 1 1,4 1 0,0 1 0,-7-2 0,7 0-1,-5 0 1,-8-2 0,0 0 0,0 0 0</inkml:trace>
+  <inkml:trace contextRef="#ctx0" brushRef="#br0" timeOffset="5135">9512 2975 5686,'0'-9'9830,"0"0"-3007,-15 3-9166,11 0 2723,-25 4-2438,26 22 3476,-20 13-1081,20-1 0,4 4 2444,-10 24-3453,8-11 1,2-1-170,-1 14 724,8-7 1,1 2 275,-7-23 1,0 0 0,7 12-1,-1-1 1,-8 18 0</inkml:trace>
+  <inkml:trace contextRef="#ctx0" brushRef="#br0" timeOffset="6194">583 3497 5146,'0'-7'9830,"0"1"-2827,0 2-3966,0 1-1808,0 21-410,0 3-233,0 24-148,0-10 2724,0 13-3162,0-20 0,0 7 0,0-10 0,0-8 0,0 2 0,0-10-809,0-4 809,0-14-90,0-9 90,14-9-825,-11 1 487,20 14-1805,-15 5 408,12 7-2236,2 15 1710,-5 2-91,11 17 458,-13-17 674,11 11-595,-11-14 1868,4 2 0,-6-6 0,-1-10 0</inkml:trace>
+  <inkml:trace contextRef="#ctx0" brushRef="#br0" timeOffset="6361">927 3635 3167,'0'-4'9830,"3"0"-6729,0 4-6244,2 0 1257,-2 14 4192,5-10-2897,-4 27 2368,5-26-1008,0 26-1107,0-14 33,6 12 2141,-6-13 23,5 4-2159,-5-18 0,0 10 0,-2-9 0</inkml:trace>
+  <inkml:trace contextRef="#ctx0" brushRef="#br0" timeOffset="6527">1093 3680 3527,'10'0'0,"-2"0"0,0 14 4155,8 5-2299,-6 0-329,10 8-793,-8-24-1565,2 18 2520,1-19-2014,6 15 478,-4-16 1,6 6 0,-8-7 0</inkml:trace>
+  <inkml:trace contextRef="#ctx0" brushRef="#br0" timeOffset="6632">1347 3778 3977,'7'-20'9830,"-1"4"-5917,0 6-2714,-1 7-2156,0-7 1866,4 10-2702,0 0 290,9 0 1143,-4 0-3014,6 0 2933,7 0 1,-4 14-1,8 4 1</inkml:trace>
+  <inkml:trace contextRef="#ctx0" brushRef="#br0" timeOffset="7731">2700 5482 4606,'0'-19'9830,"-13"-1"-4686,9 1-2638,-9 1-2383,13 0 1429,-9-3-1352,7 7 796,-7-1 1034,9 30-2030,19 33 631,6 5-902,-6-3 0,-1 1 748,6 10-1008,-11-8 1,-2 0 301,2 11-154,-7-24 1,1 1-86,4-4 0,-1-2-992,-4 16 1535,2-16 0,-1-2 0,-1-2 1,-1 1-1</inkml:trace>
+  <inkml:trace contextRef="#ctx0" brushRef="#br0" timeOffset="8077">2808 5418 4066,'16'-18'6886,"-12"2"-2042,37 0-6169,-17 2 1207,27 0-712,-4 2 230,11 0 365,-7 4 1,3 1 462,-10 0 1,4 0-639,12 0 0,8-1 0,-3 1-359,-20 2 1,-2 0 0,5 0 721,1 0 1,6-1 0,3-1-1,-1 1 1,-5 1-268,11-2 0,-3 1 0,2-1 239,-1 0 0,3 0 1,1-1-1,2 1 110,-9 0 1,1 1 0,1-1 0,-1 1-1,-3-1-3,2 1 0,-4 0 0,2 0 0,5-1-17,-9 2 0,5-1 0,3 0 0,0-1 0,0 1 0,-2 1 0,-6 0-32,10-1 0,-5 1 0,0 0 1,5 0 19,-8 1 0,5-1 0,3 0 0,0 1 1,0-1-1,-3 1 0,-5 1-51,12-1 1,-6 1-1,-1 0 1,4-1 25,1 1 0,3 0 0,1-1 0,-1 1 1,-4 1-17,-2-1 1,-3 2-1,-1-1 1,1 0-26,2 0 1,-1 1-1,1-1 1,0 0 18,-1 1 1,0 0-1,0 0 1,5 0 26,-10 1 1,4-1 0,2 1 0,0 0 0,-1-1-1,-3 1-35,-1 0 1,-4-1 0,0 1 0,2 0 0,4 0 17,2 0 1,6-1 0,2 1 0,2-1 0,-2 1 0,-2 1 0,-6 0 6,10 2 1,-7 1-1,0 0 1,6-1-50,-10-2 1,4-1 0,3 0 0,1 0-1,-1 0 1,-4 1 0,-5 1-31,8 3 0,-6 3 1,-1-1-1,5-2-153,-2-3 1,5-1 0,2-1 0,0-1 0,-4 1-1,-5 1-24,12 3 0,-6 0 1,1-1 281,-5-2 1,3-1-1,-2-1 1,-5 1 0,-8 0-1,-3 0 1,-1 0 0,20 0-1,0 0 1</inkml:trace>
+  <inkml:trace contextRef="#ctx0" brushRef="#br0" timeOffset="8511">3612 6851 4336,'63'-18'3170,"3"13"-2773,-34-12 0,0-1 51,6 15 0,2 2-272,6-17 0,1 0-86,5 16 1,3 0-77,2-16 0,5-2-46,-16 13 0,5 1 0,1 1 1,-2-1 148,4-5 0,-1 0 1,5-1-149,-2 3 0,6 0 0,3 0 0,-2 1 0,-6 0-57,9-1 0,-5 1 0,5-1 71,-13 2 0,4-1 0,3-1 0,1 1 0,-3 0 0,-5 0-24,2 1 0,-6 0 0,2 0 0,7-1 13,-6 1 1,6-1-1,4 0 1,2-1 0,1 0-1,-2 0 1,-4 1-1,-4 1-16,14-2 1,-8 1-1,1 0 1,8 0-96,-13 1 1,6-1 0,4 0 0,2-1 0,0 1 0,-2 1 0,-5 0 0,-5 0 31,9 1 0,-8 0 0,-1 1 0,6 0 20,-10 0 0,5 1 0,2 0 0,2 0 1,-2 0-1,-3 0 0,-5 1-23,7 0 0,-4 1 1,-2 0-1,3 0-23,-1 0 1,3 0-1,0 1 1,-2 0-1,-3 0-130,11 0 1,-5 1 0,0-1-125,0 1 0,0 0 0,-1 0 373,0 0 1,-1-1 0,-1 2 0,-1 3 0,0 2 0,-1 0 0,0 0 0,0 1 0,0-1 0</inkml:trace>
+  <inkml:trace contextRef="#ctx0" brushRef="#br0" timeOffset="8811">10197 5342 6765,'0'-27'9830,"0"-5"-3097,0 9-3875,0 0-1629,0 75-500,10-20-615,-8 12 1,-1 7-126,5-3 0,-2-2 1230,-12-6 0,-3 1-1711,2 8 1,0 5-1,-1-3-113,-1 0 1,-3-2 153,-2-4 0,-2 2 0,3-2-250,5 6 0,0-1-224,-12 1 1,0 1 884,6 0 0,1 0 0,0 1 0,-1-1 0,1 0 0,0 1 0</inkml:trace>
+  <inkml:trace contextRef="#ctx0" brushRef="#br0" timeOffset="9711">283 6142 4966,'0'-18'9830,"-17"-3"-6404,12 7-1539,-32 0-3457,14 8 56,-22 22 745,10-12-368,3 40 3060,4-2-2989,15 13 1910,-2 5-732,15 4 2240,0-19 260,22 14-971,8-15 1,14-13-2043,-16-10 1,1-3-397,8-2-1050,6-2-121,-6-10-891,-12-2-116,10-19 1471,-19-1 1180,-3-16 1342,-8 6 721,-5 4 549,0 35 151,0 3 420,20 29-667,5 16-774,0-11-1161,-5-14 0,-1 1-171,-8 2 1,-2-2-204,14 18-201,-8-10 1,-5 0-62,-8-1 277,7 11 649,-9-13 224,0-14 128,-21 6-1665,15-17-28,-32-3-3122,18-4 913,-15-5 2409,16-16 0,-5 10 0,12-12 0</inkml:trace>
+  <inkml:trace contextRef="#ctx0" brushRef="#br0" timeOffset="9894">828 6266 4696,'18'0'270,"-1"18"4029,0-13-4373,-1 35 2940,1-22-1910,4 35 544,-6-18-388,3 12 1251,-8-14 95,0-1-1747,0-2 621,1 7-1711,-3-11 553,5 6 0,-7-19 0,2 0 0</inkml:trace>
+  <inkml:trace contextRef="#ctx0" brushRef="#br0" timeOffset="10063">1045 5833 3707,'21'22'5416,"8"4"-4125,-12 13-822,16 11 1,-5-19-1,1 11 1</inkml:trace>
+  <inkml:trace contextRef="#ctx0" brushRef="#br0" timeOffset="10378">1510 6191 4966,'0'9'9830,"0"11"-2377,0-4-5315,-16 17-2273,13-12 689,-26 18-1224,26-16 1282,-9 7 1520,12-2-2402,0-8-269,16 10-529,-12-15 1324,29 1-2436,-9-7 855,10-5-1166,6-1 238,-14-3-819,3-19 1797,-6-1 1363,-7-19-94,-2 9 1302,-8 4 3,-6 26 649,0 9-464,0 22-717,0-3 1,0-12 0,0-4 0</inkml:trace>
+  <inkml:trace contextRef="#ctx0" brushRef="#br0" timeOffset="10544">1652 5626 5596,'-14'-10'4827,"-4"4"-4672,12 3 147,-5 21 1082,3-14-2617,4 41 1805,0-18 1,4 26 0,0-8 0</inkml:trace>
+  <inkml:trace contextRef="#ctx0" brushRef="#br0" timeOffset="12745">1087 9317 5775,'3'-13'9830,"0"0"-3360,-3 1-3721,0 0-852,0 2-722,0-1-221,0 3-373,0 1 2491,0 0-2808,-15 4-2411,-2 0-439,-16 18 363,-4 8 153,7 10 633,-3 3-28,12-6 122,1 1 87,4-1 2474,0 9 628,9-10-344,1 3-16,6-14-228,0-5-63,23-6-2645,4-2-186,25-41 647,-12 11 532,-14-12 1,-2-4-111,5-8 255,-10 14 1,-2 0-565,2-20 227,-2-4 2622,-10 2-752,0 15 0,-2-2 525,-3-20-853,1 12 1,0 1 285,-3-4-152,0-9-62,-14 20-1097,10 15 800,-10 0-1171,14 39 838,0 36-348,0 8 36,7-16 1,1 0-222,-7 2 1,2-1 237,22 21-14,-18-9 1,-3 1-29,9 5 208,-4-21 0,-2 0-870,-5 11 301,14-3-624,-10-1-492,9 9 359,-6-14 662,2 6-509,-2-20 237,0-4-948,1-4 1247,2-6 1,-1-5 0,2-2 0</inkml:trace>
+  <inkml:trace contextRef="#ctx0" brushRef="#br0" timeOffset="12884">1523 9345 5056,'7'0'540,"-2"0"-630,-1 0 180,0 0-90,-1 0-90,2 17 2099,0 1-520,0 2-944,8 9 10,-6-13 1,3 3 0,-4-7-1</inkml:trace>
+  <inkml:trace contextRef="#ctx0" brushRef="#br0" timeOffset="13044">1695 8917 5326,'-13'-8'984,"3"19"109,10 5 1,17 3 0,6-5 0</inkml:trace>
+  <inkml:trace contextRef="#ctx0" brushRef="#br0" timeOffset="13260">2190 9159 5326,'-22'10'4460,"-13"1"-3624,31 1 3028,-30 7-3849,14-1 575,-14 13-13,16-9-183,5 6 1413,13 1 262,0-6-520,24 14-2408,-18-16 380,24-6 1,7-4-1681,-8 0 1908,5-6 0,2-2 1,7-1-1,1-2 1</inkml:trace>
+  <inkml:trace contextRef="#ctx0" brushRef="#br0" timeOffset="13628">2637 8587 5056,'0'-10'9830,"0"3"-938,0 25-6664,14-13-2202,-12 26 1,0 5 964,31-4-1198,-30 3 0,-2 2 920,30 9 1130,-28 1-1884,23 0-1036,-23-2 1024,23-2-166,-16-4-341,17 6 356,-11-14-908,7 8 1200,-11-23-1279,0-3 597,-5-9-1579,-1-3 537,0-1-1038,3-23 2967,1 17-1414,11-52 1510,-6 35-246,-1-9 1,-1 0 471,4 1 640,6 3 200,-3 5 413,-5 19-3740,6-9 1927,-9 13-2555,2 17 1839,-5-13-1401,-3 33 1822,1-19-75,-5 22 429,0-9 955,-2 5-570,0-1 0,0 3 0,0-1 1</inkml:trace>
+  <inkml:trace contextRef="#ctx0" brushRef="#br0" timeOffset="13811">1838 9866 5775,'27'-14'1398,"14"11"-3746,-10-27 2596,11 27 1,3-23 0,-11 12 0</inkml:trace>
+  <inkml:trace contextRef="#ctx0" brushRef="#br0" timeOffset="14161">3913 8891 6945,'10'-1'606,"0"0"-305,0 1-482,-1 0 251,-1 14 2616,-2 3-196,7 21-636,-6-8 737,14 16-493,-7-18 27,8 7-52,-5-13-280,3-3-2203,-1-3-663,9-1-356,-7-8-563,12 0-127,-13-7-1028,12-22 1526,-10-5 571,3-15 468,-4 1 499,-2 7 360,0-2 1,-1 2 0,0 0 0</inkml:trace>
+  <inkml:trace contextRef="#ctx0" brushRef="#br0" timeOffset="14511">4802 8776 5236,'3'14'9830,"1"9"-4627,-3-13-2877,1 9-650,-2-5-363,0 1-413,0 0-293,0 1 2465,0 1-2590,0 1-154,0 7-17,0-7-255,18 10-1190,1-14-714,3 1-122,10-9-852,-17-4 5,16-1-307,-5-1 53,1-15 990,2 11 393,11-43 2422,-9 25-276,-7-8 0,-1-2 1346,0-1 95,4-9 273,-14 17 72,-3 3-1080,-3 5 559,-3 2-1507,-3 23 39,0 8-133,-1 16-13,0 3-237,0-3 274,0 4 1,-11 2 0,-3 3 0</inkml:trace>
+  <inkml:trace contextRef="#ctx0" brushRef="#br0" timeOffset="14666">4807 9681 8204,'-4'2'267,"2"-11"0,18 6 0,5-8 0</inkml:trace>
+  <inkml:trace contextRef="#ctx0" brushRef="#br0" timeOffset="15103">6112 8647 8654,'-25'0'1354,"9"19"0,8 4 0</inkml:trace>
+  <inkml:trace contextRef="#ctx0" brushRef="#br0" timeOffset="15224">6140 8974 7754,'0'14'9830,"0"-3"-3276,0-3-6042,0-3 0,0-3 0,0-1 0</inkml:trace>
+  <inkml:trace contextRef="#ctx0" brushRef="#br0" timeOffset="16068">7978 8200 5955,'5'-8'9830,"-2"19"-5698,-2 17-1223,-1 9-1026,0 9-628,0-5-359,0 5-583,-11 4 1879,8 0-2591,-3-15 0,1 0-321,5 16-424,0-12 1,0-2 1143,0-1 0,0 6 0,0-22 0</inkml:trace>
+  <inkml:trace contextRef="#ctx0" brushRef="#br0" timeOffset="16596">8055 7983 4336,'18'-10'4491,"0"1"-3104,16 2-1916,0-1 355,3 0 72,9 0-195,6 0 171,7 1 202,-26 3 0,1 0-480,0 1 1,2-1 52,0 1 0,3 1 119,17-1 1,1 1 47,-13 1 1,1 0 25,3 1 0,5-1 0,-4 1-5,-5-1 1,-1 2 92,13 5 1,-2 2 43,-17-7 1,-3 1 47,1 5 0,0 1 14,9-2 0,-1 0 123,20 8-35,-25-8 0,-1 3 217,18 26 838,-17-18-812,-11 6 1,-3 2 932,-2 3 231,3 8 32,-13-7 389,-2 0 42,-1 3 102,-1 1-706,-2 1 279,-2 1-414,-1 1-130,-1 2-30,-1 0-472,0 18-56,-1-13-309,0-7 0,0 0 219,0 5-141,-18 11-746,13-18 326,-24-3-1343,26-2 1455,-35 4-1658,20-9 504,-38 10-724,24-18-327,-17 1 519,12-8-611,-6-2 1121,-3-3-168,8-1 1,-2-2 70,-24 0 420,4 0 0,-2 0 399,22-1 1,-1 0-12,-13 1 1,-1-2 228,11-7 0,1 0 224,-1 6 1,0 0-31,-2-5 0,1-1 86,-1 2 1,1 2-100,1 2 1,0 1 79,2-3 0,0-2-662,-9 0 1,1 2 79,16 3 1,1-1 546,-9-6 1,3 0-1,10 7 1,0-4-1</inkml:trace>
+  <inkml:trace contextRef="#ctx0" brushRef="#br0" timeOffset="17978">11172 8319 6675,'-38'16'3549,"0"5"-2032,21 12 1512,-14 0-1936,16 13 712,-4-10-963,4 26 215,14-28 1951,-4 7-1034,26-17-1487,-16-4-200,37-4-1178,-36-4 500,43-5-1480,-27-3-421,39-4-696,-27-19 1133,22-4 965,-28-13 83,3 2 1782,-14 8-1085,-10 0 2634,4 1-174,-10 2 790,3 3-1504,-4 1 567,0 1-1354,0 52 263,14-21-2326,-10 43 738,10-31-655,0 0-769,-10-3 1674,23-2 1,-24-10 0,11-3-1</inkml:trace>
+  <inkml:trace contextRef="#ctx0" brushRef="#br0" timeOffset="18298">11763 8443 5326,'8'0'990,"0"0"-721,0 16 4408,-2-12-3656,2 27 1683,-1-28-2651,4 29 1381,-5-12 1083,5 16-51,-5-15-91,2 4-2261,-4-18 751,2 4-1363,-4-6 1869,2-5-3861,0 0-118,7-15 1925,-2 11-1051,13-29 1178,-7 6 526,15-18-225,-13 8 421,4 13 1680,-8 3 291,-3 18-3328,-2-9 2261,1 12-2966,-4 0-364,2 18 2413,-3 7-827,3 18 866,-4-18-56,5 13 1148,-5-33-1201,3 23 0,-1-26 0,2 9 0</inkml:trace>
+  <inkml:trace contextRef="#ctx0" brushRef="#br0" timeOffset="18500">11370 7684 5146,'-20'0'360,"1"16"3345,10 9 138,2 22-1642,28-4-2746,-5-11 1,3-1 551,28 9 1,-19-13 0,1-1-1,16 10 1</inkml:trace>
+  <inkml:trace contextRef="#ctx0" brushRef="#br0" timeOffset="18870">13368 8296 5686,'-47'0'0,"0"0"90,22 18 2184,-13 2-1256,23 1 929,-6 24-141,11-26-619,29 37 1256,-15-28 317,35 19-1030,-13-21-1402,0 6 482,15-14-1795,-36-3 1268,28-2-1511,-29-1 1290,9-5-2184,-13 0 2384,-20-5-3045,-1 0 2478,-16-14 1,18 9-1,6-9 1</inkml:trace>
+  <inkml:trace contextRef="#ctx0" brushRef="#br0" timeOffset="19245">13850 8433 4876,'-20'17'5875,"-13"-13"-6981,29 25 5673,-30-26-6009,29 25 3916,-26-24-3605,27 27 2906,-10-19-384,5 14-539,7-3 1612,-7-4-3173,9 0 3504,22-7-4752,-16-5 3260,34-2-4100,-17-3 1470,12-2-1106,-2-16 448,-3 12 58,-7-29 914,3 11 2041,-15-19 214,-3 8 1391,-8 2 555,0 6-26,0 9-1170,0-4 465,0 55-2253,0-6 763,0 29-1387,0-21 348,17-15 1,-12-2 0,13-1-1</inkml:trace>
+  <inkml:trace contextRef="#ctx0" brushRef="#br0" timeOffset="19602">14355 8355 5596,'0'11'9830,"0"6"-1838,0 25-5944,0-8-909,0 1-230,15-11-1634,-11-2 816,10-1 1570,-2-4-2912,-9 0 915,17-8-2615,-18 1 2309,13-9-2418,-9-14 3091,3 9-1977,4-29 2430,-7 7 259,6-7-1010,-3-16 2434,0 22-2317,4-13 2576,-4 27-2701,2-7 1518,-4 18-3086,1-3 367,0 5-814,0 14 1703,-1-10-1140,0 29 1299,5-7 224,-2-2-1178,12 18 1729,-7-19 0,10 1 1,-4-6-1</inkml:trace>
+  <inkml:trace contextRef="#ctx0" brushRef="#br0" timeOffset="19916">14945 8336 5236,'-19'16'5881,"5"5"-2623,14 23 601,17-10-3075,-12 3 733,30-14-2449,-31 0 1679,49 3 138,-29-13-1320,31 9-696,-8-16-1615,-10 3 1086,19-5-868,-27-4 1645,9 0-1559,-23 0 2097,-1 0-623,-11 15 2875,-23 3-1249,-1 18 266,-24 0-714,11-13-149,-1 8-61,6-27 168,1 21 1,-1-22 0,-1 7 0</inkml:trace>
+  <inkml:trace contextRef="#ctx0" brushRef="#br0" timeOffset="20111">14985 7297 6765,'0'-27'9830,"0"6"-3636,-17 7-8074,-3 8-587,-13 3-258,0 25 61,-14 13 2692,6 15 0,12-21 1,-1-1-1,7-4 1,-1 0-1</inkml:trace>
+  <inkml:trace contextRef="#ctx0" brushRef="#br0" timeOffset="20746">8313 10466 6495,'-3'-6'9422,"2"2"-5634,-3 1-4195,2 2-949,0 23 3636,1 10-1435,1 8 0,0 4 460,0 16 231,0-19 0,0 1-1515,0-7 0,0-2-458,0 20 431,1-10 1,-2-1 1442,-13 5-3244,10 10 1753,-10-27 1,14-5-1,0-5 1</inkml:trace>
+  <inkml:trace contextRef="#ctx0" brushRef="#br0" timeOffset="21244">8268 10606 4336,'20'-20'6322,"9"0"-5385,-25 3 2618,32-1-4286,-14 2 674,23-1-581,-4 4 61,6 1 1098,4 3-1164,-11 4 0,2 0-295,24 1-344,-10 1 0,0 1 865,-22 1 1,0 1-180,7-1 0,1 0 269,-3 0 0,-2 2-30,18 13 325,-13-14 1,-3 4-100,3 27 1437,19-12-735,-31 2 641,6 11 175,-15-19-340,-3 15 877,-3-8-328,4 12 275,-6-9-1021,5 20 834,-8-17-511,5 19-172,-4-16 293,4 9-934,5 5 81,-5-10-327,15 25-57,-12-23-192,6 10-134,-7-14-54,0-1 8,-2-2 98,-2-1 244,-3-1 72,-2-3 314,-5-2 199,-1-2 308,-2-4 240,-26 3-1933,19-6 312,-26-3 0,-7-4-1346,7 0 778,-4-3 0,-3 0-1355,-15-2-380,-3 0-152,-9 0 1389,32 1 0,0-2 996,-3-7 1,0 0 142,-1 6 0,-3 0 122,-18-15 0,-2 0 73,14 15 0,-2 0-259,-4-7 1,-4-2-1,5 1-151,4 3 0,3 1 645,-14-1 1,2-1-1,22 0 1,1-1-1,2 5 1,-1 0-1</inkml:trace>
+  <inkml:trace contextRef="#ctx0" brushRef="#br0" timeOffset="24828">11262 10391 5146,'0'-11'9830,"0"2"-1208,0 3-6484,0 20-909,0 3-410,0 21-144,0 1-146,0 8 2543,0 8-2982,0 4-180,0 2 180,0 2-90,0-4-180,0 0-360,0-3-269,0-2-361,0-1 1,0-5 90,0-2 1079,0-6 0,0-1 0,0-3 0</inkml:trace>
+  <inkml:trace contextRef="#ctx0" brushRef="#br0" timeOffset="24995">11048 10947 3527,'32'-20'4731,"18"0"-4361,-28 0 216,7 6 0,4 0-552,10-7-322,-6 4 1,2 1-222,9-3 492,-16 7 0,-1 0 0,13-4 1,1 0-1</inkml:trace>
+  <inkml:trace contextRef="#ctx0" brushRef="#br0" timeOffset="25250">11733 10448 3617,'0'-4'9830,"0"24"-1298,0 11-6484,0 15-729,0 4-410,0-6-414,0 6-56,0 1 1087,5-13 1,1 1-1795,-4 22 189,4-22 0,-1-1-174,-5 15 164,0-4-1,0-2-360,6 11 225,1-16-885,6 9 348,-2-29-741,4-5-130,-4-13-1435,14-26 2800,-7-10 0,9-14 1,-7-2-1</inkml:trace>
+  <inkml:trace contextRef="#ctx0" brushRef="#br0" timeOffset="25710">11992 10989 2807,'27'-45'8955,"-10"24"-6210,12-13-1689,-20 33-2699,8 11 1476,-9 15 1794,9 23-564,-5-7 1446,4 2-2125,-2-11 32,0 0 138,4-3 1055,11 6-1286,-4-13-2214,23 0 171,-17-16-480,24-18 354,-23 8-271,8-33 1428,-15 31-832,-4-40 2069,-5 27 239,-2-33 1371,-8 21 650,0-14-321,-6 24 735,0-4-1612,-13 17-998,10 23-117,-11 10-209,30 24-472,-12-13 378,11-2-882,5-14-1003,4 1-442,21-11 1369,-8 0-1535,13-10 182,-20-18 721,20-5-616,-26-12 1637,7 2 609,-14-5 944,-6 10 906,1-14-153,-8 20 817,0-3-1099,-2 12 304,1 21-1375,0-7-2462,0 32 1514,6-7-39,-2 7 347,7 2 1,-2-12-1,3-1 1</inkml:trace>
+  <inkml:trace contextRef="#ctx0" brushRef="#br0" timeOffset="26002">13227 11182 3167,'12'1'669,"1"-1"-576,0 0-149,9 0-31,-4-17 1959,6 13-1806,-4-29 1748,-1 29-1429,2-31 1537,6 12-653,-8-12 1215,7-4-218,-16 16-1120,-1-13 1261,-7 18-1335,-2-5 1704,0 11-1658,0 3 949,-22 1-3346,1 4-282,-4 24 650,-3-14-1269,26 39 2121,-10-11-501,12 11 380,0 18-270,23-25-227,5 22 996,14-28 1,-3 6-1,-8-16 1</inkml:trace>
+  <inkml:trace contextRef="#ctx0" brushRef="#br0" timeOffset="26278">13200 10647 3347,'17'-10'5158,"8"-6"-3369,-3 3-1106,40-12-730,-37 11 54,11 2 1,3 1-294,-2 0 119,11 1 643,-16 6-1442,-1 4-378,-1 0-743,8 15 1164,-11 10 1199,5 10 0,-14 7 0,0-7 0</inkml:trace>
+  <inkml:trace contextRef="#ctx0" brushRef="#br0" timeOffset="26544">14405 10730 5865,'0'-4'9830,"15"17"-6472,8 10-3459,8 9 220,5 3-396,-8-6-236,4 1-32,-1 2 688,-7-8 1,0 0-2590,11 10 1442,11 12 1009,-16-17 1,-3-3-1,-1 0 1</inkml:trace>
+  <inkml:trace contextRef="#ctx0" brushRef="#br0" timeOffset="26744">14838 10751 5236,'0'-17'9830,"-14"3"-6984,-6 7-4400,-9 3-146,1 4 235,-11 41 2216,7-12-434,10 2 0,0 4 1646,-10 12-3400,1 5 1182,3 4-59,12-16 0,0 2 708,6-9 0,1-1 1,-1 9-1,1-1 1,5 16-1</inkml:trace>
+  <inkml:trace contextRef="#ctx0" brushRef="#br0" timeOffset="27144">15378 10979 4336,'8'0'90,"-1"0"-180,1 0 180,6 0-90,0 0 0,14 0 0,-7 0 180,17-16 648,-17 11-454,6-23 1195,-10 14-104,-6 0 590,-2-20 701,-7 21 162,-2-27 333,-21 21-2544,15-6 1667,-29 5-2952,15 8 344,-13 1-821,2 8-1446,13 20 1343,1-12-1535,15 34 4328,-5-19-2124,7 22 1851,0-7-1950,0 19 1079,21-10 1,-16 11-1,16-17 1</inkml:trace>
+  <inkml:trace contextRef="#ctx0" brushRef="#br0" timeOffset="27810">15988 10739 4696,'0'16'9830,"17"-15"-9872,-12 41 3722,12-24-3460,-1 21 780,-12-9 217,23 3-1208,-25-2 2900,18 3-3935,-18-4 3794,13-2-3556,-13-3 2118,9-5-1533,-7-1 146,1-6-726,0-3-135,-5-21 1789,2-8-969,-2-24 1086,0-6-945,0 4 941,17-10-1098,-12 26 843,25-5-1230,-28 17 586,21 8-1995,-8 4-382,10 5-600,0 18 1136,-6 8 1131,-2 10 60,-7 0 1435,0-8-1189,-2 0 2123,-1 7 172,-2-11 681,-1 6-1700,-1-16-528,-1-4-456,4-21-509,0-11 630,10-24-576,-3 7 266,13-20-185,-9 23-231,7-10 134,-7 17-100,-2 5 852,1 3-572,0 3-257,-4 9-180,5 1-580,-8 8-846,7 20 1807,-3 5 525,3 12 117,-2 0 192,0-9-36,1 3-144,0 0 92,3-1 43,-1-3-450,2-1 1,5-6 0,1-1 0</inkml:trace>
+  <inkml:trace contextRef="#ctx0" brushRef="#br0" timeOffset="28195">17060 10743 4966,'-25'16'4555,"3"2"-2438,8 19 986,-1-7-1633,14 1 644,-5-7-1045,6-2 211,0-1 1432,0-1-1184,23-3-1835,-17-2 109,32-2-1498,-20-6-752,14-1 202,-5-6-736,-11-18 1938,-1-3 187,-14-18 3281,4 9-1944,-5-5 1844,0 10 125,0 1 276,0 28 167,0 9-1848,23 25-1519,2-1-1234,15-15-691,-5 6 1796,-7-25 0,3 9 0,-1-12 0</inkml:trace>
+  <inkml:trace contextRef="#ctx0" brushRef="#br0" timeOffset="28580">17547 10802 5056,'0'10'9830,"0"2"-3726,14 22-6126,10-9-1030,8-9-621,3-7 170,-8-1 370,0-6 1274,-1 6-2610,-1-8-513,3 0 990,-10 0 829,2-15 1999,-11 12-35,-5-30 1766,0 18 86,-4-14-94,-12 30-2316,9 15 2754,-9 19-390,12 28-716,0-18 419,0 19-2032,16-13-408,-12 1 75,11 3 2348,-2 3-2371,-10 0 707,10 0-809,-12-18 1,-2 0-139,1 18-402,0-13 1,0-3 138,0 0 348,-20 12 0,-3-33 1,-19 1-1</inkml:trace>
+  <inkml:trace contextRef="#ctx0" brushRef="#br0" timeOffset="28766">18017 9264 5775,'-50'-3'-496,"10"17"1296,-7-10-2234,8 40 1765,-7-16 0,21-1 0,-1 3 1,-1-4-1,0 0 0</inkml:trace>
+  <inkml:trace contextRef="#ctx0" brushRef="#br0" timeOffset="29446">8613 13096 5506,'-5'16'9786,"-3"2"-6892,7 17-63,-4 0-1567,3 5 42,-1 8-878,3-9 0,0 1 282,-1 24 818,1-22 1,0 1-1431,0-4 1,0-1 136,0 18-804,7-14 0,1-1-126,-4 0 551,23 11 1,-25-31-1,10-1 1</inkml:trace>
+  <inkml:trace contextRef="#ctx0" brushRef="#br0" timeOffset="29980">8648 12962 4066,'26'-24'6563,"11"3"-5495,-22 5-839,26 1 0,8 2-793,4-2 398,-5 5 0,9 0 0,-7 3-113,-15 3 0,-2 2 9,23-1 0,-1 0 363,2 3-1531,1 0 419,-3 0 587,-18 7 0,0 2 471,19 6 10,-13 1 0,-2 1 522,3-2-34,8 11 302,-25-22-610,-3 22 1499,-4-15-902,-6 10 553,-4-4-163,-4-2 328,-4 16 811,-1-6-365,-19 32 258,-4-19-2103,3 0 0,0 1 896,-2 9-863,12-16 1,2 2 101,0 0 1,1-2 104,3 18-480,-6-8 1,5-1 50,27 5-84,-11-7 0,2-1 511,13 5-587,-4-15 1,-1 0-416,-3 9 123,21 0-777,-14-1 400,-2-1-154,-3-1 702,-8-4 686,8 10 82,-18-13 1091,9 10-1254,-12-19 1319,-17 1-1747,12-8 499,-36-2-1821,21-2-201,-25-3-270,8 0-701,-8-3 1442,10 0 0,-2-1-1932,-24 0 2379,4-7 1,-1-1-305,20 7 0,2-1 1051,-15-14 0,0-1-162,12 15 0,3 0 238,-2-12 0,-1 0-148,2 12 1,-2 1-327,-12-8 1,0-1 59,14 9 1,1 0 361,-16-7 1,3 0 0,4 7 0,-3-6 0</inkml:trace>
+  <inkml:trace contextRef="#ctx0" brushRef="#br0" timeOffset="30602">11065 13288 4966,'-8'-7'5554,"1"2"-3165,7 1 3163,0 1-2832,19 3-4958,5 14 1879,0 8 382,22 13 1247,-28 1-384,24-2-920,-15 3-1201,1 3-56,-2 1 2818,-1 1-1827,4 13 84,-9-14-1315,8 18 1535,-15-32 0,3 4 0,-8-15 1</inkml:trace>
+  <inkml:trace contextRef="#ctx0" brushRef="#br0" timeOffset="31045">11858 13178 6585,'-19'25'7730,"14"16"-2305,-33-20-6490,33 23 3399,-39-5-2678,25 4 1014,-22 0-679,20-12 0,1 0 1808,-10 15-2018,6-8 0,1-2-1202,-2 2 1532,-11 17-1292,19-30 1211,-2 2-864,9-16 406,2-4-389,0-3-784,1-3-37,0-15 1857,1-12 477,4-8 329,1-11 166,1 4 415,0-5 124,0-2-650,10 11 0,2 0 1128,7-18-1887,-7 20 1,1 2-276,15-7-641,-25 7 1146,24 3-1788,-11 16-225,9 2-510,-3 12-381,-3 0-68,1 22 1746,14 8 219,-7 15-28,-2-13 0,1 0 471,5 10-157,-3-5 0,1-1 57,8 7 369,-14-16 1,1-1 74,12 6 0,1-4 0,4-3 1</inkml:trace>
+  <inkml:trace contextRef="#ctx0" brushRef="#br0" timeOffset="31262">12708 13208 5955,'-44'23'4913,"4"9"-2527,12 15 247,-4 2-1367,17 13 656,-3-11-1646,7-6 1,3 2 114,6 7 273,-2-10 0,0 0 288,4 4-626,0 9-239,23-25 1,-18-5 0,18-4 0</inkml:trace>
+  <inkml:trace contextRef="#ctx0" brushRef="#br0" timeOffset="31477">13070 13260 5146,'3'-7'9653,"-1"2"-6559,1 20-407,-3 21-814,0 4-422,0 13-658,0-15-334,0 0 2073,0 1-3560,12 15-156,-9-14 1114,23 10 1,-22-21 0,10-2 0</inkml:trace>
+  <inkml:trace contextRef="#ctx0" brushRef="#br0" timeOffset="31677">13297 12769 6585,'-16'-6'2379,"3"2"-3594,8 2-795,4 16 2709,-4 7 1,27 10 0,6 2 0</inkml:trace>
+  <inkml:trace contextRef="#ctx0" brushRef="#br0" timeOffset="32136">13712 13699 4696,'11'-20'8852,"-8"1"-3957,8 1-3966,-11-4 1338,0-3-815,0-3-415,0-4-259,7-2 1871,-5-3-1732,12-3-1299,-8-1 1173,8-3-1067,-6 11 1,1 1-318,5-16 306,-2 8 0,0 1-284,1-1 490,3-15-294,-10 32 693,0 0 38,-4 15-272,0 4-434,1 27 651,1-3-151,-1 12 0,2 4 219,2 13-187,0 1 0,2 2-129,-3-19 0,0 0 14,1 13 1,1-1 244,5 18-33,-2 2-788,1-2-256,-4-18 1,1-1 341,-4-10 1,1 0-308,3 20 0,-1-1 751,0 7 0,-4-23 0,-2-2 1,1 10-1</inkml:trace>
+  <inkml:trace contextRef="#ctx0" brushRef="#br0" timeOffset="32295">13762 14240 4696,'0'-45'9830,"0"7"-2917,17-6-6344,-12 6 590,44-3-2457,-21-3 924,0 22 0,4-1-666,6-10 1,0-2 1427,-7 10 1,-1-1-1706,12-7-1,-1 0 1058,-12 11 1,-2 2-1,2-1 1,-1 1-1,-1 0 1,0 0 0</inkml:trace>
+  <inkml:trace contextRef="#ctx0" brushRef="#br0" timeOffset="32466">14617 13297 5596,'-20'17'5729,"5"3"-2704,15 15 908,0-1-1700,0-5-1073,0 2-551,0 0-286,0 1 1849,0-3-1984,16 9-1,1-13 1,15 5 0</inkml:trace>
+  <inkml:trace contextRef="#ctx0" brushRef="#br0" timeOffset="32661">14670 12656 6405,'-18'-27'7954,"4"3"-5337,14 8 974,0 6-2480,0 3-3038,0 21 1984,18 9 0,-13 13 0,12 3 0</inkml:trace>
+  <inkml:trace contextRef="#ctx0" brushRef="#br0" timeOffset="62245">15783 1847 24179,'6'-7'324,"-1"0"-390,-1 1-233,0-1 190,-2 1-260,1 0 126,-2 2 121,2 0-94,-1 2 363,0 1 1010,-1-1-1061,0 2 744,1-1 715,1 1-681,2 14-2315,0-10 552,5 34-902,-4-20-1334,2 23 1572,-5-12-649,-1 2-645,-1 3-232,-1 14 2725,0-10-2656,0 20 1767,0-27 1399,0 6 1,0-17 0,0-2 0</inkml:trace>
+  <inkml:trace contextRef="#ctx0" brushRef="#br0" timeOffset="62777">15952 1273 24179,'0'-10'-5666,"0"2"3357,0 2 795,0-2-2092,10 5 4154,1-1 0,1 3 0,-4 1 0</inkml:trace>
+  <inkml:trace contextRef="#ctx0" brushRef="#br0" timeOffset="63327">16452 1819 24179,'0'26'-5396,"0"1"3447,0 0 975,-14 0 1823,10 2-1202,-10-1 954,14 3-1126,0 1-1072,-10 1 2202,7 0-453,-7-2 481,10 0-1473,0-1 509,0-1-756,0 10 997,0-13-90,16 5-1143,-12-14 701,12-4-1017,-16-2 1549,0-24 0,8-31 536,0-5-311,-4 15 1,1-1 150,6-10 719,-3-2-137,5 3-190,8-14 291,-3 18 374,19-14-163,-13 31 468,22 1 347,-20 16-177,10 3-271,-13 3-432,0 24-1709,-2-18 247,-7 25 1,-2 5-1363,4-8 625,-7 11 1,-2 4-1398,-3 3 1391,-1-6 0,-5-1-589,-23 8 1041,19 12 829,-41-21 1617,28-3-314,-19-4 859,-7 0-266,9-13 49,-27-2-242,26-29-2199,6 0 0,1-5 305,-5-21-2168,-5-11 527,17 8-1242,5-3-447,7-1 1165,6 12 1,2-1 1627,0-15 1,2-14 0,1 25 0</inkml:trace>
+  <inkml:trace contextRef="#ctx0" brushRef="#br0" timeOffset="63900">16367 2197 23819,'0'33'-5126,"0"-2"3267,0-4 1065,0 2 515,0 6 156,0-2 0,0 1-91,0 24 100,0-3 0,0 1-684,0-20 0,0-1 798,0 11 0,0 2 0,0 1 0,0-1-7,0-12 0,0 1 80,-7 22 1,0 1-101,3 5-380,-8-15 1,0-2-14,9 2-566,-2-16 1,0-1 1008,5-4 0,0 1 0,0-18 0</inkml:trace>
+  <inkml:trace contextRef="#ctx0" brushRef="#br0" timeOffset="64432">17278 1937 24988,'10'-17'-1447,"-4"2"267,0 4 764,-4 1-90,-1 3-201,-1 26-265,0 12 242,0 16-866,0 5 586,0-8 183,0 4 26,-14 0 899,11 1-365,-11-3 761,14 13-584,-11-17 564,9 17-567,-9-33-243,6 3 406,2-21 112,-5-22-804,5-18-223,1-13 748,2-6-377,0-14 388,18 13-92,-9-3 0,2-1 357,9 28 0,1 0-101,1-23 0,0 3 1245,16 8-541,-10 11 0,-1 2 972,8 1-46,20-5 450,-26 18-466,4 4-171,-10 6-698,-11 3-68,4 15-2107,-13 0-856,0 17-764,-3-5-445,-15 1 3072,11-6 0,-11-9 1,15-7-1</inkml:trace>
+  <inkml:trace contextRef="#ctx0" brushRef="#br0" timeOffset="65490">17320 1920 24718,'-17'7'3696,"-4"0"-2672,19 2-4167,-16 5 3531,16 3-2189,-15 6 1427,12 5-577,-5 4-66,6 23-1036,2-12 779,12-5 1,2 0 334,-7 4-346,17-14 0,4-2 959,-3 5-1108,24-1 1373,-4-4-248,1-6 733,6-6 652,2-7-228,-12-3 0,1-5 1241,22-19-1069,-9 5 1,0-3 206,-23-3 0,-2-3-583,10 0 1,-2-2-42,-4-4 0,-4-2 105,13-16-539,-12 5 0,-4 0-291,-2-7-72,-9 9 0,-2 1-1193,-5-3-450,1-8 231,-7 24 87,0 6 727,-1 5-61,1 6 127,2 5 1315,5 25-1854,-2-15 1264,11 59-886,-5-36 472,-4 4 0,2 1-303,5 6-183,2 0-140,3-3-1071,16 7 2438,-6-14-736,-1-10 1,1-3 1264,8-5-250,-4-4 0,0-4 1266,6-3 351,12-24 615,-20 4-252,-1-22-1351,-2 7-124,2-22-701,-9 9-480,-10 4 0,-2-1-669,-1-11 275,-6 18 0,-1 0-1163,0-14 44,-3 0 963,0 3-411,0-10 33,0 18 894,0-7-82,0 32 150,-14 4-89,11 31 469,-10 37 205,13 0-627,8-3 0,2 1-361,-5 7 158,13-8 0,0 1-626,-13 7 580,10-22 0,1 0-1063,-13 10 384,26-2-654,-18-4-126,19 8 1242,-14-17-1221,6 11 1790,-13-29 0,-1-1 0,-6-12 1</inkml:trace>
+  <inkml:trace contextRef="#ctx0" brushRef="#br0" timeOffset="65628">18682 1942 24269,'-26'-27'-5671,"6"1"3478,9 0-133,6 8 1174,41-5 3576,-5 14-1586,1 3 1,2 2-418,22 1-1403,6 2 1180,-27 0 1,1 1 53,-1 0 1,1 0 0,1 0-1,1 0 1,-1 0 0,0 0 0</inkml:trace>
+  <inkml:trace contextRef="#ctx0" brushRef="#br0" timeOffset="65994">20425 1281 26787,'1'-5'-4170,"0"18"1198,-1 18 1722,0 9 500,0 14 250,0-7 143,0 5-2,0-13 1,0 0-1508,0 22 918,-2-11 1,4-1 186,17 6-123,-17-11 0,1-2-46,16 3-565,-19 9 1495,0-23 0,0-3 0,0-3 0</inkml:trace>
+  <inkml:trace contextRef="#ctx0" brushRef="#br0" timeOffset="66152">20133 1931 24898,'-15'-27'-7871,"6"0"4794,3 2 1852,6 1 1213,0 1 4,23 4 1558,-18 2-1454,48 4-93,-26 2 2256,30 4-252,-10 2-1484,-11 3 1,2 2 551,20-1-924,-8 9 0,-1 1-264,9-5 1,-21 10 0,-1 2-1,12-2 1</inkml:trace>
+  <inkml:trace contextRef="#ctx0" brushRef="#br0" timeOffset="66516">20943 1900 23369,'7'20'-7818,"-3"-5"5360,-1 7 1679,-3-7 688,0 1 30,0 0 107,0 8-78,0-7-1654,0 12 2224,0-16-607,22 7 222,3-13 752,16 1 113,-3-7 417,-5 0 125,2-1-54,17-17 811,-14 12-1198,-8-10 1,-2-5 885,-1-6-1197,-8-3 0,-4-3-606,-6-12-680,0-17-799,-27 35-380,13-4-512,-27 21 1145,28 16 88,-19-3 1520,21 60-1376,-7-29 742,8 16 1,2 5-277,-1 7 387,7-4 0,2 0 40,-8-22 1,1-1-824,13 11 0,0 0-829,-11 19-400,10-5 1446,-2 0 216,-11-22 1,0-1 72,11 16-670,-11-16 1,-2-2-135,1-5 80,0 2 1427,0-21 1,-20-5 0,-5-4 0</inkml:trace>
+  <inkml:trace contextRef="#ctx0" brushRef="#br0" timeOffset="66980">21878 1737 24449,'10'20'-7929,"-1"-15"8466,-1 42-1974,-1-24 351,-1 26 726,1-6 14,-2 4 211,2 4-1742,0 3 2081,-1-17 1,0 1-1141,3 19 941,-1-11 1,2-2 197,-1 3-266,0-12 0,0-1-102,-2-1-1684,3 12 1517,-7-47 1656,-15-10-1059,-6-28-757,-1-7 78,-11 3 428,26-6 316,-25-7-413,25 12 0,4-2 211,-7 11 1,0-3-670,5-4 1,3-4 0,0 3 424,-2 3 1,2 1 634,8-12 0,1 2 676,-5-15-676,17 35 1,2 1 1365,-2-21-103,24 8 365,-12 10-148,-2 10 267,11 9-148,-12 7-251,11 42-2068,-23-10-611,-7 12 1,-4 4-394,-2 5-630,-3 17 110,-22-1 39,14-15 12,-13-10 0,-6-1-516,-10 2 2478,6-10 0,-1-1 0,-18-1 1,5 5-1</inkml:trace>
+  <inkml:trace contextRef="#ctx0" brushRef="#br0" timeOffset="67346">22563 1861 22740,'29'10'-2370,"0"-7"2805,0 7-1165,2-10 1407,1 0-286,2 0-111,-1 0 19,15-16 404,-15-5-194,-4 2 0,-2-1-141,1-13 347,11-12-478,-22 18-269,-2-21-883,-11 22-288,-2-8-290,-23 11-335,16 10-244,-33 1 1771,16 10 440,-12 41 57,13-13 629,8 37-739,13-3-712,0-9-170,6-7 1,5-2-584,19 8 1258,1-10 1,4-3 0,-3-16 0,1-3 0,6 6-1,-1-1 1</inkml:trace>
+  <inkml:trace contextRef="#ctx0" brushRef="#br0" timeOffset="67645">24042 1636 26697,'0'-11'-5935,"0"-1"3806,0 4 1065,20-1 4019,-14 3-2045,31 2-579,-12 2-514,18 16-1499,-6-11 940,7 24-178,-20-5 869,6 6 1,-15 5 0,-1-7 0</inkml:trace>
+  <inkml:trace contextRef="#ctx0" brushRef="#br0" timeOffset="67777">23968 2158 25078,'0'14'-5936,"0"-2"3718,0-3-105,23-4 2207,10-2-228,13-2 599,5-1 0,-7 0 1,3 0-1</inkml:trace>
+  <inkml:trace contextRef="#ctx0" brushRef="#br0" timeOffset="68244">26142 1439 24449,'-24'19'2152,"-20"-14"-1248,5 48-1712,-11-28 1096,14 10 0,1 3-422,-6 5-26,11-5 1,3 1-260,7 5-418,-5 11-354,23-21-1163,-4-3 241,32-3-2617,21 1 4667,15-12 0,-23-8 0,0-3 0,25-3 1</inkml:trace>
+  <inkml:trace contextRef="#ctx0" brushRef="#br0" timeOffset="68528">26647 761 25618,'-15'-4'-656,"3"18"883,-5 20-814,8 16 0,3 5-231,4-14 0,2 3 421,-3 7 1,0 6 0,1-6-35,1-7 1,2 0 155,5 5 0,2 4 0,-1-4-654,-5-3 1,1-2 175,15 12 1,0 0-234,-17-17 1,2-3 413,11-1 1,1-1-440,-11 32 497,10-25 1,0 0-656,-11 16 673,4-16 1,0-3-730,-7-2-253,0 6 522,0-28 1514,-16-3 0,12-9 0,-11-2 0</inkml:trace>
+  <inkml:trace contextRef="#ctx0" brushRef="#br0" timeOffset="68662">26707 1839 23999,'19'-17'1340,"-1"7"-72,17 19-2663,-6 14-704,-6-2 294,-2 19-650,-8-24 427,2 20-1364,-2-11-315,4-1 3189,1-3 0,2-3 0,2-2 0</inkml:trace>
+  <inkml:trace contextRef="#ctx0" brushRef="#br0" timeOffset="69012">27228 1871 24269,'15'18'-6422,"-11"6"3665,28-21 4956,-6 15-2638,9-16 1617,2 6-696,-6-8 305,1 0-787,19 0 1718,-14-15 909,21-1-1963,-31-2 890,5-20-1572,-23 21 629,-1-33-1649,-27 23-610,15-8 156,-39 2-528,15 10 519,-21-6 133,22 19 1062,-10 1 463,26 8 1045,-7 24 542,10 6-1092,8 14-1142,0 0-211,0-8-766,0 0-1944,28 14 181,4-12 2994,-8-14 1,3-1-1,20 4 1,-6-2-1</inkml:trace>
+  <inkml:trace contextRef="#ctx0" brushRef="#br0" timeOffset="69277">28223 1589 25618,'-17'-14'-5022,"13"2"897,-29 1 5432,29 5-2424,-24 2 2500,11 3-242,-5 20-79,-1-15-667,5 38 105,4-22 1354,-1 23-2180,7-8 1201,0 4-1791,6 20-701,0-15 184,10-6 1,4-2-2102,14 4 1925,-1-9 1,3-1-1179,16 0 2777,6 4 0,-12-17 0,1-3 0</inkml:trace>
+  <inkml:trace contextRef="#ctx0" brushRef="#br0" timeOffset="69616">28687 1035 24449,'13'-3'3729,"-2"0"-2943,-6 21-5484,0-13 3108,-2 40 43,-1-19 427,-1 27 276,-1-5-752,0 6-461,0 5 127,0 3 2388,0 2-779,0 0-40,0-2-223,0-19 0,0 0-468,0 17 512,0-21 1,0-1 539,0 23 0,0-20 0,0 8 0</inkml:trace>
+  <inkml:trace contextRef="#ctx0" brushRef="#br0" timeOffset="69847">29010 1505 25888,'-19'-10'-3314,"15"1"-513,-29 5 5700,13 1-760,-16 21 646,-3 10-1000,7 11-643,5 7-565,16-5-37,-3 1 1154,12 4-2474,-4 0 294,3-12 1,6 1-2086,21 15 3245,-9-9 0,4-3 0,29 2 0,-24-16 0,1 0 0</inkml:trace>
+  <inkml:trace contextRef="#ctx0" brushRef="#br0" timeOffset="70396">29785 1134 25258,'0'-38'-5936,"0"3"4078,-16 7-184,12 5 1303,-13 6 1226,17 5-639,0 27 218,0 4-1572,-9 27 1617,9-8 0,-2 2 23,-6-7 1,-2 3 84,7 7 0,2 4 1,-1-2 29,-3-3 1,0-1-152,1 13 1,1 2-70,3-6 0,0-3-15,-2-12 1,1 1-162,-1 16 0,4-2-329,15 1-48,-15-16 0,1-3-209,14-3-842,-17-1-50,0-18 848,0-20 29,0-26 502,0-5 468,11 4 0,1-1 1086,-6-8-715,15 16 0,0 0 1286,-17-10-1126,33 3 1120,-33 4-1144,34 9 1571,-33 5-1727,33 10 1118,-20 4-165,4 22-1842,1 11-23,-17 9-1215,4 6 833,-6-10-1433,-4 3 1660,-20-1-533,-5 13-678,0-13 1569,-4-9 0,1-1 1110,7-1-522,-9-6 1,0-4 0,13-4 0,-3 0 0</inkml:trace>
+  <inkml:trace contextRef="#ctx0" brushRef="#br0" timeOffset="70711">30350 1681 24539,'-59'14'2137,"13"-10"-2268,-1 22 663,15-23-665,1 40-606,-2-25 1090,17 26-1452,0-20 566,16 0-1618,0-2 586,0 0-591,20-2 387,-15-3-6,39-4 861,-23-3 903,21-4 168,7-2 1297,-14-2-317,20-20 538,-25-5-201,-6-22-43,-14 9-2469,-10 0-627,-19 10-1342,15 0 2554,-30 3 0,30 1 0,-12 1 0</inkml:trace>
+  <inkml:trace contextRef="#ctx0" brushRef="#br0" timeOffset="70950">30625 1650 23909,'16'0'630,"-1"0"-541,1 0-88,2 14-2063,0-10 1904,9 31-1558,-8-19 711,13 32-1280,-16-18-1005,9 23 439,-12-20 2385,-1-1 0,-1-1 0,2-2 0,4 15 0</inkml:trace>
+  <inkml:trace contextRef="#ctx0" brushRef="#br0" timeOffset="71131">31108 1428 25978,'-16'-6'-2272,"-1"3"1945,-3 23 815,-16 0-353,16 10 0,0 4-554,-6-9 1,-1 0-88,-5 11 0,2 2-238,4-7 0,2 0 699,-2 1 0,1 0 1,-1 1-1,1 1 1,0 0-1,0-1 1</inkml:trace>
+  <inkml:trace contextRef="#ctx0" brushRef="#br0" timeOffset="72064">20778 4003 25978,'-14'38'-3000,"10"2"545,-11-2 2341,15 8-1002,0 3 251,0 8 248,0 4 154,0 4-1134,0-2 863,0-2 557,0-3-557,0-6 734,11 9-441,-8-19-137,8 8-126,-11-31 524,8-4-407,1-13 1517,6-22 244,4-15-197,-5-11-504,-1 6 1,0-1 276,3-14-179,-2 5 0,-1 0 34,1-9-29,-4 22 0,-1 2-985,4-6-88,-1 7 533,1 9 383,4 11 799,-2 7 353,14 27-1715,-9 1-292,8 21-590,-5 0-415,1 4-354,3 6-575,2 1-976,2 2-383,4-2 3681,-6-18 1,3-2-1,-7-8 1,2-2 0,9 5-1,0 0 1</inkml:trace>
+  <inkml:trace contextRef="#ctx0" brushRef="#br0" timeOffset="72427">21870 4373 25168,'-34'-10'-1504,"-2"3"1472,1 4 522,0 3-29,1 0-64,5 19 188,4-14-91,6 38-1282,9-23 695,0 37-864,9-21-506,-3 11-252,30-16-380,-20-2-512,46-4 1288,-31-6 367,26-9 1311,-14 2 136,16-10 995,-12 3-255,14-25 1221,-25-5-474,0-13-1367,-17 1-76,-3 8-1093,-3-1 215,-2 1-959,3-1 332,-4 4-1441,0-4 847,0 10 202,0 27 603,0 17-42,0 20-69,0 0-95,0-8-1710,14 14 2493,4-14 0,-1 7 0,-3-18 1</inkml:trace>
+  <inkml:trace contextRef="#ctx0" brushRef="#br0" timeOffset="72966">22387 4371 24539,'4'0'1079,"1"18"-6709,-2-13 3199,1 33 1208,0-21 279,0 19 381,-1-5 137,2 1-1459,2 17 28,-3-13 2150,3 10-139,-3-19-280,-1-3 250,1-6-569,-1-4-925,-2-4 1344,0-28 447,-1-9-256,0-17 106,0-1 64,0 7 4,0-2 327,16-22 328,-12 15-338,12 9 0,0 1 546,-11 2-340,26-12 457,-17 33 244,12 0 446,-8 40-2306,2 10-669,-10 14 537,-2-14 1,-2-1-761,-1 9 743,0 13-852,-3-23-482,-2-6-434,2-6 1686,-1-5 545,1-8-251,3-3 207,-1-22 607,13-26 242,-5 0-422,1 3 1,1 1 304,0-4-175,0 6 1,1 0 526,2-2 293,5-8-272,-9 22-534,-1 6-107,7 8 1053,-7 5-387,11 20-1791,-10 13-1992,6 22 250,-5-3 280,2 0-735,-3-14 2459,0-2 1,1-4 0,1-2 0</inkml:trace>
+  <inkml:trace contextRef="#ctx0" brushRef="#br0" timeOffset="73250">23230 4551 23999,'8'0'630,"3"0"-720,-1 0 180,7 0-180,0 0 90,2 0 90,1 0-90,1-15 378,1 11-137,3-11 176,-3-2-150,8-3 74,-10-1-390,6-22-477,-15 26 116,-2-25-528,-7 6-330,-21 9-376,-3-18-636,-2 23 568,-8-10 958,17 20 55,-4 23 1652,8 21-991,11 16-770,-1-7 1,2-1-176,19 15 400,-19-16 0,2-1-1177,18-9 1,1-3 1698,1 28 0,0-28 0,2 0 0,17 25 0</inkml:trace>
+  <inkml:trace contextRef="#ctx0" brushRef="#br0" timeOffset="73748">24065 4478 26068,'24'-4'1807,"16"-1"-1625,-35 3 745,41 0-1463,-26 1 169,22 1-349,-12-1-261,0 1-912,10 0 448,-13 0 1123,12 15 1,-24-1-1,4 14 1</inkml:trace>
+  <inkml:trace contextRef="#ctx0" brushRef="#br0" timeOffset="73894">24265 4850 24449,'0'11'-5217,"0"-3"3089,22-1 2999,12-5 201,12 0-901,4-2-580,-7 0-461,0-18 1053,6 13 0,0-29 1,2 15-1</inkml:trace>
+  <inkml:trace contextRef="#ctx0" brushRef="#br0" timeOffset="74551">25492 3508 25348,'-24'0'270,"1"16"113,4 0-1364,5 3-650,3 9-504,3-25 1001,2 27 826,3-17 0,1 3 0,2-6 0</inkml:trace>
+  <inkml:trace contextRef="#ctx0" brushRef="#br0" timeOffset="74695">25543 3523 24539,'0'16'-9354,"0"7"8821,0 20 1,0 2 0,0-8 0</inkml:trace>
+  <inkml:trace contextRef="#ctx0" brushRef="#br0" timeOffset="75294">26508 4024 25078,'-45'-14'-1528,"0"-3"480,6 15 1849,-1-9-1049,-2 10 772,3-3-402,3 4 185,5 0-307,4 21 778,6 5-430,10 13-1319,4 21 1,7-18-665,0 18 662,10-26 1,3-1-1447,9 18 1047,1-8 1,0-1-1106,-3 5 331,14 9 1081,-30-23 450,20-3 567,-22-6-207,14 2 393,-15-12-724,5 0 418,-6-29 728,-14-6-347,11-24 33,9-1 259,23 6 424,-2 16 0,3 1 1296,16-2-1077,-11 6 0,-1 0 1716,10 0-609,15-5 363,-16 8-198,-1 2-375,0 0-1103,12-8-338,-14 4-449,18-12 59,-31 11-622,7-15-257,-23 13-597,0-8-197,-11 10-534,0 0-62,-21 0 440,-7-5-113,0 6 357,-18-3 664,20 12 767,-19 2 543,13 26 1437,14 9-933,11 13-1388,7 19-483,17-20-456,-6-4 1,3 0-1075,23 4 116,4 11 1920,-6-22 1,4-4 0,2-3-1</inkml:trace>
+  <inkml:trace contextRef="#ctx0" brushRef="#br0" timeOffset="75627">27268 4011 24449,'0'-5'-5127,"0"1"3179,0 24 973,0 19 427,18 6-852,-13 10 1054,27-1-164,-28-12-484,8-7 1,1 0 285,-3 3 207,2 8 78,-4-22-150,-2-4 728,-5-5-276,9-6 600,-9-21 60,2-33 421,-3-2-459,0-19-168,0 20 420,17-1 292,-13-3-877,26 1 216,-26 1-1290,24 2-308,-8-9 277,8 17 1241,-3-5 0,-8 22 0,-1 4 0</inkml:trace>
+  <inkml:trace contextRef="#ctx0" brushRef="#br0" timeOffset="76083">27960 3971 23639,'0'-5'-3867,"0"22"2008,13 8-190,-9 15 1453,20-2 54,-21-5 433,18 0-190,-18 2-1352,27 13 1282,-17-14 156,7-7-1,2-2 664,1-2-197,10 4 346,-8-17 553,2-5 287,0-2 31,2-3 226,-1-19 353,2 14-1836,-10-22 0,-1-5-233,10 6-508,-5-12 0,-3-4 526,3-2 1,5-15-1,-12 17 1</inkml:trace>
+  <inkml:trace contextRef="#ctx0" brushRef="#br0" timeOffset="76327">28842 3985 25798,'2'23'-6178,"0"-4"4235,-1 5 1021,-1-7 554,0 9-27,0-2 177,0 4 55,0 4-1434,0 1 1635,-12 4 303,9-2-1559,-9 15 685,12-15-1086,0 18 90,0-28 1529,0 3 0,0-16 0,0-3 0</inkml:trace>
+  <inkml:trace contextRef="#ctx0" brushRef="#br0" timeOffset="76494">28842 3686 25258,'0'-27'-7195,"0"-3"4797,-9 11-2999,7 1 5487,-7 32 0,25-13 1,4 19-1</inkml:trace>
+  <inkml:trace contextRef="#ctx0" brushRef="#br0" timeOffset="76728">29348 3907 27057,'-34'0'720,"15"17"-668,-16-13 511,12 51-2059,0-30 1347,5 4 0,5 2-792,10 7-444,-9 6-138,12-1-343,0 1-20,0 1-403,0-3-293,20 14-587,7-16 3078,-1-12 1,4-2 0,19-3 0,6 2 0</inkml:trace>
+  <inkml:trace contextRef="#ctx0" brushRef="#br0" timeOffset="77077">29555 4167 23009,'39'0'0,"-16"11"-2421,12-8 2718,-20 9-1940,17-12 2286,-9 0-184,-2 0-115,-3 0-254,-2 0 450,-8-14 685,-18-5-2549,-11-12 1320,-14-1-1240,4 7 172,6 11-285,12 22 946,5 13-1020,8 22-359,0-9 694,21 13-458,4-20 1594,14 7 1,-2-14 0,-6-1-1</inkml:trace>
+  <inkml:trace contextRef="#ctx0" brushRef="#br0" timeOffset="77377">30172 3923 25618,'-14'-10'-4857,"10"-1"668,-10 5 4784,14-1-1315,0 25 90,16 4-5,3 16-98,1-3-1322,9 13 1301,-12-11 732,-3-3 0,0 1-1355,2 7 755,0 10 209,-15-17 639,5-4-30,-6-2 263,0 4-222,-16-12 1280,-6 4-125,1-15-1300,-31-3 518,32-5-183,-30-2 1,25 0 0,0 0 0</inkml:trace>
+  <inkml:trace contextRef="#ctx0" brushRef="#br0" timeOffset="78010">31210 3214 25528,'11'-12'-188,"-2"1"0,-9-2-2686,0 2 1330,0-3 484,-18-4 265,14 3-402,-33-1 378,20 7 92,-20 2 687,4 4 1157,-22 1 323,13 2-786,5 7 0,1 3 1016,-1 10 948,-10 0-1495,17 30-945,13-28-460,2 29-830,12-19-414,3 2-952,21 20-576,-15-12 1512,14-13 1,1-1-983,-17 12 1154,32 2-64,-32 0 700,24 0 228,-25 0 369,9-1 225,-12 18 595,0-14-572,2-8 1,-4 0 304,-17 4 444,14 12-404,-29-19 1503,30-1-1517,-25-3 1692,26 0-1899,-22-4 1380,22-1-1222,-8 7-500,11-9 110,0 10-1550,29-16 1891,-5 3-1587,27-8 2160,-8 0-1489,4-1 1295,3-1-436,4 1 484,2-1-70,-1-1-711,0 2 260,-1-1 0,-2-1 1,-1 0-1</inkml:trace>
+  <inkml:trace contextRef="#ctx0" brushRef="#br0" timeOffset="78610">31682 3117 25348,'-20'-28'-6807,"15"2"4186,-29 3 3004,30 2-1368,-21 2 1271,22 4-959,-14 2 698,16 4-1850,-5 4 2246,6 1-49,26 2 898,26 18 75,3-12-914,-12 10 0,-2 4 834,0-3-844,12 4 922,-22 5-1226,-4-15 932,-3 12-2546,1 2 626,-8-4-448,-1 8-35,-10-4 91,-4 3 56,-1 3 681,-1 20-524,0-11 949,0-2 0,0 0-145,0 6 248,0 16 342,0 1 135,0-13-509,6-6 0,2 1-178,-5 8 42,4-16 1,0 0 11,0 1 1,-3-1-133,-1 18 198,8-6 1,0 0-511,0 8 442,-1-6 0,1 0-121,3 10 246,-8-20 0,-1-1-91,2 14-10,-1-2 64,-1-2 200,2 10 155,-4-17-71,2 16 47,-2-30-56,-1 1-307,1-11 128,0-7-934,0-1-378,-1-19 169,-20-4 233,14-19 933,-39 17 1,24-17 0,-22 14-1</inkml:trace>
+  <inkml:trace contextRef="#ctx0" brushRef="#br0" timeOffset="79518">32435 2834 25888,'12'-1'2263,"-4"17"-8769,-5 6 3781,-3 10 1186,-16 1 1617,12-7-1010,-12 2 717,0-1-1155,12-3-1969,-22 6 3730,24-10 0,-9-2 0,11-12 0</inkml:trace>
+  <inkml:trace contextRef="#ctx0" brushRef="#br0" timeOffset="79649">32647 2859 25798,'15'-10'1620,"4"2"-439,-6 8-2938,-2 14-2101,-7 16 3620,-14 7 0,-3 4 0,6 23 0,-5-21 0,0 1 1</inkml:trace>
+  <inkml:trace contextRef="#ctx0" brushRef="#br0" timeOffset="87077">20637 6521 25708,'0'-26'-5936,"14"4"7456,-11 5-2148,11 5 2479,-14 6-3042,8 3 3115,-5 23-3047,15 0-467,-9 21 1154,12-2-1081,-4 4 504,3 6-1491,-1 2 2192,1-5 0,3-1-2596,4 9 2842,0-8 0,-1-4-41,-1-14 542,3 2 76,-11-22 1017,-3 0-313,1-7 904,-4 2-655,3-22-2,-2 15 920,4-43-2367,0 24 441,0-29-3047,5-10 1374,-5 13 1067,-2 8 1,1 1 0,5-3 0,6-9 0</inkml:trace>
+  <inkml:trace contextRef="#ctx0" brushRef="#br0" timeOffset="87477">21878 6497 23909,'-16'-24'-6507,"-5"11"6301,0-6-386,-15 17 2369,11-7-1501,-10 27 1337,-5 10-655,13 25-1551,8-6 1099,8-15 1,3 0-540,7 6-15,-5 8-1269,6-18 362,22-4-1259,-17-5-302,37-4 2421,-14-7 568,19-3 446,-7-19 1191,0-9-207,-26-8-868,12-4 297,-23 7-446,11-1-639,-13-2-1002,5-8-342,-4 10-964,0-3 470,-1 15 900,0 9-24,2 1 1169,2 25-2499,5 11 397,0 10-251,0-8 0,2 0-1094,6 10 2848,9 15 1,-2-19 0,2 0 0</inkml:trace>
+  <inkml:trace contextRef="#ctx0" brushRef="#br0" timeOffset="88211">22652 6904 24269,'20'-39'-2575,"-14"6"93,31-5 3519,-32 4-2392,32-5 2188,-32-4-1646,34-4 1261,-25-2-932,1 11 0,0 0 289,9-20 377,-18 20 1,-1 0-1093,7-14 1283,-12 1-1495,0 3 1255,0 1-1216,0 6 544,-19 2-913,15-4 656,-31 15 976,32-1-694,-23 20 1460,24 27-694,-8 6 514,10 25-766,0 0 605,0 10-500,0-26 1,0 2-169,-1 19 0,2 1 88,8-13 1,2 1-481,-5 3 0,0 3 0,2-4 166,3-6 0,1-2-522,6 10 0,0-1 200,-6-9 0,1-4-295,24 16 609,-14-17 1,-1-2-495,5-5 109,17-2 1513,-18-18 477,32-28 1697,-28-10-1883,-1 3 0,-1-3 1053,-5-18-1217,-6 18 1,-2 2 526,-1-4-589,-1-6-986,-8 20 331,-3 1-2387,0 12 1155,2 0 509,-1 29-697,12 3 20,-3 14-134,9-5 348,-5-9 247,2-1 217,1-11 478,11 10-513,-4-12 1728,17 4-5,-18-8 564,14-26 712,-19 15-106,5-35-1084,-14 35 546,0-36-1707,-4 25-94,1-29-829,-4 20-27,0-9-1132,-3 19-476,1 3 959,-1 8-1034,1 19 777,3-12 150,-1 29 1328,4-28 1,2 35 0,2-12-1</inkml:trace>
+  <inkml:trace contextRef="#ctx0" brushRef="#br0" timeOffset="88527">24068 6813 23999,'12'0'540,"1"0"-540,-1 0 0,2 0 90,3 0-90,2-14 265,2 11 10,3-23-445,0 23 508,2-25-368,9 10 630,-9-8-217,11-10-305,-20 17-336,1-10-119,-14 10-405,-1-2-695,-3 1 270,0-9-809,-18 9 332,14-8-31,-33 17 1307,22 0-320,-15 27 2495,16 13-1390,5 11-756,9 23-431,0-20-506,11-7 0,1 2-247,-6 6 1304,16-16 1,3-2 0,-5 10-1,21-3 1</inkml:trace>
+  <inkml:trace contextRef="#ctx0" brushRef="#br0" timeOffset="88732">25022 6719 25708,'11'0'-4228,"5"0"3944,11 12 1,15-10 0,-13 10-1</inkml:trace>
+  <inkml:trace contextRef="#ctx0" brushRef="#br0" timeOffset="88889">25008 7055 23459,'-6'6'-162,"5"1"-2613,-5-2 3525,6-1-3065,18-1 1976,-14-2 480,35-1 1,-10 1-1,23-1 1</inkml:trace>
+  <inkml:trace contextRef="#ctx0" brushRef="#br0" timeOffset="89366">26913 6519 25798,'7'0'180,"-11"-22"-5335,38 17 7093,-10-56-2638,-2 35 725,-2-11 0,-1-2-278,3-3 202,-5 5 1,-1 0-816,4-6 286,-4-13 1827,-15 5-2752,5 15 1152,-6-17-881,0 29 702,-15-3-832,11 39 1124,-12 38-276,16 8-164,0-3 1,0 1-98,0 9 125,0-22 1,0 1-248,0 16-91,13-1 239,-10-2 605,9-20 0,-1 1 0,-8 17 1,2-20-1,0 0 0</inkml:trace>
+  <inkml:trace contextRef="#ctx0" brushRef="#br0" timeOffset="89510">26968 7068 24898,'0'7'-5935,"18"-3"6812,18-1 47,11-3-583,14-15 243,-6 11-677,-26-11 1,2 1-291,32 10-193,-30-10 0,-1-1 1002,31 11 1,-32-9-1,0-1 1,29-2 0</inkml:trace>
+  <inkml:trace contextRef="#ctx0" brushRef="#br0" timeOffset="91895">27243 9946 24089,'0'8'-4857,"0"0"3179,0-1 1063,-14-2 3948,11-1-2015,-11 1 374,0-3-892,1 0-428,-10-1 1098,4-1-503,-7 0 270,7 0-2944,-17-14 931,17-4-1761,-3 0 647,14-15-743,4 16 455,3-16 538,1 6 44,22 1 1358,-17 2 80,37-2 2282,-13 12 131,16 1 556,-2 34-1501,-13 12-1192,-14 12-195,-10-10 1,-4 1-1433,-2 11 1449,-6-3 0,-5 0-1404,-22 10 870,12-18 0,-2-1 159,-5-10 0,0-1 995,3 1 1,1-1 195,-3 0 1,-1 0 320,-12 8 1,-2-1-107,13-8 1,-2 0-190,-16 9 0,1-2 470,3-1-384,-10 1-160,59-21-2652,49-17 1928,-23-3 0,4 0-668,9 4 0,6 2 0,-4-2-165,-3-8 1,-1 1 831,17 11 0,0 3 0,-15-6 0,-3 1 0,2 5 0,0 0 0</inkml:trace>
+  <inkml:trace contextRef="#ctx0" brushRef="#br0" timeOffset="92917">26823 12323 26877,'0'-21'-5576,"13"-4"6048,-10 8-1153,19-6 1930,-20 14-1631,24-3 1932,-15 7-205,17 1-1005,2 2 1379,-7 2-1030,9 0 548,-10 21-2610,0-16 1888,3 46-3509,-9-30 619,-1 27-333,-11-3 725,-3-7 40,-18 25 799,12-26 1165,-13 21-586,18-27 1142,0 7-284,0-15 209,21-3-250,-16 0-167,24-7 0,5-1 416,-9 6-192,11-5 0,2-2 237,-7 0 906,8 4-282,-15-10 150,-13 3-935,0-5 791,-11 2-2220,0 2 373,-26 9 1501,5-1-603,-13 1 0,-4 0 262,-15 5-1837,2-2 1,-3-1 1579,19-7 0,0-1 1,-11 2-1,-1-2 1,15-4-1,-1-1 0</inkml:trace>
 </inkml:ink>
 </file>
 
@@ -1297,20 +1707,20 @@
   <inkml:trace contextRef="#ctx0" brushRef="#br0" timeOffset="-17019.73">21143 6588 25078,'0'-8'-6205,"0"2"4076,-16 25 3796,12 13-2446,-25 15 1353,26 4-2244,-10 12 528,13-15-646,0-9 1,0 0 1621,0 1 1,25 9 0,5-20-1</inkml:trace>
   <inkml:trace contextRef="#ctx0" brushRef="#br0" timeOffset="-16876.73">21232 6227 22920,'-18'-38'-9465,"4"5"4889,14 4 4531,0 15 1,0 3 0,0 10 0</inkml:trace>
   <inkml:trace contextRef="#ctx0" brushRef="#br0" timeOffset="-16576.73">21865 6996 23459,'17'0'720,"0"-18"-702,1 14 1167,0-40-2675,1 22 1519,-1-24-801,0 8 432,-1-4-324,-5-1-290,-4-20-403,-4 13 617,-2 10 0,-3 1 74,-19-6-1464,15-8 1125,-32 25 543,32 5-738,-29 8 1452,14 6 346,-2 22 1275,-6 24-512,25 10-1427,-4-4 0,1 3-391,6 15-79,-2-19 1,4 0-593,16 1 1,4-3 924,7 19 1,3-21-1,3-3 1,11 9-1</inkml:trace>
-  <inkml:trace contextRef="#ctx0" brushRef="#br0" timeOffset="-16177.73">22693 6475 24449,'-26'-20'-4788,"5"4"3233,-26 8 2698,11 4-227,-1 4 83,1 19-523,8 5 0,2 5-260,3 23-508,2-6 0,4 0 677,16 4-579,4-10 1,7-3-1666,25 3 1041,-5-12 0,4-4-370,28-8 722,-30-7 0,1-2 413,2-4 0,-1-6 982,17-22-194,-12 5 0,-2-5 99,-16-3 0,-4-4-70,5-3 0,-3-2-331,-8 5 0,-4 0-405,-1-3 1,-2 0-77,-2-5 1,0 0-318,-2-2 1,0 0-296,0-2 1,0 0-99,1 1 0,-2-1 370,-6-16 1,-3 2-180,1 16 0,-1 0-11,1-18 0,-3 4-300,-20 4 226,28 2 530,-13 31 70,17 10 33,0 31 3,0 19 0,0 8-69,0-8 1,0 4-302,-1 12 1,0 7 0,3-5-37,6-5 0,1-3 122,-8-4 0,-1 3 0,3-4-539,14 4 1,0-3-109,-9 0 0,0 0 859,7-4 1,2 0 0,-4-2 0,0-1 0,1-2 0,0 0 0</inkml:trace>
-  <inkml:trace contextRef="#ctx0" brushRef="#br0" timeOffset="-15509.73">22363 6574 22650,'6'-19'-4075,"-5"-17"1724,4 17 2132,-5-38-593,0 16 721,0 2 1,0-1-335,0-12 322,0 18 0,0-1-1403,0-17 1175,0 0 261,0-1 76,0 15 1,0-1 173,0-18 135,0 11 0,0 0-45,0-3-91,0-11-179,13 28 814,-10 5-767,9 3 900,-12 11-947,0 1 0,0 25 0,-15 19 893,11 11-581,-13-13 0,1 1-153,11 29 12,-14-25 1,-3 2-314,13 1 1,2 5 175,-4-2 0,-2 5 0,1-3-47,-1 8 0,2 1-331,5 5 0,3 5 0,-1-6-457,-3-5 0,3-2 674,6 3 0,4 4 1,4-6-1,4-7 1,4-2-1,9 12 1,-1 0-1</inkml:trace>
-  <inkml:trace contextRef="#ctx0" brushRef="#br0" timeOffset="-14905.73">24173 6122 24629,'-20'-8'-2323,"-1"2"2211,2 2 396,-14 23 1156,6 2-1376,2 11 1,0 5-236,-7 20-201,12-16 0,1 2-514,7-7 0,2 0 226,2 0 1,1 1-252,3 1 0,1 0-392,-1-1 1,5 0 901,10 0 1,4-1 0,-4-1 0,2 0 0,11-2 0,0 1 0</inkml:trace>
-  <inkml:trace contextRef="#ctx0" brushRef="#br0" timeOffset="-14693.73">24872 6679 24808,'-53'-8'-1154,"5"2"777,-6 6 737,16 20 668,-21 10-435,32 10-1557,3 3-720,17 3-409,7-12-654,20 18 2533,20-26 1,11-3 0,11-14 0</inkml:trace>
-  <inkml:trace contextRef="#ctx0" brushRef="#br0" timeOffset="-14542.73">25138 6806 24629,'-20'-20'-5171,"-3"7"4399,-16 7 1937,7 22 232,14 4-2627,7 20-1950,32-1 3001,17 1 0,10-18 0,8-6 0</inkml:trace>
-  <inkml:trace contextRef="#ctx0" brushRef="#br0" timeOffset="-13625.73">25210 6647 24629,'-22'-19'-5408,"1"2"3701,8 8 1376,2 3 260,7 21 71,1-12 744,3 34-1371,-1 1-1111,1 10 1358,0 8-417,19 0-484,-15-13 510,12-13 1,3-1-232,0 1-619,15 5 1643,-16-22 283,5-2 448,-13-9 439,1-23 265,-4-8-439,-3-33-645,-3 10-614,1 13 1,-1 0-511,-1-8-762,0-12 1324,0 22 1,0 4 0,0 3 0</inkml:trace>
-  <inkml:trace contextRef="#ctx0" brushRef="#br0" timeOffset="-12709.73">25178 6079 23909,'-9'-17'-7353,"1"13"7701,2-13-2510,2 5 1071,3-2 748,1-14 264,19 6 1399,-15 0-2427,38 6 3888,-36 1-2489,25 8 0,5 2 1855,-9-4 331,34 4-701,-29 2-567,-3 3-1623,-4 19-355,-2-14-1213,-3 33 1366,-2-33 0,-4 38 0,-1-14 0</inkml:trace>
-  <inkml:trace contextRef="#ctx0" brushRef="#br0" timeOffset="-12527.73">25813 5804 23189,'40'-25'2286,"-12"7"-1529,26-5 103,-24 15-554,19 0-425,-23 6-704,4 17-1416,-15-12 863,-5 38-2382,-5-16 3240,-3 28 0,-2-3 0,0 5 0</inkml:trace>
-  <inkml:trace contextRef="#ctx0" brushRef="#br0" timeOffset="-12107.73">26878 6687 23999,'-26'-7'-2191,"-20"5"2713,24-6-1291,-24 8 1275,7 0-169,-2 0-97,-21 17 445,17 8-460,11-4 1,2 2 449,3 17-1772,3 9 563,19-20-1433,27 10-454,20-25 1573,10 5 375,-5-16 0,0-5 110,13-8 619,-5-1 1,-1-4 460,-22-1 0,-2-2 95,9-2 0,-1 0 1534,5-12 698,-5-2-1476,-7 2-390,-3-9-1934,-10 12-192,-2-5-636,-11 38-643,-2 16-434,-15 17 1006,12-4 1,1 1-1111,-13 11 397,14 17 1972,20-19 0,-15-4 1,15-2-1</inkml:trace>
-  <inkml:trace contextRef="#ctx0" brushRef="#br0" timeOffset="-11826.73">27817 6651 24539,'-29'-5'-712,"-17"4"1108,23-4-978,-21 5 906,6 18 783,2-14-789,3 37-674,5-21 752,12 20-917,-4 5-143,18-12-741,36 18-604,1-28 1351,14-10 0,5-4 16,11-3 745,-21-4 1,1-4-118,-3-8 0,-3-2 1409,16 7-676,-22-24 0,-5-4 493,-10 6-713,-9-12 1,-8-2-1402,-18-5-1565,-5-12 621,-9 27 0,-4 3 421,8 7 1,0 0 1202,-12-6 1,-1 2 0,9 9 0,1 2 0,-2 0 0,0-1 0</inkml:trace>
-  <inkml:trace contextRef="#ctx0" brushRef="#br0" timeOffset="-11675.73">28302 5517 25798,'-30'22'-111,"1"-1"1,-14 10 0,-1 0-1,12-7 1,1 1 0,-14 8 0,0 1-1</inkml:trace>
-  <inkml:trace contextRef="#ctx0" brushRef="#br0" timeOffset="-11093.73">29003 5516 26338,'40'-24'1441,"-1"2"-744,0 4-72,0 5-156,-1 4-446,-2 6-113,13 36-1465,-17-1 592,-9 18 0,-5 7-261,-9-17 1,-3 4 496,-1 12 1,-1 8 0,-1-4-414,-2 4 0,0-1 394,0-6 0,0 3 0,-3 1 151,-4 4 1,-3 1-1,0-2 110,0-14 1,-1-2 0,-1 5 309,-3 8 0,-2 6 0,-1-1 0,-1-6 14,1-9 0,0-6 0,-2 4-537,-3 7 1,-1 6 0,-2 0-1,2-8 821,0-7 0,1-5 0,-2 1 0,-9 13 1,-2 1-1,0-3 0,7-16 0,0 0 0,-1 0 1</inkml:trace>
-  <inkml:trace contextRef="#ctx0" brushRef="#br0" timeOffset="-10043.73">15360 6922 21480,'0'9'-6115,"10"-1"5111,-7 2-1229,18-3 3440,-11 1-1226,10 0 913,-2-1-251,4-1-974,14-2 1799,-4-3-277,32 0 999,-19-26-1591,-2 9 1,2-4 362,-17-5 0,1-4-709,4 1 0,5-3 1,-4 2 115,-1-4 0,-1-1-131,10-11 0,0-4-269,-14 11 1,-1-1 0,-1 1-197,3-6 0,-1-2 17,2-5 1,1-5 0,-3 5-476,-5 5 1,-1 1 149,-1-2 1,2-4-1,-3 5-42,-5 7 0,-1 2-66,2-8 1,-1 2-745,-2-7-271,-7 10 1417,-2 9 0,-3 7 1,-1 6-1</inkml:trace>
-  <inkml:trace contextRef="#ctx0" brushRef="#br0" timeOffset="-9642.73">16425 5969 22830,'8'17'-7714,"-1"6"5096,-7 12 2503,-19 2 1576,-5 16-684,0-9-333,-8-3 1,-2 0 412,3 9-1038,-14-5 1,-5-3 1269,22-17 0,2-1-251,-11 8 0,-3 0-705,-3-1 1,0-2-260,8-6 1,0 0 297,-11 6 0,0-2 0,13-9 0,1-1 0,-1 0 0,1-1 0</inkml:trace>
+  <inkml:trace contextRef="#ctx0" brushRef="#br0" timeOffset="-16177.74">22693 6475 24449,'-26'-20'-4788,"5"4"3233,-26 8 2698,11 4-227,-1 4 83,1 19-523,8 5 0,2 5-260,3 23-508,2-6 0,4 0 677,16 4-579,4-10 1,7-3-1666,25 3 1041,-5-12 0,4-4-370,28-8 722,-30-7 0,1-2 413,2-4 0,-1-6 982,17-22-194,-12 5 0,-2-5 99,-16-3 0,-4-4-70,5-3 0,-3-2-331,-8 5 0,-4 0-405,-1-3 1,-2 0-77,-2-5 1,0 0-318,-2-2 1,0 0-296,0-2 1,0 0-99,1 1 0,-2-1 370,-6-16 1,-3 2-180,1 16 0,-1 0-11,1-18 0,-3 4-300,-20 4 226,28 2 530,-13 31 70,17 10 33,0 31 3,0 19 0,0 8-69,0-8 1,0 4-302,-1 12 1,0 7 0,3-5-37,6-5 0,1-3 122,-8-4 0,-1 3 0,3-4-539,14 4 1,0-3-109,-9 0 0,0 0 859,7-4 1,2 0 0,-4-2 0,0-1 0,1-2 0,0 0 0</inkml:trace>
+  <inkml:trace contextRef="#ctx0" brushRef="#br0" timeOffset="-15509.74">22363 6574 22650,'6'-19'-4075,"-5"-17"1724,4 17 2132,-5-38-593,0 16 721,0 2 1,0-1-335,0-12 322,0 18 0,0-1-1403,0-17 1175,0 0 261,0-1 76,0 15 1,0-1 173,0-18 135,0 11 0,0 0-45,0-3-91,0-11-179,13 28 814,-10 5-767,9 3 900,-12 11-947,0 1 0,0 25 0,-15 19 893,11 11-581,-13-13 0,1 1-153,11 29 12,-14-25 1,-3 2-314,13 1 1,2 5 175,-4-2 0,-2 5 0,1-3-47,-1 8 0,2 1-331,5 5 0,3 5 0,-1-6-457,-3-5 0,3-2 674,6 3 0,4 4 1,4-6-1,4-7 1,4-2-1,9 12 1,-1 0-1</inkml:trace>
+  <inkml:trace contextRef="#ctx0" brushRef="#br0" timeOffset="-14905.74">24173 6122 24629,'-20'-8'-2323,"-1"2"2211,2 2 396,-14 23 1156,6 2-1376,2 11 1,0 5-236,-7 20-201,12-16 0,1 2-514,7-7 0,2 0 226,2 0 1,1 1-252,3 1 0,1 0-392,-1-1 1,5 0 901,10 0 1,4-1 0,-4-1 0,2 0 0,11-2 0,0 1 0</inkml:trace>
+  <inkml:trace contextRef="#ctx0" brushRef="#br0" timeOffset="-14693.74">24872 6679 24808,'-53'-8'-1154,"5"2"777,-6 6 737,16 20 668,-21 10-435,32 10-1557,3 3-720,17 3-409,7-12-654,20 18 2533,20-26 1,11-3 0,11-14 0</inkml:trace>
+  <inkml:trace contextRef="#ctx0" brushRef="#br0" timeOffset="-14542.74">25138 6806 24629,'-20'-20'-5171,"-3"7"4399,-16 7 1937,7 22 232,14 4-2627,7 20-1950,32-1 3001,17 1 0,10-18 0,8-6 0</inkml:trace>
+  <inkml:trace contextRef="#ctx0" brushRef="#br0" timeOffset="-13625.74">25210 6647 24629,'-22'-19'-5408,"1"2"3701,8 8 1376,2 3 260,7 21 71,1-12 744,3 34-1371,-1 1-1111,1 10 1358,0 8-417,19 0-484,-15-13 510,12-13 1,3-1-232,0 1-619,15 5 1643,-16-22 283,5-2 448,-13-9 439,1-23 265,-4-8-439,-3-33-645,-3 10-614,1 13 1,-1 0-511,-1-8-762,0-12 1324,0 22 1,0 4 0,0 3 0</inkml:trace>
+  <inkml:trace contextRef="#ctx0" brushRef="#br0" timeOffset="-12709.74">25178 6079 23909,'-9'-17'-7353,"1"13"7701,2-13-2510,2 5 1071,3-2 748,1-14 264,19 6 1399,-15 0-2427,38 6 3888,-36 1-2489,25 8 0,5 2 1855,-9-4 331,34 4-701,-29 2-567,-3 3-1623,-4 19-355,-2-14-1213,-3 33 1366,-2-33 0,-4 38 0,-1-14 0</inkml:trace>
+  <inkml:trace contextRef="#ctx0" brushRef="#br0" timeOffset="-12527.74">25813 5804 23189,'40'-25'2286,"-12"7"-1529,26-5 103,-24 15-554,19 0-425,-23 6-704,4 17-1416,-15-12 863,-5 38-2382,-5-16 3240,-3 28 0,-2-3 0,0 5 0</inkml:trace>
+  <inkml:trace contextRef="#ctx0" brushRef="#br0" timeOffset="-12107.74">26878 6687 23999,'-26'-7'-2191,"-20"5"2713,24-6-1291,-24 8 1275,7 0-169,-2 0-97,-21 17 445,17 8-460,11-4 1,2 2 449,3 17-1772,3 9 563,19-20-1433,27 10-454,20-25 1573,10 5 375,-5-16 0,0-5 110,13-8 619,-5-1 1,-1-4 460,-22-1 0,-2-2 95,9-2 0,-1 0 1534,5-12 698,-5-2-1476,-7 2-390,-3-9-1934,-10 12-192,-2-5-636,-11 38-643,-2 16-434,-15 17 1006,12-4 1,1 1-1111,-13 11 397,14 17 1972,20-19 0,-15-4 1,15-2-1</inkml:trace>
+  <inkml:trace contextRef="#ctx0" brushRef="#br0" timeOffset="-11826.74">27817 6651 24539,'-29'-5'-712,"-17"4"1108,23-4-978,-21 5 906,6 18 783,2-14-789,3 37-674,5-21 752,12 20-917,-4 5-143,18-12-741,36 18-604,1-28 1351,14-10 0,5-4 16,11-3 745,-21-4 1,1-4-118,-3-8 0,-3-2 1409,16 7-676,-22-24 0,-5-4 493,-10 6-713,-9-12 1,-8-2-1402,-18-5-1565,-5-12 621,-9 27 0,-4 3 421,8 7 1,0 0 1202,-12-6 1,-1 2 0,9 9 0,1 2 0,-2 0 0,0-1 0</inkml:trace>
+  <inkml:trace contextRef="#ctx0" brushRef="#br0" timeOffset="-11675.74">28302 5517 25798,'-30'22'-111,"1"-1"1,-14 10 0,-1 0-1,12-7 1,1 1 0,-14 8 0,0 1-1</inkml:trace>
+  <inkml:trace contextRef="#ctx0" brushRef="#br0" timeOffset="-11093.74">29003 5516 26338,'40'-24'1441,"-1"2"-744,0 4-72,0 5-156,-1 4-446,-2 6-113,13 36-1465,-17-1 592,-9 18 0,-5 7-261,-9-17 1,-3 4 496,-1 12 1,-1 8 0,-1-4-414,-2 4 0,0-1 394,0-6 0,0 3 0,-3 1 151,-4 4 1,-3 1-1,0-2 110,0-14 1,-1-2 0,-1 5 309,-3 8 0,-2 6 0,-1-1 0,-1-6 14,1-9 0,0-6 0,-2 4-537,-3 7 1,-1 6 0,-2 0-1,2-8 821,0-7 0,1-5 0,-2 1 0,-9 13 1,-2 1-1,0-3 0,7-16 0,0 0 0,-1 0 1</inkml:trace>
+  <inkml:trace contextRef="#ctx0" brushRef="#br0" timeOffset="-10043.74">15360 6922 21480,'0'9'-6115,"10"-1"5111,-7 2-1229,18-3 3440,-11 1-1226,10 0 913,-2-1-251,4-1-974,14-2 1799,-4-3-277,32 0 999,-19-26-1591,-2 9 1,2-4 362,-17-5 0,1-4-709,4 1 0,5-3 1,-4 2 115,-1-4 0,-1-1-131,10-11 0,0-4-269,-14 11 1,-1-1 0,-1 1-197,3-6 0,-1-2 17,2-5 1,1-5 0,-3 5-476,-5 5 1,-1 1 149,-1-2 1,2-4-1,-3 5-42,-5 7 0,-1 2-66,2-8 1,-1 2-745,-2-7-271,-7 10 1417,-2 9 0,-3 7 1,-1 6-1</inkml:trace>
+  <inkml:trace contextRef="#ctx0" brushRef="#br0" timeOffset="-9642.74">16425 5969 22830,'8'17'-7714,"-1"6"5096,-7 12 2503,-19 2 1576,-5 16-684,0-9-333,-8-3 1,-2 0 412,3 9-1038,-14-5 1,-5-3 1269,22-17 0,2-1-251,-11 8 0,-3 0-705,-3-1 1,0-2-260,8-6 1,0 0 297,-11 6 0,0-2 0,13-9 0,1-1 0,-1 0 0,1-1 0</inkml:trace>
   <inkml:trace contextRef="#ctx0" brushRef="#br0" timeOffset="-7853.73">15785 6352 21840,'19'-2'1579,"7"2"-1444,-8-1-44,9 1-110,6 0 126,0 0-69,10 0-77,10 0 129,9 16-337,-26-14 1,3 0 2,2 13 0,1 1 67,3-15 1,4 1 30,1 12 0,4 5 1,-1-2-49,9-5 0,4 1 74,-10 4 1,6 4-1,0 1 1,-5-2-98,-6-2 1,-3-2 0,2 2 45,-1-1 0,3 2 0,-1 1 0,-3-1 25,2 2 1,-3 0 0,0 0 7,2 2 1,0 0-1,-1 0-11,0 1 0,-1 1 1,3 1 6,0 3 0,4 1 1,-1 2-1,-2-2-50,2 1 0,-2 0 1,4 3 97,-5-2 0,5 4 0,2 2 0,-3-2 0,-4-2-51,5 3 1,-6-3 0,3 3 32,-3-2 0,2 2 1,0 0-1,-4-1-78,2 0 0,-4-2 0,-1 1 63,2 1 0,-2 1 0,1-1-25,-1 1 1,-1 0-1,2 3 60,0 1 0,1 3 0,0 0 0,-2-2-34,0 2 1,-1-2 0,1 5 26,-4-5 1,2 4 0,2 3 0,-3-3-1,-4-3-53,0 2 1,-4-4-1,1 5-3,4 5 0,3 5 0,-2 1 0,-4-6-46,-8-8 0,-3-4 1,0 1-77,5 12 0,1 1 0,-3-2-72,-2 1 0,-3-2-70,-2 1 1,-1 0 1,-2-3 1,-2 2 283,-3-5 1,-2 2 0,1-2-158,0 5 1,-1 2-75,0 1 1,-1 4 0,-2-6 123,0-7 1,-1-2-281,1 24 0,0-2 595,0-2 1,-4-24 0,0-3-1,-1 4 1</inkml:trace>
   <inkml:trace contextRef="#ctx0" brushRef="#br0" timeOffset="-7176.73">16095 5937 23189,'-51'15'2377,"8"-12"-2637,4 27 87,5-26 116,-12 24 200,12-12 244,-6 2-26,27 10-1093,-7-15 504,18 14-1259,-8-5 490,10 3-886,0 3-742,45 18-433,-14-9 2742,4-12 1,4-1 0,14 12-1,-23-18 1,-1 0 0</inkml:trace>
   <inkml:trace contextRef="#ctx0" brushRef="#br0" timeOffset="-5959.73">20458 10459 23639,'8'24'-8853,"-2"11"6645,-6 14 1758,0 6 90,0-11 270,0 4 51,0-4-57,0-1-1500,0-6 2280,0-4-357,24-7-330,-1-6 285,23-10 900,13-5 251,-11-5-313,-6-18 0,-2-4 1238,8-5-1409,-20-5 0,1-8 0,-5 4 849,10-18-1066,-7 2 0,-5 0-136,-11 8-1449,-2-14-197,-7 34-742,-2 27-386,-14 39 1309,11 20 327,-5-2-1,2 1 152,5-18 1,2 1 94,-1 8 0,0 6 1,0-4 85,0-4 1,0 1 107,0 4 0,1 5 0,-2-5 67,-4-6 1,0-2 40,4 14 1,0-1-199,-7-7 1,-1-3 315,4-14 1,-2-1-198,-2 15 1,-3-3-251,-9-6-1105,-12 4 1527,9-31 684,-10-5-737,9-32 0,2-1 0,1-20 1</inkml:trace>
@@ -1335,9 +1745,9 @@
   <inkml:trace contextRef="#ctx0" brushRef="#br0" timeOffset="3122.27">888 9847 23999,'0'42'-6386,"0"-5"4258,0 10 1064,0-4 425,0 4 303,0 3 32,16-2-539,-12-2-917,31-4 1639,-7 6-211,10-17 564,3 2 48,-10-23 713,2-4 355,0-6 863,9 0-360,-11-23 176,14-10 420,-24-12-1484,1-2 604,-12-5-2015,-6 13-680,-1-19-458,-3 31-10,0-2-220,0 37-30,0 7 1011,0 27-22,0 3 492,0 12 234,0 8 44,-1-29 0,2 2 39,7 18 0,3 2-99,-2-15 0,1 1-34,1 2 1,1 4-1,-1-4-2,-2-7 0,-1-2 23,-2 9 1,-1 1 95,0-9 1,-2-2-131,-1 16-41,5-14 0,-6-4-310,-21-2-735,-5 7 1751,-23-27-59,10-2 1,-2-34 0,10-6 0</inkml:trace>
   <inkml:trace contextRef="#ctx0" brushRef="#br0" timeOffset="3433.27">1515 9598 25438,'0'-6'-2159,"0"3"1,0 1 0</inkml:trace>
   <inkml:trace contextRef="#ctx0" brushRef="#br0" timeOffset="3956.27">1623 9904 23459,'0'40'-6115,"0"0"3986,0-7 1155,0 4 245,17 3-667,-13 2 1101,12 19-310,-16-15-864,7-8 0,2 0 244,-6 3 1094,10-8 0,1-2 0,-4 1 0,11 6 0</inkml:trace>
-  <inkml:trace contextRef="#ctx0" brushRef="#br0" timeOffset="4423.27">1875 10192 22920,'36'0'1619,"-15"-17"-1055,8 12 202,-16-27-2065,23 10 1989,-15-6-1052,15-10 409,-17 16-352,10-14 28,-13 14-112,2-5-355,-8 8 1012,-2 0-1697,-2 1 583,-2-3-288,-2 5-16,-1-4-118,-1 11 40,-19 1 833,-5 6 847,-14 16 1090,5 9-219,8 19-1145,17-9 1,2 1-15,-3 14-58,7-10 0,4-1-345,19-2-2375,12 19-135,11-26-119,7 2 2639,-6-16 1,4-4-1,5-3 1</inkml:trace>
-  <inkml:trace contextRef="#ctx0" brushRef="#br0" timeOffset="4822.27">2713 10159 23369,'-10'-24'-7662,"2"-8"5228,30-15 4058,-16-2-1698,32 7 1832,-35-5-2130,30-2 1064,-29-1-2121,27-2 3262,-27 2-1210,21-2-620,-22 17 0,-3-1-114,11-19-390,-10 11 0,-2 0 563,1-7-724,-9 12 1,-3 2-152,-11-2-810,-3-7 931,-6 21 384,17 10 385,-13 4 557,14 30 547,-2 17-73,14 12-736,-1 8 0,0 2-95,2-24 0,2 1-142,2 10 1,3 5-1,1-5-566,2-9 1,2-1-647,8 23 1,3-1-116,-7-25 1,2-1-646,7 19 1,1-3-621,5 1 2420,-9-18 1,1-3 0,10 3 0,1-4-1</inkml:trace>
-  <inkml:trace contextRef="#ctx0" brushRef="#br0" timeOffset="5241.27">3482 9889 23549,'1'-7'-3475,"0"-1"1547,0 0 953,-1 0-16,0 0 331,0-2 98,0 1 118,0 1-1152,-19 1 2043,15 3-503,-29 2 1308,13 1 286,-15 17 619,14 5-629,-6-1 317,24 20-1801,-8-23 41,11 18-536,0-4-897,17-17 42,4 14-1165,23-25 2414,-1-9 87,-5 2 1657,-5-39-1270,-11 22 1213,-2-26-659,1-13-359,-11 10-89,-1 6 0,-3-2-1176,-5-11 329,2-2 1,-1-1-1249,-2-1 743,-10 7 0,0 2-1376,5 13 1076,-29-8-51,30 50 2350,-10 5-2393,11 36 0,6 13 672,-4-21 1,2 2 520,4 16 1,4 8-1,-3-5 0,-4-5 1,1-2-1,4-4 1,-1-1-1,1 1 1</inkml:trace>
+  <inkml:trace contextRef="#ctx0" brushRef="#br0" timeOffset="4423.26">1875 10192 22920,'36'0'1619,"-15"-17"-1055,8 12 202,-16-27-2065,23 10 1989,-15-6-1052,15-10 409,-17 16-352,10-14 28,-13 14-112,2-5-355,-8 8 1012,-2 0-1697,-2 1 583,-2-3-288,-2 5-16,-1-4-118,-1 11 40,-19 1 833,-5 6 847,-14 16 1090,5 9-219,8 19-1145,17-9 1,2 1-15,-3 14-58,7-10 0,4-1-345,19-2-2375,12 19-135,11-26-119,7 2 2639,-6-16 1,4-4-1,5-3 1</inkml:trace>
+  <inkml:trace contextRef="#ctx0" brushRef="#br0" timeOffset="4822.26">2713 10159 23369,'-10'-24'-7662,"2"-8"5228,30-15 4058,-16-2-1698,32 7 1832,-35-5-2130,30-2 1064,-29-1-2121,27-2 3262,-27 2-1210,21-2-620,-22 17 0,-3-1-114,11-19-390,-10 11 0,-2 0 563,1-7-724,-9 12 1,-3 2-152,-11-2-810,-3-7 931,-6 21 384,17 10 385,-13 4 557,14 30 547,-2 17-73,14 12-736,-1 8 0,0 2-95,2-24 0,2 1-142,2 10 1,3 5-1,1-5-566,2-9 1,2-1-647,8 23 1,3-1-116,-7-25 1,2-1-646,7 19 1,1-3-621,5 1 2420,-9-18 1,1-3 0,10 3 0,1-4-1</inkml:trace>
+  <inkml:trace contextRef="#ctx0" brushRef="#br0" timeOffset="5241.26">3482 9889 23549,'1'-7'-3475,"0"-1"1547,0 0 953,-1 0-16,0 0 331,0-2 98,0 1 118,0 1-1152,-19 1 2043,15 3-503,-29 2 1308,13 1 286,-15 17 619,14 5-629,-6-1 317,24 20-1801,-8-23 41,11 18-536,0-4-897,17-17 42,4 14-1165,23-25 2414,-1-9 87,-5 2 1657,-5-39-1270,-11 22 1213,-2-26-659,1-13-359,-11 10-89,-1 6 0,-3-2-1176,-5-11 329,2-2 1,-1-1-1249,-2-1 743,-10 7 0,0 2-1376,5 13 1076,-29-8-51,30 50 2350,-10 5-2393,11 36 0,6 13 672,-4-21 1,2 2 520,4 16 1,4 8-1,-3-5 0,-4-5 1,1-2-1,4-4 1,-1-1-1,1 1 1</inkml:trace>
   <inkml:trace contextRef="#ctx0" brushRef="#br0" timeOffset="5722.27">1260 11476 23909,'-23'-4'-1200,"4"17"2975,-15 23-1882,15 11-526,1 14 0,3 5-4,8-28 1,1 1 266,-1 12 0,1 7 1,5-7-194,9-11 0,1-2-338,-9 12 1,4-1-172,18-16 0,2-3-1611,2 27 1385,-2-30 0,4-2 239,6 7 1,1-2 534,-7-10 1,-1-1 632,11 4 0,0-2 1,14-5-1,1-4 0</inkml:trace>
   <inkml:trace contextRef="#ctx0" brushRef="#br0" timeOffset="5927.27">1835 11546 25438,'0'-7'-6385,"-13"1"6033,10 28-542,-9 15 913,12 19-789,0 8 280,9-21 1,0 1-189,-7-10 0,1 1-1168,14 27 1,-1 1 1254,-14-28 1,0 2 457,5 8 1,4 6 0,-4-6 0,-4 20-1,2-16 1,0 0 0</inkml:trace>
   <inkml:trace contextRef="#ctx0" brushRef="#br0" timeOffset="6072.27">1643 12145 24359,'-13'-41'-9034,"3"-16"6305,10 15 2373,23 4 0,6 2 1651,3 3-819,17 6 0,4 4 697,2 11-1004,-17 6 0,1 2 0,17 2 0,0 2 1</inkml:trace>
@@ -2169,75 +2579,75 @@
   <inkml:trace contextRef="#ctx0" brushRef="#br1" timeOffset="-206429.73">26832 16249 9871,'0'-10'1350,"13"3"-1260,3 4 89,9 3-89,0 0-90,-3 14 0,5-10 0,16 39 0,-7-24-1428,10 25 799,-12-14-181,-1 0-811,-1 2 721,1-2 1,-1-1-91,-2-3 884,2-2 1,-4-4 0,1-3 0</inkml:trace>
   <inkml:trace contextRef="#ctx0" brushRef="#br1" timeOffset="-206260.73">27645 16223 10321,'0'-17'360,"0"0"-270,-17 7-180,-5 4 180,-14 22-180,14 15-990,-2 8 1,4 3 0,12 17 1079,-7-10 0,1-3 0,14-4 0,0 12 0</inkml:trace>
   <inkml:trace contextRef="#ctx0" brushRef="#br1" timeOffset="-205957.73">28160 16127 11490,'0'-16'990,"0"1"-990,0 5 0,0 2 0,0 2 0,-14 3 0,-2 22 0,-10 8-90,12 16 0,6-1 180,1-6-90,5 0-180,-4 1 180,6 13 0,15-13 0,-11 21 0,12-29 0,0 13 0,-12-22-450,12 1-1259,-16-9 450,0-6 1259,-35 1 0,6-5 0,-32-1 0</inkml:trace>
-  <inkml:trace contextRef="#ctx0" brushRef="#br1" timeOffset="-166446.73">14452 5196 8612,'-15'27'1169,"-9"4"-899,21 3-90,-18 3-5660,19 5 5480,-17 2 90,16 5 877,-16 1-877,17 2-90,-12-2 0,10-2 0,-2 0 0,3-2 0,3 16 0,0-17 90,0 21-90,0-34 1009,0 10-1099,0-26-630,0 0 360,0-60-89,0-14 404,0 16 0,0-5 0,0-16 0,0 0-584,-1 20 0,2 0 629,7-17 0,1 0-310,-7 16 0,1 1 265,13 1 0,0 0 45,-14 1 0,0-1 0,21-10 0,3 0 45,-15 16 0,1-1 45,19-14 0,4 4 180,2 4-90,11-3-452,-1 30 362,-12 7 1959,5 6-1960,-16 24 91,-6-15-90,-8 24 0,-3 7-90,2-5 45,-5 13 0,-2 3 1381,-1 4-1426,-12-18 0,-2 0 90,7 13-90,-38-1-270,39-2-360,-24-16 1,-2-1-181,8 14-225,-10-11 1,-1-2 1034,4-1 0,-9 3 0,15-15 0</inkml:trace>
-  <inkml:trace contextRef="#ctx0" brushRef="#br1" timeOffset="-166142.73">15018 5161 9242,'6'18'899,"-2"20"-629,-3-20-180,0 19-90,-1-6 90,0 1-90,0 2 0,0 1 0,-16 13 0,12-12 0,-13 18 0,17-25 90,0 8-90,0-20 0,0-1-630,0-10 360,0-22-359,22-37 449,-17-2-443,12 14 1,2 0 262,-7-14-179,13-3-91,-7 3 90,-1 5 540,0 7 0,-1 7 0,1 5 0</inkml:trace>
-  <inkml:trace contextRef="#ctx0" brushRef="#br1" timeOffset="-165779.73">15875 5114 9242,'-24'-25'1259,"-6"-2"-809,-15 8-90,-19 5-271,21 9-2919,6 14 0,0 2 2830,-4-6 0,15 17 0,2 3 1391,-3-4-1391,12 25 0,0-11 0,13 16 0,13-15-90,3-6 0,5-2-180,26 0 225,-8-8 0,2-3 430,15-5-385,-18-5 0,-1-2 0,17-5 0,-3 0 0,-2 0 90,8-21-180,-20-7 90,-14 2 0,-3-3-90,-7-18-90,-4-2-90,-7 11-89,0-1-181,-28 2-180,21 1 1,-48 3-181,33 3 900,-24 5 0,13 5 0,1 2 0</inkml:trace>
-  <inkml:trace contextRef="#ctx0" brushRef="#br1" timeOffset="-164928.73">16420 5226 8342,'-35'0'270,"1"0"-180,-13 20-90,15 1 0,-11 23 0,29-10 90,1 12-180,13-18 90,22 6 0,-17-13-180,46-4 90,-27-7 45,9-6 0,3-2 45,11-2 0,-8-10 0,1-5 0,5-5 0,-9-10 0,-2-4-868,-1-10 868,-12 13 0,-3-2 90,-1-19 0,-8-5 180,-1-4 224,-8 12 1,0-2-225,3 12 0,-3-1-60,-5-3 0,-3-5 0,1 4-75,5 7 0,-1 0-91,-6-20 1,-2 3-134,-3 4 178,10-3 121,-11 30-120,15 39-90,0 0-45,-1 20 0,2 6 135,15 17-838,-9-10 1,1 7 0,0-4 792,2-8 0,0 0-75,1 11 0,0 6 0,0-7 30,-2-15 0,0-3 45,6 23 0,2-3-894,10 2 669,-15-23 0,1-2-580,14 14 400,-8-17-720,15-1 721,-14-21-90,15-19 449,-13 6 45,-3-21 0,-1-5 45,3 4 90,-6-4 0,-2 0 359,2-7-89,-1 0-180,-5 5 1915,2-4-2095,-6 20 2201,1-8-2111,-4 23 339,1 11-429,1-5 53,1 30-143,3-3 0,0 7 90,11 18-90,-5-24-809,19 18 269,-9-26-620,11 3 710,-5-14 90,3-7 1,1-2-1,1-4 270,1 0 0,-3-24 180,8-10-90,-14-14 404,-10 15 1,-3-1 225,-5-11 0,-2-13 449,-7 4-899,0 19-180,-20-12 0,15 29 0,-29 3 90,30 27 0,-11 12-360,15 25-539,0-8-990,24 20 989,-18-25 810,23-7 0,6-2 0,-8 2 0,4-12 0,0-1 0</inkml:trace>
-  <inkml:trace contextRef="#ctx0" brushRef="#br1" timeOffset="-164726.73">18042 5092 9961,'-48'-6'1529,"8"1"-1529,16 20 0,0-11 90,22 32-90,-9-19 90,11 34-90,0-19-449,23 26-91,-17-25-270,46 7-899,-7-10 900,14-11 809,-16-9 0,1-2 0,10-3 0,-18-5 0,1 0 0</inkml:trace>
-  <inkml:trace contextRef="#ctx0" brushRef="#br1" timeOffset="-164508.73">18647 4564 10771,'-23'-27'360,"4"7"359,5 4-719,0 10 0,-3 29 0,7-1 0,8 25 0,4 6 0,-2 8-969,0 3 1,0 1 968,-1-31 0,2 0-225,7 21 1,2-1-676,-6 8 495,14-24 1,-1-1-536,-13 10 40,13-5 1,-5-5 899,-9 5 0,9-14 0,-12 5 0</inkml:trace>
-  <inkml:trace contextRef="#ctx0" brushRef="#br1" timeOffset="-164376.73">18427 5054 10141,'0'-29'270,"0"0"-180,0 5-180,23 1 90,-17 1-450,50 4-179,-27 0-181,30 3 810,-22 9 0,0 1 0,20-1 0,-18 4 0,-1 1 0</inkml:trace>
-  <inkml:trace contextRef="#ctx0" brushRef="#br1" timeOffset="-163779.73">19428 5293 10861,'-15'0'1619,"28"0"-1979,17 0-360,21 0-1020,5 0 571,-4 0-180,5 0 0,5 0 1072,4 0 0,-32-4 1,-1-2-1,2-1 1,0 1-1</inkml:trace>
-  <inkml:trace contextRef="#ctx0" brushRef="#br1" timeOffset="-163340.73">20632 4866 10861,'-40'-5'584,"0"0"1,-14-1-585,12 12 0,3 5 0,7 13-90,16 34-90,28-22-180,15 17 181,-4-32-181,25-1 180,-29-4 180,22-14 0,-12 7-90,7-9 90,-11 0 0,5-22 90,-13 16 540,-5-49-181,-3 34-269,-6-26 0,-3 20-180,0 5 0,0 1 0,0 2 0,-15 10 0,11 20 0,-10 8 90,4 21-90,8 0 0,-8 6 45,9-7 0,2 0-375,-1 23 330,0-10 0,0-1 90,0 8-90,0-15 0,0 0 90,0 1-180,0 7-450,0-17 1,0-15-2250,0 1 1710,-17-17 1079,13-20 0,-13-18 0,17-21 0</inkml:trace>
-  <inkml:trace contextRef="#ctx0" brushRef="#br1" timeOffset="-162929.73">21383 4818 10051,'-45'0'1439,"-4"0"-1529,2 0 180,8 0-90,4 0 0,13 18-90,-1 6 270,11 9-270,1 1 0,11 5-269,0-10-1,0 11 0,18-16-90,-14-1 181,33-6-91,-10 2 270,8-10 90,13-1 0,-20-8 0,19-21 90,-24 16 0,5-40 359,-14 25 91,-7-22 0,2 9 629,-9-14-989,3 14-90,-3-14 90,0 24-90,0 25-540,0 35-359,0 10-721,8-8 1,3 0-540,11 1 1978,11 12 1,-1-19-1,-6-1 1</inkml:trace>
-  <inkml:trace contextRef="#ctx0" brushRef="#br1" timeOffset="-162128.73">21892 5082 8972,'17'-39'630,"-13"5"-361,29-3-179,-29 4 0,12 3 0,2 0 90,5-20-180,-5-10 0,2-3-457,-2 29 0,-2 0 577,-5-11 0,-3-7 0,0 7-30,-1 9 0,0 2 180,0-26 0,-3 1-610,-3-7 430,1 26 0,-1 1-90,-1-7 0,0 11 288,0 6-198,-14 8-90,10 30 90,-19 50 0,20 5-880,-2-14 1,1 0 834,3-13 0,2-2-45,-1 2 0,0 0 163,0 0 1,0 2-164,-2 13 0,4-1 0,6-13 0,3 0 45,-3 20 0,2-2-823,13 2 598,-7-23 0,-3-2-90,-10 4 91,32-4-339,-20-5 338,16-6 1838,-9-5-1658,0-5 338,9-6-338,-7-3 624,16-17-624,-16 10 0,1-24 0,-1-5 0,3 4-18,-6-5 0,-2-1 18,4-8 0,-1-2 0,-7 8 0,0 0 0,7-24 135,-4 6 0,-2 0 0,-8 20 0,-1 1-90,3-9 0,-1-1 180,-5 2 0,-1 3 224,0-18-449,-1 14 0,-1 2 180,-1 2-34,-19-9-56,15 30-90,-31 2 90,17 13-90,-1 23 270,-8 21-180,14 14-1068,1-6 0,1 1 1023,4-14 0,2 0-90,1 11 0,1 4-262,2-7 1,2 3 0,-1-4 216,-1-2 0,2 1-135,9 22 0,1-2-494,-6-5-271,12-20 1,4-1-399,4 13 1388,-4-14 0,4-2 0,13-4 0,1 3 0</inkml:trace>
-  <inkml:trace contextRef="#ctx0" brushRef="#br1" timeOffset="-161779.73">22895 4849 10051,'21'-5'1260,"-16"16"-1440,36-8 180,-13 12-180,9-15 0,11 0 180,-20 0-90,16 0 0,-23 0 90,12-21 0,-20-8 180,-1-27 90,-8 10 179,-4-4-179,-18 4-360,14 13 90,-33-10 90,32 25 0,-26 3-180,19 36 90,-2-2 90,5 27-405,8-8 1,2 1-316,-1 14-2146,10-3 1,1 0 1516,-6-6 1259,16-16 0,0-3 0,-15 6 0,15-2 0</inkml:trace>
-  <inkml:trace contextRef="#ctx0" brushRef="#br1" timeOffset="-161479.73">23547 4622 9422,'-15'14'989,"3"11"-899,12 9-90,0 20 0,0-18 0,0 27 0,0-27 90,12 16-90,-9-26 540,9 6-630,-12-20 0,0-24-90,0-18-180,0-36-90,0 10-270,-2 13 1,4 2-1397,21-10 1217,-18-14 899,35 24 0,-35 5 0,12 2 0</inkml:trace>
-  <inkml:trace contextRef="#ctx0" brushRef="#br1" timeOffset="-161242.73">24055 4740 12300,'0'44'-180,"0"-7"-180,13 2-89,-10-8-361,9-1-899,-1 10 720,-9-11 89,14 4 900,-9-9 0,3-11 0,-1 2 0</inkml:trace>
-  <inkml:trace contextRef="#ctx0" brushRef="#br1" timeOffset="-161078.73">24193 4196 10501,'0'-29'-90,"0"4"90,-12 8-1979,9 5-449,8 28 2428,-1 11 0,35 19 0,-13 0 0</inkml:trace>
-  <inkml:trace contextRef="#ctx0" brushRef="#br1" timeOffset="-160712.73">24390 4709 10591,'47'0'0,"-10"0"-90,-2 0 0,-10 0 90,-1 0 0,-1 0-90,-3 0-90,-2 0 90,-3 0 90,-7-16 270,-2-2 0,-23-1 0,-5-11-270,0 15 90,-13-4-90,16 7 180,-12 12-270,14 13 90,7 13 0,10 6 0,0 8-180,0-9-450,0 1-539,22 14 719,-16-13-539,34 17 359,-13-26-631,9 3 1261,3-15 0,-11-3 0,2-3 0</inkml:trace>
-  <inkml:trace contextRef="#ctx0" brushRef="#br1" timeOffset="-160446.73">24923 4720 9602,'0'-27'1798,"-20"0"-1438,14 4-270,-14 2-180,2 0 90,13 8 0,-12 0 0,6 10 0,9 18 0,-9 7 0,28 25 0,-12-7-90,9-9 0,4-1 90,6 6 0,9 12 90,12-4-180,-17-11 135,-5-7 0,-1-1-45,2 0 180,8 10 0,-18-20-270,-1 5-360,-9-13-1618,-24 1 449,-16-5 1619,-12-1 0,-8-1 0,10 0 0</inkml:trace>
-  <inkml:trace contextRef="#ctx0" brushRef="#br1" timeOffset="-159562.73">25263 4583 8702,'-7'0'1349,"2"0"630,1 0-1799,32 0-90,-4 0 180,33 0-2045,-6 0 1865,14-15-135,-10 4 0,3-1 90,-11-3 0,1-2-75,8 0 0,5 0 0,-5 0-240,-4 0 1,0-1-391,5-1 0,4-3 1,-5 2-546,-6 0 1,-2 1 439,14-4 0,-2-1 765,-21 7 0,-2 1 0,-2 1 0,0 1 0,-2-1 0,0 1 0</inkml:trace>
-  <inkml:trace contextRef="#ctx0" brushRef="#br1" timeOffset="-158829.73">27168 3628 10321,'0'47'-450,"-14"-7"-269,11 2-181,-11-7-1348,14 19 2248,0-14 0,0 11 0,0-17 0</inkml:trace>
-  <inkml:trace contextRef="#ctx0" brushRef="#br1" timeOffset="-158654.73">27285 3304 9871,'0'-19'-180,"0"5"180,-10 3-1978,7 5 808,-7 23 1170,26-13 0,-12 37 0,12-14 0</inkml:trace>
-  <inkml:trace contextRef="#ctx0" brushRef="#br1" timeOffset="-158262.73">27937 3486 10591,'-46'0'809,"3"0"-719,9 0-90,-2 18-470,-3-13 470,1 35 0,3-20 0,3 20 0,6 12 0,12-13 0,6-4 0,7 0-270,22 4 45,-4-8 1,5-3 44,27 1 90,5-12 0,1-5 90,5-3 0,1-16 0,-1-3 154,-5 4-154,-12-25 0,-2-5-624,2 3 714,-17-2 0,-4-4 90,2-12 540,-6-7 89,-7-4-225,-7 15 1,-2-2-315,-1 14 0,0-1-135,-1-20 0,0 2-135,0 0-45,-7 19 0,-2 4 135,6 7-180,-13 22-809,16 41 179,0 13 212,0-17 0,0 3-1022,0 12 1,0 1-355,0-10 1,0 1 1883,0 14 0,0 1 0,0-16 0,0-2 0,0 0 0,0 1 0</inkml:trace>
-  <inkml:trace contextRef="#ctx0" brushRef="#br1" timeOffset="-157663.73">25583 4540 9332,'-8'0'629,"1"0"1710,1 0-2069,25 0 0,-15 18-180,44-14 0,-22 30-1444,29-20 1354,-2 14 0,-5-9 0,3-1 0,-9-5 0,2 1-150,10 2 0,6 1 0,-3-2-120,-1-1 0,3 0-180,-12-3 0,7 1 1,2 0-1,-1-1 0,-6-1 120,0 0 0,-6-1 1,6 0-289,0 1 1,7 0 0,1 1 0,-2 0-1,-8-2 424,15 2 1,-4 0 0,-10-2-1,3 0 1,-5-1 0,0 1 0,1 0-1</inkml:trace>
-  <inkml:trace contextRef="#ctx0" brushRef="#br1" timeOffset="-156708.73">28040 4768 10771,'0'-11'629,"0"2"-629,0 26 0,-15 0 90,11 26-90,-10-5-377,2 9 287,9 4 90,-18 5 90,19-2-1057,-14-1 967,10-3 0,-7 13 90,5-20 0,-3 16-90,5-34-180,-1 0-180,4-16 408,1-5-138,0-2 937,1-21-1207,0-13 540,1-11-180,0-11 0,9 17 0,1 0 0,-6-24 30,12 17 0,6-5 0,-6 5-74,-12 9 1,1 1 103,13-6 0,8-3 0,-5 6 299,-5-7-269,8 15 0,2 5 180,-6 4-180,13 3 0,-17 13 90,14 17-180,-17 8 0,7 15 0,-15-4 177,-1 9-537,-3-17-1439,-1 15 720,-17-20-900,13 4 1979,-26-11 0,26-5 0,-10-2 0</inkml:trace>
-  <inkml:trace contextRef="#ctx0" brushRef="#br1" timeOffset="-156440.73">28422 4628 9871,'20'0'1170,"-2"17"-1080,-7-12 90,-3 31-180,-4-19 0,0 18 89,1 10-89,-2-10-89,0 11 178,-3-16-89,0-2 0,0-3 0,0 3 0,0-10-899,0 2 719,0-58-90,0 16-315,-1-19 1,2-3-136,18 1 720,-11-3 0,4 0 0,29 1 0,-22 12 0,1-1 0</inkml:trace>
-  <inkml:trace contextRef="#ctx0" brushRef="#br1" timeOffset="-156110.73">29173 4747 9781,'-23'-18'900,"-18"14"-810,36-23 0,-43 24-90,27-17 90,-22 17-180,12-8 90,1 11 0,2 0 0,3 0 0,4 18-90,2-14-180,10 35 0,2-12 90,31 20-90,-18-12 270,46-13-90,-28-5 180,25-15-90,-10 8 0,15-10 90,-15 0-90,18-16-90,-39-7 0,11 2-89,-27-20-91,6 24-90,-8-21-360,-17 4 91,12 10 629,-27-4 0,28 12 0,-11 0 0</inkml:trace>
-  <inkml:trace contextRef="#ctx0" brushRef="#br1" timeOffset="-155508.73">29518 4709 9152,'-41'0'629,"2"17"-629,22 1 0,-9 3 90,23 11-90,-9-11 0,12 7 0,0-3 0,24-11-90,2 2 0,30-9 1,-16 1 89,3-8 0,-14 0 0,-2-22 0,0 16 0,-4-38 0,-1 25 0,-5-21 89,3-16-89,-10 8-564,-3 1 0,-1 0 1104,-4-15-315,0 20 0,-1 1-1,-1-16-44,0 2-180,0 5 0,0 8-90,0 7 90,0 10 90,0 8-90,0 36 90,0 0-90,0 34 0,0-8 1407,0 7-1497,0 7 135,-2-16 0,4 1-90,5-12 0,2 1-360,-2 19 1,2-3 44,10 1-135,3-8 1,0-4 314,-7-7 83,35 11 7,-31-35 0,10-1 90,-13-27 90,2 16 0,-8-39 180,-2 24 359,-1-24 451,-1-4-721,-2 10-269,-1-17-90,-3 30 0,0-5 0,0 37-90,0 27-269,0 7-181,8-5 0,1-1-179,-4 3-46,9-7 1,3-2-46,3 1 0,7 6-89,2-19 899,-6-7 0,2-5 0,1-5 0</inkml:trace>
-  <inkml:trace contextRef="#ctx0" brushRef="#br1" timeOffset="-155340.73">30380 4659 10501,'0'-22'899,"0"3"-899,-19-1 0,-1 12-269,-3 14-91,8 20-90,7 10-90,6 3 1,-6-6-721,8 13 631,21-10 629,6 21 0,24-32 0,2 7 0</inkml:trace>
-  <inkml:trace contextRef="#ctx0" brushRef="#br1" timeOffset="-155145.73">30638 4740 9602,'0'-29'1529,"0"-6"-1619,0 10 0,-19-2 180,14 12-90,-25 8 0,27 41-90,-8-11-270,18 12 0,5 2 0,-7-4-360,25-1 1,5-2 179,-9-2 152,5-11 0,2-3-242,-1-1 0,1-11 630,0 4 0,0-6 0,0 0 0</inkml:trace>
-  <inkml:trace contextRef="#ctx0" brushRef="#br1" timeOffset="-154910.73">31125 4386 9242,'1'-53'1619,"0"3"-990,-1 5-269,0 5-180,0 5-180,0 7-90,0 7 90,0 7 90,0 6-180,0 30 180,0-3-45,0 24 0,0 5-135,0 4-237,0-6 0,0 0 327,0 7-270,0 0-180,0-19 0,0 0 0,0 16-180,0-13 1,0-2 269,0 0-179,0 5-721,0-18 811,0-9 449,0 0 0,-22-11 0,-5-1 0</inkml:trace>
-  <inkml:trace contextRef="#ctx0" brushRef="#br1" timeOffset="-154779.73">30947 4629 9512,'-19'-23'1259,"-5"1"-1169,21 1 0,-11 0-180,13 4-90,18 6-180,13 5-270,14 6-313,2 0-46,-7 17-90,2-13 1079,-1 29 0,-1-29 0,-1 12 0</inkml:trace>
-  <inkml:trace contextRef="#ctx0" brushRef="#br1" timeOffset="-154560.73">31582 4596 10681,'-17'-15'0,"12"-4"0,-12 13 0,8-2 90,7 26-180,-7 12 180,9 15-360,0 0-270,0-7-989,0 17 540,0-15 989,20 20 0,-16-31 0,16 5 0</inkml:trace>
-  <inkml:trace contextRef="#ctx0" brushRef="#br1" timeOffset="-154362.73">31712 4172 10321,'0'-10'-2249,"0"2"900,0 19 1349,0 5 0,0 1 0,0-2 0</inkml:trace>
-  <inkml:trace contextRef="#ctx0" brushRef="#br1" timeOffset="-153946.73">32137 4483 9781,'-22'-18'630,"0"5"-540,-24 30-90,8 11 0,15 9-802,-3 4 802,23-12 80,-7 2-170,10-3 90,0 10 0,16-12-270,4 8 270,0-18-90,29-3 90,-24-9 90,13-22 415,-7 13-415,-14-54-180,7 31 135,-13-3 0,-2-4 0,-1-1 0,0 0-33,3-25 482,0 3 1,0-1-632,-3 22 1,-1 0 450,4-11 1,1-1 90,1 4 0,0 3-405,6-19 0,-3 20 0,-1 4 270,-1 5-90,5 5-180,-12 20-90,0 26 0,-1 18-270,-4 13-225,1-5 1,0 1-1483,-2 20 1302,0-20 1,-1 1-1440,2 5 1,-4-2 2203,-7-11 0,-1-1 0,8 12 0,-1-1 0,-6-17 0,-1 0 0</inkml:trace>
-  <inkml:trace contextRef="#ctx0" brushRef="#br1" timeOffset="-153276.73">25970 4607 7623,'-6'0'0,"0"0"-90,3 0 90,0 0 0,0 0 0,2 0 0,0 0 0</inkml:trace>
-  <inkml:trace contextRef="#ctx0" brushRef="#br1" timeOffset="-152690.73">25722 4607 8522,'15'30'1349,"-11"1"-1079,26-4-180,-26 1 0,27-2 90,-17 4-90,16 4 90,-4 3-135,-3-6 0,3 0-1172,17 19 1127,-11-15 0,2 0 135,-6-9 0,1-1-135,3 1 0,1 0 45,1 1 0,4 0-15,-1-2 0,4 2 0,-2-1-30,7 3 0,2 1-653,7 3 0,5 2 1,-4-2 652,-5-3 0,0-1 22,-8-6 1,4 2-1,0 0 1,-5-2-23,10 6 0,-1-1 0,-7-4 0,2 0 0,0 0-741,0 0 1,1 1 0,-2-2 740,8 4 0,1 0 0,-10-5 0,4 2 0,0 0 0,-4-3-347,9 6 0,0-1-163,3 1 1,6 2-1,-7-2 150,-8-4 1,-2 0-361,0-1 0,4 2 1,-6-3 719,-8-4 0,-4-1 0,7 4 0,-2-2 0,5 3 0</inkml:trace>
-  <inkml:trace contextRef="#ctx0" brushRef="#br1" timeOffset="-150563.73">28760 6178 9332,'0'-9'1979,"0"3"-1530,0 0-179,0 3-180,0 0-90,0 1 0,0 18 0,-26 28 0,20 2-360,-12-6 0,-1 0-809,9 4-405,4-3 0,0 0 1574,-1-3 0,7 14 0,0-30 0</inkml:trace>
-  <inkml:trace contextRef="#ctx0" brushRef="#br1" timeOffset="-150396.73">28752 6048 8522,'-12'-13'90,"9"1"-180,-9 1 90,6 6 0,26 19 0,1 9 0</inkml:trace>
-  <inkml:trace contextRef="#ctx0" brushRef="#br1" timeOffset="-149862.73">29153 6313 8972,'0'11'989,"0"1"-359,0 8-540,0-2 0,0 16-90,0-9 0,0 7 0,0 5 0,0-10 0,0 22-180,0-22-540,0 13 451,0-21-1710,0 5 2069,0-37-180,0-8 180,20-19 179,-4-18-89,6 21-90,3-10 360,-11 9 90,2 14-1,1-4-269,-8 21 90,6 1-360,-6 21 90,1-11-90,-5 31 0,-1-30 0,2 39-90,-3-12 180,-1 11-720,1 9 91,0-25 179,2 4 90,-1-15 90,1-9-270,-1 3 181,1-9 179,3 2 0,-1-3 90,10-17 90,-4-7 89,14-24 1,-7 8 0,5-1-90,-7 13 0,-3 3 180,-1 4 270,-1 3-180,-4 9-360,5 2 0,-7 7 89,10 22-178,-8 7-271,8 13-1259,2 16 719,-3-22 900,8 11 0,-5-17 0,3-2 0</inkml:trace>
-  <inkml:trace contextRef="#ctx0" brushRef="#br1" timeOffset="-149428.73">30233 6395 9602,'-21'-22'809,"1"-1"-719,-5 9 90,-2 3-180,10 8 90,-14 21-90,4 5 0,6 21 0,10-9 0,6 10-180,5-20 180,18 4 0,-13-8 0,32-11 0,-18-1 90,15-9-180,-18-18 180,3 13 360,-11-44-91,0 30-89,-2-26-90,-6 20-180,0 3-180,0 4 270,0-1-90,0 27 0,0 15 0,16 19 0,-15-5 0,2 1 0,26 14-1696,-21-6 0,-2 1 1786,10 8-90,-5-11 0,-3-1 90,-5 1 0,6 17-180,-9-35 0,0 2-2248,0-15 359,-20-7 1979,1-22 0,-4 10 0,9-15 0</inkml:trace>
-  <inkml:trace contextRef="#ctx0" brushRef="#br1" timeOffset="-149263.73">30635 6608 9242,'15'14'899,"-1"-10"-809,4 11-90,-1-15-90,5 0 180,-1 0-180,3 0-1709,17 0 630,-7 0 1169,12 0 0,-13 0 0,-1 0 0</inkml:trace>
-  <inkml:trace contextRef="#ctx0" brushRef="#br1" timeOffset="-148829.73">31182 6417 9961,'0'39'0,"0"-6"90,12-2-180,-9-4 180,22 11-90,-22-9 0,18 9 90,-14-15-180,9-2 90,-3-5-180,10-3 180,-5-6 0,15-3 90,-15-24 90,14-8 90,-16-11 180,4-2 0,-10 9 89,-1 1-179,-3-3 360,0-8-630,-2 11-90,1-10 179,-3 24-268,-1 18 89,14 34-360,-11 4-135,11-5 0,1 0-134,-11 2-361,26 10-1348,-11-9 1258,8-12 1080,0 3 0,-8-20 0,-2-3 0</inkml:trace>
-  <inkml:trace contextRef="#ctx0" brushRef="#br1" timeOffset="-148545.73">31860 6416 9871,'0'-14'720,"0"1"539,0 4-1169,0 34-180,11-20 90,-5 30 0,-1 7 0,8-21 0,-4 12 0,-3 0 90,-4-10 900,10 5-721,-10-15-269,7-4-89,-6-5 178,6-27-178,-2 17 178,5-40-268,6 6-271,-3-9-270,0 13 1,1 2-589,3-7-41,5-7 179,-5 19-359,-1 5 1529,1 6 0,-1 8 0,-2 4 0</inkml:trace>
-  <inkml:trace contextRef="#ctx0" brushRef="#br1" timeOffset="-148212.73">32375 6731 11850,'17'-41'720,"-13"7"-540,33-1-90,-33 6-90,33 0 90,-32-2-90,30-2 90,-23-1 0,15-3-1,-3-20-89,-7 12 135,-3 3 0,-2 0-1533,1-7 1488,-6 16 0,-1-1 270,-2-27-270,-1 18 268,-3-15-538,0 34 180,0-2 0,-14 20 90,11 19-90,-11 20-720,6 22 1,3 5 404,3-22 0,1 0-74,-6 24 1,1-3-1231,6-3 1619,-1-18 0,2-1 0,19 19 0,-7-20 0,-1-1 0</inkml:trace>
-  <inkml:trace contextRef="#ctx0" brushRef="#br1" timeOffset="-148076.73">33030 6677 13739,'5'0'-809,"-1"0"809,0 0 0,-3 0 0,2 0 0</inkml:trace>
-  <inkml:trace contextRef="#ctx0" brushRef="#br1" timeOffset="-146408.73">23968 657 11490,'-27'25'90,"0"-1"0,-20 17-45,21-18 0,-1 0-616,-18 17 526,8-8 0,1 1-158,8-8 1,-1 1-428,-19 18 1,1 1-318,21-20 1,2-1 271,-8 8 1,2-1-855,-4 8 1529,6-3 0,4-5 0,5-2 0</inkml:trace>
-  <inkml:trace contextRef="#ctx0" brushRef="#br1" timeOffset="-145694.73">24530 498 10411,'0'-4'1259,"0"1"-899,2 0-270,0 2 0,2-1-180,-3 16 90,0 5 0,-1 9-270,0 3-269,0-4-1620,0 19 630,0-11 1529,0 23 0,0-26 0,0 7 0</inkml:trace>
-  <inkml:trace contextRef="#ctx0" brushRef="#br1" timeOffset="-145529.73">24677 313 8252,'0'-9'0,"1"0"-180,1 4-629,7-1 179,-2 4 630,8 0 0,-1 2 0,3 0 0</inkml:trace>
-  <inkml:trace contextRef="#ctx0" brushRef="#br1" timeOffset="-145158.73">25265 490 9242,'-55'1'1169,"10"0"-1169,1 3 0,10 0 0,-9 9 0,10-1 0,-2 15 90,15-8-90,10 19 0,2-13-90,8 8 180,27 0-270,10-12 90,-1-6 0,4-2 0,22-4 90,-15-3 0,-2-5-759,9-20 759,-17 18 0,-1-3 0,-3-23 0,-3-3 90,14 5 225,-13-11 0,-4-2 404,-3-3 1,1-11 89,-16 4-629,-5 14-503,-2-11 233,-2 26 90,0 0 0,0 13-179,0 25-271,0 9-180,0 17-359,0 4 283,0-6 706,-1-7 0,2 0 0,16 21 0,-7-19 0,0 1 0</inkml:trace>
-  <inkml:trace contextRef="#ctx0" brushRef="#br1" timeOffset="-144793.73">23938 1589 9332,'20'2'1799,"8"1"-1260,-25-1-89,25 1-180,-15-2 90,31 0-360,-12-1 0,17 0-45,-16 0 0,1 0-585,27 0-405,-2 0 1,3 0-57,-22 0 0,2 0 1091,9 0 0,4 0 0,-3 0 0,-2 0 0,-1 0 0,-4 0 0,0 0 0,0 0 0</inkml:trace>
-  <inkml:trace contextRef="#ctx0" brushRef="#br1" timeOffset="-144263.73">25762 1591 10141,'-11'-20'1619,"1"2"-1349,2 2 90,2 3-360,1 0-90,3 6 180,-1 0-90,0 6 0,1 22 90,-1 8-180,2 13 180,0 2-180,1 7 0,0-12-90,0 10-180,0-12 180,0-13-89,0 3-181,0-16 360,12-5-90,-9-23 180,20 12 0,-20-39 0,21 23 90,0-41-90,5 17-232,-5 7 1,0 0 501,5-8-180,-3 12 0,0 2 0,4-1 90,7-1-484,-6 19 304,-8 8 0,10 3 0,-17 27 0,8 9-360,-11 12-899,6 20 359,-8-25 91,5 13-990,8-8 1799,-1-14 0,10 3 0,-5-16 0</inkml:trace>
-  <inkml:trace contextRef="#ctx0" brushRef="#br1" timeOffset="-143913.73">26625 1545 10141,'0'-24'1349,"0"2"-1259,0 1-90,-17 3 0,13 2 90,-30 5-90,12 5 0,-19 3 0,17 21 0,-13 9 0,24 9-90,-6 20-179,10-23-408,9 13 317,0-17 180,22-2-180,-16-5 90,35-3 270,-14-6 0,19-6 0,-10-4 0,-3-24 270,-13 16 0,-2-38 630,-3 12-451,-2-10 228,-3 0-137,-1 4-540,-4 12-180,-2-4 270,0 14-270,-2 7-90,2 19-90,1-7-89,0 33-271,2-32-269,0 39-1,1-25-1349,9 31 2339,-4-22 0,7 4 0,-6-13 0</inkml:trace>
-  <inkml:trace contextRef="#ctx0" brushRef="#br1" timeOffset="-143211.73">27017 1492 10321,'0'-17'900,"0"25"-900,0 11 90,0 17-180,0-3 180,0 3-180,0-8 0,10 12-180,-7-21-450,7 3 630,-3-15 180,5-43-90,1 12 0,-2-12 0,1-1 90,1 1 90,8-11 180,-5 14-270,1 2-90,-2 5 899,5-4-899,-9 17 0,8-5 0,-10 17 90,8 12-180,-8 13 90,5 8 0,-6 6 0,-2-7-449,0 1-1,-3 1-90,1-2 0,-1-1-359,3 4 629,0-11-719,3 2 989,-2-18 0,8-19 180,-7 8 449,12-30-359,-11 10 450,9-18-451,-9 8-89,2 12 180,-5 2 90,0 17-450,-3-15 90,5 16-90,-2-4 90,10 6-180,-2 14 90,5-10 0,-1 23 0,3-24 0,0 23-180,4-23-180,2 22 90,2-22 180,16 16 90,-10-18 0,26 7 0,-24-8 90,18-18-90,-27-3 180,4 0 0,-17-18 90,-2 21 0,-6-19 269,-3-1-269,-2 9 90,-2-16-270,-22 24 90,3-7 90,-18 20-270,8 0 0,13 26 0,-4 9 90,17 12-270,-5 20-360,8-19-1214,20 3 0,6-1-225,1 0 1836,6-8 0,3-4 0,2-4 0,4-3 0</inkml:trace>
-  <inkml:trace contextRef="#ctx0" brushRef="#br1" timeOffset="-141412.73">27538 8048 10051,'-2'-4'1799,"1"1"-1619,-1 0 0,2 1-180,22-2 90,-17 1-90,43-1 0,-23-1-450,23 2 0,5 0-629,12-1-1251,-22 2 0,5 1 1,-4 0 2329,-6 0 0,-2 2 0,12-1 0,0 0 0,-14 0 0,0 0 0</inkml:trace>
-  <inkml:trace contextRef="#ctx0" brushRef="#br1" timeOffset="-140940.73">28792 7811 10861,'-3'-4'1349,"1"1"-1169,-1 1 180,1 0-360,1 15 0,0 10-990,1 27-89,0-3 1079,0-2 0,0 0 0,0 4 0,0-12 0,0 1 0</inkml:trace>
-  <inkml:trace contextRef="#ctx0" brushRef="#br1" timeOffset="-140774.73">28905 7634 9062,'2'-17'-90,"0"1"-90,0 8-360,3 2-179,2 5-361,4 0 1080,1 1 0,6 15 0,1 3 0</inkml:trace>
-  <inkml:trace contextRef="#ctx0" brushRef="#br1" timeOffset="-140380.73">29677 7867 9961,'-54'0'1799,"10"0"-1619,-3 0-90,-7 0-180,11 0 90,-9 17 0,20-13 0,6 32 0,6-20 0,8 29 0,6-16-180,6 21 180,23-22-360,11 12 271,15-23-1289,3-2 1198,-9-11 270,2-4 146,1-16-146,-14 3 0,0-4-180,13-22 135,-10 6 0,-2-2 40,-1-12 319,-11 4 1,-2-1-465,-4-10 330,-7 20 0,-1 0 425,-5-23-695,0 20-90,-2-8 90,0 29 90,0 29-539,0 26-91,0 19 45,0-9 0,0 1-120,0-15 1,0 0-646,0 29 1,0 1 405,0-26 0,0 0 854,0 12 0,0-2 0,0-14 0,0-3 0,0 34 0</inkml:trace>
-  <inkml:trace contextRef="#ctx0" brushRef="#br1" timeOffset="-139958.73">27710 8224 9332,'-1'-6'2428,"0"2"-1708,21 2-360,7 1-90,12 1-91,3 18-89,-6-14-1198,3 33 1108,5-19 0,-10 8 0,1 4 45,-7-11 0,1 1-135,5 6 0,4 3 0,-3-2-225,-1-1 0,0 0-958,14 11 1,-1 0 912,-12-10 0,-1 0-180,1 0 1,1 1-181,-1 0 1,1 0-91,-1 0 1,1 0 809,-2 0 0,0-1 0,-1 0 0,-1 0 0,-1-1 0,0 0 0</inkml:trace>
-  <inkml:trace contextRef="#ctx0" brushRef="#br1" timeOffset="-139445.73">29525 9036 11940,'-13'-12'0,"10"0"-90,-21 5 180,21-3 0,-18 7-90,14 18 0,-7 14 0,6 11 0,2 3 0,2-8 0,2 2 0,0-2-360,2 9 180,0-15-89,0 4 89,17-16 180,2-23 0,18-13 0,-10-15 90,-7 4 0,0-1 179,5-12-89,-1 5 0,0 0-90,4-8-45,-6 14 0,0 2 225,0-1-180,2 1 0,-6 20 0,-7 6-90,7 19 0,-7-11-540,10 46 90,-6-26-495,-2 11 1,0 2-45,4 1 0,5 14-900,10-9 1889,-7-13 0,12 2 0,-9-16 0</inkml:trace>
-  <inkml:trace contextRef="#ctx0" brushRef="#br1" timeOffset="-139096.73">30255 9145 10591,'0'-22'1709,"0"-1"-899,-18-4-810,14 7-90,-14-1 180,4 13-180,10 0 0,-25 7 90,14 17-90,-12 8 0,14 12-540,1 12 270,11-18-449,16 28 539,-10-32 90,27 11 90,-13-28 180,12-2 90,-2-26 0,-5-5 180,-10-12 629,-3-10-629,-10 17 0,3-15-450,-4 18 180,1 6-90,1 9 0,1 11-90,-1 0-270,2 0-180,2 21 90,1-16-1349,7 47 720,-2-32-1709,11 36 2788,-8-28 0,6 4 0,-6-12 0</inkml:trace>
-  <inkml:trace contextRef="#ctx0" brushRef="#br1" timeOffset="-138724.73">30585 9085 11131,'0'-17'629,"0"24"-629,0 14 0,0 14 0,0 1 0,0-8 0,0-1-270,0 10-269,0-14-91,0 8 630,0-42 0,15 16 0,3-59 0,0 31 180,13-29 0,-27 20-90,30 2 90,-22 2 629,20-3-809,-17 12 90,7 2-90,-12 12 90,7 25-90,-9-15-225,0 27 0,-2 6-494,0-9 179,-1 13 0,-1 0-179,-1-6-630,1 18 989,1-30-180,0 6 540,4-21 0,-1-3 0,1-6 0</inkml:trace>
-  <inkml:trace contextRef="#ctx0" brushRef="#br1" timeOffset="-138408.73">30963 9265 9691,'7'-21'630,"1"-10"-540,-2 20 180,1-4-270,-2 8 0,4 7 0,2 0 0,2 0 0,2 19 0,1-15 0,4 26 90,14-17-180,-5 0 180,24 6-90,-17-17 0,27 7 90,-24-9-90,8-14 90,-5-5-90,-13 1 449,7-29-179,-20 27 270,-2-41-450,-10 31 360,-3-19-360,-1 23-90,-20-5 90,-5 20-180,-12 2 90,15 32 90,3 10-810,15 7 0,6 3-179,11 17 146,-13-21 0,6-3 753,28-5 0,6-5 0,-2 13 0,4-14 0,0 0 0</inkml:trace>
-  <inkml:trace contextRef="#ctx0" brushRef="#br1" timeOffset="-137746.73">28765 10781 11760,'-20'0'1080,"1"0"-900,4 0-1,2 0 1081,6 0-1350,28 0 180,1 0-270,30 0-450,-10 0 1,2 0-16,-6 0 1,3 0-346,9 0 1,7 0 0,-3 0-697,0 0 0,0 0 1686,-6 0 0,2 0 0,-3 0 0,5 0 0,-2 0 0,1 0 0,-1 0 0</inkml:trace>
-  <inkml:trace contextRef="#ctx0" brushRef="#br1" timeOffset="-136930.73">30383 10730 7623,'6'-7'989,"-5"-1"-539,4 2 269,-5-3-359,0 3 180,0-4-180,0 5-180,0-1-1,0 1 1,0 3 0,0-2-180,0 2 90,0 0 720,0 0-810,0 13 0,0 4 0,0 10 0,0 2-90,0-3-270,0 3-989,0 15 269,0-8-1708,0 18 2788,0-25 0,0 6 0,0-14 0</inkml:trace>
-  <inkml:trace contextRef="#ctx0" brushRef="#br1" timeOffset="-136762.73">30350 10483 11041,'-8'-28'-450,"6"3"-180,-6 4-179,1 1 809,5 9 0,19 2 0,11 8 0</inkml:trace>
-  <inkml:trace contextRef="#ctx0" brushRef="#br1" timeOffset="-136363.73">31105 10754 11580,'-50'-15'90,"10"-5"-90,-1 18 0,13-6 0,0 8 90,-3 0-90,16 21-90,-7-16-180,20 36-89,-4-15-1,28 19 90,13-10 45,-2-17 0,2-4 135,26-3 45,-5-3 0,-1-6 135,5-20-90,-2 6 0,-3-4-68,-6-23 293,-12 7 0,-2-2 494,0-12 45,-11 2 1,-3-2 45,-3-11-1219,-8 19 0,-2 1 679,-3-10-90,-2 6-180,-3 7-180,0 2 180,0 14 0,0 22-719,-14 29 89,10 12 0,-10 14-270,8-20 1,2 0-417,1 24 11,-2-8 1,0 1 1427,5 7 0,0-22 1,0-2-1,0 14 1</inkml:trace>
-  <inkml:trace contextRef="#ctx0" brushRef="#br1" timeOffset="-135922.73">28815 10862 9961,'-6'0'1709,"3"14"-629,0 3-631,3 22-179,25-7-270,-19 8 90,14-14 0,4 1-180,7 16-497,-3-1 0,3 1 632,-5-16 0,0 0-90,3 9 0,-1 3-180,5 4 0,-1 0 0,-6-10 0,1 2-165,2 4 0,3 4 1,-3-4-106,-2-2 0,0-1-495,2 3 1,2 4 0,-3-4 989,-2-5 0,-1-1 0,6 9 0,0-1 0,-10-14 0,0-1 0</inkml:trace>
-  <inkml:trace contextRef="#ctx0" brushRef="#br1" timeOffset="-135464.73">30453 11867 12660,'6'-7'-90,"-1"-1"-90,-2 5 360,-2-1-180,-1 26 0,0 25-90,0 3 0,0 16-180,0-11 180,0-13-450,0 17 271,0-32-181,0 4-719,14-22 1169,4-21 0,14-18 89,-6-12 136,-6 8 0,-1 0 135,5-9-45,-3 5 0,1 2-135,0-2 359,14-10-449,-21 33-90,7 0 0,-15 31 0,6 13-180,-6 8-270,-1-4 1,-1 1-361,2 11 91,-1 16-1080,5 0 719,-2-17 903,7 10 1,0-23-1,4-2 1</inkml:trace>
-  <inkml:trace contextRef="#ctx0" brushRef="#br1" timeOffset="-135096.73">31322 12089 12210,'1'-28'810,"-1"3"-541,0 2-89,0 5-180,-20 2 0,14 3-90,-28 7 90,13 1 0,-14 20 0,-1 8 0,16 9-90,-5 3-359,22 6 269,-8-8-360,11 17 270,0-23 180,20 7-90,-1-23 180,18 0 180,-5-30-90,-3-7 630,-5-25-270,-11 9-1,1-11-359,-9 26-90,3 3 0,-5 4 0,-2 41-360,-1-13-269,0 34-451,0 11 361,0-11-272,0 16-268,0-21 180,18-2 179,-13-3 900,13-6 0,-1-4 0,3-3 0</inkml:trace>
-  <inkml:trace contextRef="#ctx0" brushRef="#br1" timeOffset="-134272.73">31648 12070 12210,'6'-19'-180,"-2"3"180,-3 7 0,0 0 180,1 7-180,0-2 0,1 4 0,0 17 0,-1 6 0,2 25 0,-2-10 0,0 4-90,-2-15-90,0-2 0,0-3-90,0-4-539,0 0 809,0-26 0,16-12 0,-13-16 0,29-7 180,-28 6 134,19 9 1,3 0 45,-4-14-270,6 10 0,1 1 0,-1 2 270,3-3-90,-11 22-270,-8 5 90,4 25 0,-11-16-90,4 41 0,-7-22 0,0 16 0,-2 4-270,0 4-45,0-4 0,0-1 135,0-7-629,-12 15 809,25-57 0,-7-3 179,12-16 1,3-6 90,9-12 45,-9 14 0,1 2 45,2-2-90,18-5-180,-21 15-180,7 11 90,-6 0-90,-6 9-360,12 20 270,-13 5-180,5 11-179,-8 0-91,-1-9-180,-2 2-719,1 9 810,-4-9-1,2 10 630,-5-21 90,1-2 630,0-6-91,0-9 811,11 4-631,-4-20 1,16 11-630,-10-27 0,7 27 0,0-25 0,-6 26-90,16-19 0,-14 12 90,10 0 0,5-9-270,-7 11 180,23-15 0,-19 10 0,7-4 0,-13 5-90,-4-2 90,-3 0 0,1-10 0,-10 6 539,0-17-179,-9 12 540,-21-31-810,16 27 0,-32-21 0,32 32-180,-25 0 180,12 12-90,-12 24 0,6-15 0,9 42-180,1-8-180,12 13-1123,-6 6 853,7-17-359,28 0-91,-21-2 45,30-14 1,6-1 1034,-6 11 0,4-14 0,3-2 0,14 4 0</inkml:trace>
+  <inkml:trace contextRef="#ctx0" brushRef="#br1" timeOffset="-166446.74">14452 5196 8612,'-15'27'1169,"-9"4"-899,21 3-90,-18 3-5660,19 5 5480,-17 2 90,16 5 877,-16 1-877,17 2-90,-12-2 0,10-2 0,-2 0 0,3-2 0,3 16 0,0-17 90,0 21-90,0-34 1009,0 10-1099,0-26-630,0 0 360,0-60-89,0-14 404,0 16 0,0-5 0,0-16 0,0 0-584,-1 20 0,2 0 629,7-17 0,1 0-310,-7 16 0,1 1 265,13 1 0,0 0 45,-14 1 0,0-1 0,21-10 0,3 0 45,-15 16 0,1-1 45,19-14 0,4 4 180,2 4-90,11-3-452,-1 30 362,-12 7 1959,5 6-1960,-16 24 91,-6-15-90,-8 24 0,-3 7-90,2-5 45,-5 13 0,-2 3 1381,-1 4-1426,-12-18 0,-2 0 90,7 13-90,-38-1-270,39-2-360,-24-16 1,-2-1-181,8 14-225,-10-11 1,-1-2 1034,4-1 0,-9 3 0,15-15 0</inkml:trace>
+  <inkml:trace contextRef="#ctx0" brushRef="#br1" timeOffset="-166142.74">15018 5161 9242,'6'18'899,"-2"20"-629,-3-20-180,0 19-90,-1-6 90,0 1-90,0 2 0,0 1 0,-16 13 0,12-12 0,-13 18 0,17-25 90,0 8-90,0-20 0,0-1-630,0-10 360,0-22-359,22-37 449,-17-2-443,12 14 1,2 0 262,-7-14-179,13-3-91,-7 3 90,-1 5 540,0 7 0,-1 7 0,1 5 0</inkml:trace>
+  <inkml:trace contextRef="#ctx0" brushRef="#br1" timeOffset="-165779.74">15875 5114 9242,'-24'-25'1259,"-6"-2"-809,-15 8-90,-19 5-271,21 9-2919,6 14 0,0 2 2830,-4-6 0,15 17 0,2 3 1391,-3-4-1391,12 25 0,0-11 0,13 16 0,13-15-90,3-6 0,5-2-180,26 0 225,-8-8 0,2-3 430,15-5-385,-18-5 0,-1-2 0,17-5 0,-3 0 0,-2 0 90,8-21-180,-20-7 90,-14 2 0,-3-3-90,-7-18-90,-4-2-90,-7 11-89,0-1-181,-28 2-180,21 1 1,-48 3-181,33 3 900,-24 5 0,13 5 0,1 2 0</inkml:trace>
+  <inkml:trace contextRef="#ctx0" brushRef="#br1" timeOffset="-164928.74">16420 5226 8342,'-35'0'270,"1"0"-180,-13 20-90,15 1 0,-11 23 0,29-10 90,1 12-180,13-18 90,22 6 0,-17-13-180,46-4 90,-27-7 45,9-6 0,3-2 45,11-2 0,-8-10 0,1-5 0,5-5 0,-9-10 0,-2-4-868,-1-10 868,-12 13 0,-3-2 90,-1-19 0,-8-5 180,-1-4 224,-8 12 1,0-2-225,3 12 0,-3-1-60,-5-3 0,-3-5 0,1 4-75,5 7 0,-1 0-91,-6-20 1,-2 3-134,-3 4 178,10-3 121,-11 30-120,15 39-90,0 0-45,-1 20 0,2 6 135,15 17-838,-9-10 1,1 7 0,0-4 792,2-8 0,0 0-75,1 11 0,0 6 0,0-7 30,-2-15 0,0-3 45,6 23 0,2-3-894,10 2 669,-15-23 0,1-2-580,14 14 400,-8-17-720,15-1 721,-14-21-90,15-19 449,-13 6 45,-3-21 0,-1-5 45,3 4 90,-6-4 0,-2 0 359,2-7-89,-1 0-180,-5 5 1915,2-4-2095,-6 20 2201,1-8-2111,-4 23 339,1 11-429,1-5 53,1 30-143,3-3 0,0 7 90,11 18-90,-5-24-809,19 18 269,-9-26-620,11 3 710,-5-14 90,3-7 1,1-2-1,1-4 270,1 0 0,-3-24 180,8-10-90,-14-14 404,-10 15 1,-3-1 225,-5-11 0,-2-13 449,-7 4-899,0 19-180,-20-12 0,15 29 0,-29 3 90,30 27 0,-11 12-360,15 25-539,0-8-990,24 20 989,-18-25 810,23-7 0,6-2 0,-8 2 0,4-12 0,0-1 0</inkml:trace>
+  <inkml:trace contextRef="#ctx0" brushRef="#br1" timeOffset="-164726.74">18042 5092 9961,'-48'-6'1529,"8"1"-1529,16 20 0,0-11 90,22 32-90,-9-19 90,11 34-90,0-19-449,23 26-91,-17-25-270,46 7-899,-7-10 900,14-11 809,-16-9 0,1-2 0,10-3 0,-18-5 0,1 0 0</inkml:trace>
+  <inkml:trace contextRef="#ctx0" brushRef="#br1" timeOffset="-164508.74">18647 4564 10771,'-23'-27'360,"4"7"359,5 4-719,0 10 0,-3 29 0,7-1 0,8 25 0,4 6 0,-2 8-969,0 3 1,0 1 968,-1-31 0,2 0-225,7 21 1,2-1-676,-6 8 495,14-24 1,-1-1-536,-13 10 40,13-5 1,-5-5 899,-9 5 0,9-14 0,-12 5 0</inkml:trace>
+  <inkml:trace contextRef="#ctx0" brushRef="#br1" timeOffset="-164376.74">18427 5054 10141,'0'-29'270,"0"0"-180,0 5-180,23 1 90,-17 1-450,50 4-179,-27 0-181,30 3 810,-22 9 0,0 1 0,20-1 0,-18 4 0,-1 1 0</inkml:trace>
+  <inkml:trace contextRef="#ctx0" brushRef="#br1" timeOffset="-163779.74">19428 5293 10861,'-15'0'1619,"28"0"-1979,17 0-360,21 0-1020,5 0 571,-4 0-180,5 0 0,5 0 1072,4 0 0,-32-4 1,-1-2-1,2-1 1,0 1-1</inkml:trace>
+  <inkml:trace contextRef="#ctx0" brushRef="#br1" timeOffset="-163340.74">20632 4866 10861,'-40'-5'584,"0"0"1,-14-1-585,12 12 0,3 5 0,7 13-90,16 34-90,28-22-180,15 17 181,-4-32-181,25-1 180,-29-4 180,22-14 0,-12 7-90,7-9 90,-11 0 0,5-22 90,-13 16 540,-5-49-181,-3 34-269,-6-26 0,-3 20-180,0 5 0,0 1 0,0 2 0,-15 10 0,11 20 0,-10 8 90,4 21-90,8 0 0,-8 6 45,9-7 0,2 0-375,-1 23 330,0-10 0,0-1 90,0 8-90,0-15 0,0 0 90,0 1-180,0 7-450,0-17 1,0-15-2250,0 1 1710,-17-17 1079,13-20 0,-13-18 0,17-21 0</inkml:trace>
+  <inkml:trace contextRef="#ctx0" brushRef="#br1" timeOffset="-162929.74">21383 4818 10051,'-45'0'1439,"-4"0"-1529,2 0 180,8 0-90,4 0 0,13 18-90,-1 6 270,11 9-270,1 1 0,11 5-269,0-10-1,0 11 0,18-16-90,-14-1 181,33-6-91,-10 2 270,8-10 90,13-1 0,-20-8 0,19-21 90,-24 16 0,5-40 359,-14 25 91,-7-22 0,2 9 629,-9-14-989,3 14-90,-3-14 90,0 24-90,0 25-540,0 35-359,0 10-721,8-8 1,3 0-540,11 1 1978,11 12 1,-1-19-1,-6-1 1</inkml:trace>
+  <inkml:trace contextRef="#ctx0" brushRef="#br1" timeOffset="-162128.74">21892 5082 8972,'17'-39'630,"-13"5"-361,29-3-179,-29 4 0,12 3 0,2 0 90,5-20-180,-5-10 0,2-3-457,-2 29 0,-2 0 577,-5-11 0,-3-7 0,0 7-30,-1 9 0,0 2 180,0-26 0,-3 1-610,-3-7 430,1 26 0,-1 1-90,-1-7 0,0 11 288,0 6-198,-14 8-90,10 30 90,-19 50 0,20 5-880,-2-14 1,1 0 834,3-13 0,2-2-45,-1 2 0,0 0 163,0 0 1,0 2-164,-2 13 0,4-1 0,6-13 0,3 0 45,-3 20 0,2-2-823,13 2 598,-7-23 0,-3-2-90,-10 4 91,32-4-339,-20-5 338,16-6 1838,-9-5-1658,0-5 338,9-6-338,-7-3 624,16-17-624,-16 10 0,1-24 0,-1-5 0,3 4-18,-6-5 0,-2-1 18,4-8 0,-1-2 0,-7 8 0,0 0 0,7-24 135,-4 6 0,-2 0 0,-8 20 0,-1 1-90,3-9 0,-1-1 180,-5 2 0,-1 3 224,0-18-449,-1 14 0,-1 2 180,-1 2-34,-19-9-56,15 30-90,-31 2 90,17 13-90,-1 23 270,-8 21-180,14 14-1068,1-6 0,1 1 1023,4-14 0,2 0-90,1 11 0,1 4-262,2-7 1,2 3 0,-1-4 216,-1-2 0,2 1-135,9 22 0,1-2-494,-6-5-271,12-20 1,4-1-399,4 13 1388,-4-14 0,4-2 0,13-4 0,1 3 0</inkml:trace>
+  <inkml:trace contextRef="#ctx0" brushRef="#br1" timeOffset="-161779.74">22895 4849 10051,'21'-5'1260,"-16"16"-1440,36-8 180,-13 12-180,9-15 0,11 0 180,-20 0-90,16 0 0,-23 0 90,12-21 0,-20-8 180,-1-27 90,-8 10 179,-4-4-179,-18 4-360,14 13 90,-33-10 90,32 25 0,-26 3-180,19 36 90,-2-2 90,5 27-405,8-8 1,2 1-316,-1 14-2146,10-3 1,1 0 1516,-6-6 1259,16-16 0,0-3 0,-15 6 0,15-2 0</inkml:trace>
+  <inkml:trace contextRef="#ctx0" brushRef="#br1" timeOffset="-161479.74">23547 4622 9422,'-15'14'989,"3"11"-899,12 9-90,0 20 0,0-18 0,0 27 0,0-27 90,12 16-90,-9-26 540,9 6-630,-12-20 0,0-24-90,0-18-180,0-36-90,0 10-270,-2 13 1,4 2-1397,21-10 1217,-18-14 899,35 24 0,-35 5 0,12 2 0</inkml:trace>
+  <inkml:trace contextRef="#ctx0" brushRef="#br1" timeOffset="-161242.74">24055 4740 12300,'0'44'-180,"0"-7"-180,13 2-89,-10-8-361,9-1-899,-1 10 720,-9-11 89,14 4 900,-9-9 0,3-11 0,-1 2 0</inkml:trace>
+  <inkml:trace contextRef="#ctx0" brushRef="#br1" timeOffset="-161078.74">24193 4196 10501,'0'-29'-90,"0"4"90,-12 8-1979,9 5-449,8 28 2428,-1 11 0,35 19 0,-13 0 0</inkml:trace>
+  <inkml:trace contextRef="#ctx0" brushRef="#br1" timeOffset="-160712.74">24390 4709 10591,'47'0'0,"-10"0"-90,-2 0 0,-10 0 90,-1 0 0,-1 0-90,-3 0-90,-2 0 90,-3 0 90,-7-16 270,-2-2 0,-23-1 0,-5-11-270,0 15 90,-13-4-90,16 7 180,-12 12-270,14 13 90,7 13 0,10 6 0,0 8-180,0-9-450,0 1-539,22 14 719,-16-13-539,34 17 359,-13-26-631,9 3 1261,3-15 0,-11-3 0,2-3 0</inkml:trace>
+  <inkml:trace contextRef="#ctx0" brushRef="#br1" timeOffset="-160446.74">24923 4720 9602,'0'-27'1798,"-20"0"-1438,14 4-270,-14 2-180,2 0 90,13 8 0,-12 0 0,6 10 0,9 18 0,-9 7 0,28 25 0,-12-7-90,9-9 0,4-1 90,6 6 0,9 12 90,12-4-180,-17-11 135,-5-7 0,-1-1-45,2 0 180,8 10 0,-18-20-270,-1 5-360,-9-13-1618,-24 1 449,-16-5 1619,-12-1 0,-8-1 0,10 0 0</inkml:trace>
+  <inkml:trace contextRef="#ctx0" brushRef="#br1" timeOffset="-159562.74">25263 4583 8702,'-7'0'1349,"2"0"630,1 0-1799,32 0-90,-4 0 180,33 0-2045,-6 0 1865,14-15-135,-10 4 0,3-1 90,-11-3 0,1-2-75,8 0 0,5 0 0,-5 0-240,-4 0 1,0-1-391,5-1 0,4-3 1,-5 2-546,-6 0 1,-2 1 439,14-4 0,-2-1 765,-21 7 0,-2 1 0,-2 1 0,0 1 0,-2-1 0,0 1 0</inkml:trace>
+  <inkml:trace contextRef="#ctx0" brushRef="#br1" timeOffset="-158829.74">27168 3628 10321,'0'47'-450,"-14"-7"-269,11 2-181,-11-7-1348,14 19 2248,0-14 0,0 11 0,0-17 0</inkml:trace>
+  <inkml:trace contextRef="#ctx0" brushRef="#br1" timeOffset="-158654.74">27285 3304 9871,'0'-19'-180,"0"5"180,-10 3-1978,7 5 808,-7 23 1170,26-13 0,-12 37 0,12-14 0</inkml:trace>
+  <inkml:trace contextRef="#ctx0" brushRef="#br1" timeOffset="-158262.74">27937 3486 10591,'-46'0'809,"3"0"-719,9 0-90,-2 18-470,-3-13 470,1 35 0,3-20 0,3 20 0,6 12 0,12-13 0,6-4 0,7 0-270,22 4 45,-4-8 1,5-3 44,27 1 90,5-12 0,1-5 90,5-3 0,1-16 0,-1-3 154,-5 4-154,-12-25 0,-2-5-624,2 3 714,-17-2 0,-4-4 90,2-12 540,-6-7 89,-7-4-225,-7 15 1,-2-2-315,-1 14 0,0-1-135,-1-20 0,0 2-135,0 0-45,-7 19 0,-2 4 135,6 7-180,-13 22-809,16 41 179,0 13 212,0-17 0,0 3-1022,0 12 1,0 1-355,0-10 1,0 1 1883,0 14 0,0 1 0,0-16 0,0-2 0,0 0 0,0 1 0</inkml:trace>
+  <inkml:trace contextRef="#ctx0" brushRef="#br1" timeOffset="-157663.74">25583 4540 9332,'-8'0'629,"1"0"1710,1 0-2069,25 0 0,-15 18-180,44-14 0,-22 30-1444,29-20 1354,-2 14 0,-5-9 0,3-1 0,-9-5 0,2 1-150,10 2 0,6 1 0,-3-2-120,-1-1 0,3 0-180,-12-3 0,7 1 1,2 0-1,-1-1 0,-6-1 120,0 0 0,-6-1 1,6 0-289,0 1 1,7 0 0,1 1 0,-2 0-1,-8-2 424,15 2 1,-4 0 0,-10-2-1,3 0 1,-5-1 0,0 1 0,1 0-1</inkml:trace>
+  <inkml:trace contextRef="#ctx0" brushRef="#br1" timeOffset="-156708.74">28040 4768 10771,'0'-11'629,"0"2"-629,0 26 0,-15 0 90,11 26-90,-10-5-377,2 9 287,9 4 90,-18 5 90,19-2-1057,-14-1 967,10-3 0,-7 13 90,5-20 0,-3 16-90,5-34-180,-1 0-180,4-16 408,1-5-138,0-2 937,1-21-1207,0-13 540,1-11-180,0-11 0,9 17 0,1 0 0,-6-24 30,12 17 0,6-5 0,-6 5-74,-12 9 1,1 1 103,13-6 0,8-3 0,-5 6 299,-5-7-269,8 15 0,2 5 180,-6 4-180,13 3 0,-17 13 90,14 17-180,-17 8 0,7 15 0,-15-4 177,-1 9-537,-3-17-1439,-1 15 720,-17-20-900,13 4 1979,-26-11 0,26-5 0,-10-2 0</inkml:trace>
+  <inkml:trace contextRef="#ctx0" brushRef="#br1" timeOffset="-156440.74">28422 4628 9871,'20'0'1170,"-2"17"-1080,-7-12 90,-3 31-180,-4-19 0,0 18 89,1 10-89,-2-10-89,0 11 178,-3-16-89,0-2 0,0-3 0,0 3 0,0-10-899,0 2 719,0-58-90,0 16-315,-1-19 1,2-3-136,18 1 720,-11-3 0,4 0 0,29 1 0,-22 12 0,1-1 0</inkml:trace>
+  <inkml:trace contextRef="#ctx0" brushRef="#br1" timeOffset="-156110.74">29173 4747 9781,'-23'-18'900,"-18"14"-810,36-23 0,-43 24-90,27-17 90,-22 17-180,12-8 90,1 11 0,2 0 0,3 0 0,4 18-90,2-14-180,10 35 0,2-12 90,31 20-90,-18-12 270,46-13-90,-28-5 180,25-15-90,-10 8 0,15-10 90,-15 0-90,18-16-90,-39-7 0,11 2-89,-27-20-91,6 24-90,-8-21-360,-17 4 91,12 10 629,-27-4 0,28 12 0,-11 0 0</inkml:trace>
+  <inkml:trace contextRef="#ctx0" brushRef="#br1" timeOffset="-155508.74">29518 4709 9152,'-41'0'629,"2"17"-629,22 1 0,-9 3 90,23 11-90,-9-11 0,12 7 0,0-3 0,24-11-90,2 2 0,30-9 1,-16 1 89,3-8 0,-14 0 0,-2-22 0,0 16 0,-4-38 0,-1 25 0,-5-21 89,3-16-89,-10 8-564,-3 1 0,-1 0 1104,-4-15-315,0 20 0,-1 1-1,-1-16-44,0 2-180,0 5 0,0 8-90,0 7 90,0 10 90,0 8-90,0 36 90,0 0-90,0 34 0,0-8 1407,0 7-1497,0 7 135,-2-16 0,4 1-90,5-12 0,2 1-360,-2 19 1,2-3 44,10 1-135,3-8 1,0-4 314,-7-7 83,35 11 7,-31-35 0,10-1 90,-13-27 90,2 16 0,-8-39 180,-2 24 359,-1-24 451,-1-4-721,-2 10-269,-1-17-90,-3 30 0,0-5 0,0 37-90,0 27-269,0 7-181,8-5 0,1-1-179,-4 3-46,9-7 1,3-2-46,3 1 0,7 6-89,2-19 899,-6-7 0,2-5 0,1-5 0</inkml:trace>
+  <inkml:trace contextRef="#ctx0" brushRef="#br1" timeOffset="-155340.74">30380 4659 10501,'0'-22'899,"0"3"-899,-19-1 0,-1 12-269,-3 14-91,8 20-90,7 10-90,6 3 1,-6-6-721,8 13 631,21-10 629,6 21 0,24-32 0,2 7 0</inkml:trace>
+  <inkml:trace contextRef="#ctx0" brushRef="#br1" timeOffset="-155145.74">30638 4740 9602,'0'-29'1529,"0"-6"-1619,0 10 0,-19-2 180,14 12-90,-25 8 0,27 41-90,-8-11-270,18 12 0,5 2 0,-7-4-360,25-1 1,5-2 179,-9-2 152,5-11 0,2-3-242,-1-1 0,1-11 630,0 4 0,0-6 0,0 0 0</inkml:trace>
+  <inkml:trace contextRef="#ctx0" brushRef="#br1" timeOffset="-154910.74">31125 4386 9242,'1'-53'1619,"0"3"-990,-1 5-269,0 5-180,0 5-180,0 7-90,0 7 90,0 7 90,0 6-180,0 30 180,0-3-45,0 24 0,0 5-135,0 4-237,0-6 0,0 0 327,0 7-270,0 0-180,0-19 0,0 0 0,0 16-180,0-13 1,0-2 269,0 0-179,0 5-721,0-18 811,0-9 449,0 0 0,-22-11 0,-5-1 0</inkml:trace>
+  <inkml:trace contextRef="#ctx0" brushRef="#br1" timeOffset="-154779.74">30947 4629 9512,'-19'-23'1259,"-5"1"-1169,21 1 0,-11 0-180,13 4-90,18 6-180,13 5-270,14 6-313,2 0-46,-7 17-90,2-13 1079,-1 29 0,-1-29 0,-1 12 0</inkml:trace>
+  <inkml:trace contextRef="#ctx0" brushRef="#br1" timeOffset="-154560.74">31582 4596 10681,'-17'-15'0,"12"-4"0,-12 13 0,8-2 90,7 26-180,-7 12 180,9 15-360,0 0-270,0-7-989,0 17 540,0-15 989,20 20 0,-16-31 0,16 5 0</inkml:trace>
+  <inkml:trace contextRef="#ctx0" brushRef="#br1" timeOffset="-154362.74">31712 4172 10321,'0'-10'-2249,"0"2"900,0 19 1349,0 5 0,0 1 0,0-2 0</inkml:trace>
+  <inkml:trace contextRef="#ctx0" brushRef="#br1" timeOffset="-153946.74">32137 4483 9781,'-22'-18'630,"0"5"-540,-24 30-90,8 11 0,15 9-802,-3 4 802,23-12 80,-7 2-170,10-3 90,0 10 0,16-12-270,4 8 270,0-18-90,29-3 90,-24-9 90,13-22 415,-7 13-415,-14-54-180,7 31 135,-13-3 0,-2-4 0,-1-1 0,0 0-33,3-25 482,0 3 1,0-1-632,-3 22 1,-1 0 450,4-11 1,1-1 90,1 4 0,0 3-405,6-19 0,-3 20 0,-1 4 270,-1 5-90,5 5-180,-12 20-90,0 26 0,-1 18-270,-4 13-225,1-5 1,0 1-1483,-2 20 1302,0-20 1,-1 1-1440,2 5 1,-4-2 2203,-7-11 0,-1-1 0,8 12 0,-1-1 0,-6-17 0,-1 0 0</inkml:trace>
+  <inkml:trace contextRef="#ctx0" brushRef="#br1" timeOffset="-153276.74">25970 4607 7623,'-6'0'0,"0"0"-90,3 0 90,0 0 0,0 0 0,2 0 0,0 0 0</inkml:trace>
+  <inkml:trace contextRef="#ctx0" brushRef="#br1" timeOffset="-152690.74">25722 4607 8522,'15'30'1349,"-11"1"-1079,26-4-180,-26 1 0,27-2 90,-17 4-90,16 4 90,-4 3-135,-3-6 0,3 0-1172,17 19 1127,-11-15 0,2 0 135,-6-9 0,1-1-135,3 1 0,1 0 45,1 1 0,4 0-15,-1-2 0,4 2 0,-2-1-30,7 3 0,2 1-653,7 3 0,5 2 1,-4-2 652,-5-3 0,0-1 22,-8-6 1,4 2-1,0 0 1,-5-2-23,10 6 0,-1-1 0,-7-4 0,2 0 0,0 0-741,0 0 1,1 1 0,-2-2 740,8 4 0,1 0 0,-10-5 0,4 2 0,0 0 0,-4-3-347,9 6 0,0-1-163,3 1 1,6 2-1,-7-2 150,-8-4 1,-2 0-361,0-1 0,4 2 1,-6-3 719,-8-4 0,-4-1 0,7 4 0,-2-2 0,5 3 0</inkml:trace>
+  <inkml:trace contextRef="#ctx0" brushRef="#br1" timeOffset="-150563.74">28760 6178 9332,'0'-9'1979,"0"3"-1530,0 0-179,0 3-180,0 0-90,0 1 0,0 18 0,-26 28 0,20 2-360,-12-6 0,-1 0-809,9 4-405,4-3 0,0 0 1574,-1-3 0,7 14 0,0-30 0</inkml:trace>
+  <inkml:trace contextRef="#ctx0" brushRef="#br1" timeOffset="-150396.74">28752 6048 8522,'-12'-13'90,"9"1"-180,-9 1 90,6 6 0,26 19 0,1 9 0</inkml:trace>
+  <inkml:trace contextRef="#ctx0" brushRef="#br1" timeOffset="-149862.74">29153 6313 8972,'0'11'989,"0"1"-359,0 8-540,0-2 0,0 16-90,0-9 0,0 7 0,0 5 0,0-10 0,0 22-180,0-22-540,0 13 451,0-21-1710,0 5 2069,0-37-180,0-8 180,20-19 179,-4-18-89,6 21-90,3-10 360,-11 9 90,2 14-1,1-4-269,-8 21 90,6 1-360,-6 21 90,1-11-90,-5 31 0,-1-30 0,2 39-90,-3-12 180,-1 11-720,1 9 91,0-25 179,2 4 90,-1-15 90,1-9-270,-1 3 181,1-9 179,3 2 0,-1-3 90,10-17 90,-4-7 89,14-24 1,-7 8 0,5-1-90,-7 13 0,-3 3 180,-1 4 270,-1 3-180,-4 9-360,5 2 0,-7 7 89,10 22-178,-8 7-271,8 13-1259,2 16 719,-3-22 900,8 11 0,-5-17 0,3-2 0</inkml:trace>
+  <inkml:trace contextRef="#ctx0" brushRef="#br1" timeOffset="-149428.74">30233 6395 9602,'-21'-22'809,"1"-1"-719,-5 9 90,-2 3-180,10 8 90,-14 21-90,4 5 0,6 21 0,10-9 0,6 10-180,5-20 180,18 4 0,-13-8 0,32-11 0,-18-1 90,15-9-180,-18-18 180,3 13 360,-11-44-91,0 30-89,-2-26-90,-6 20-180,0 3-180,0 4 270,0-1-90,0 27 0,0 15 0,16 19 0,-15-5 0,2 1 0,26 14-1696,-21-6 0,-2 1 1786,10 8-90,-5-11 0,-3-1 90,-5 1 0,6 17-180,-9-35 0,0 2-2248,0-15 359,-20-7 1979,1-22 0,-4 10 0,9-15 0</inkml:trace>
+  <inkml:trace contextRef="#ctx0" brushRef="#br1" timeOffset="-149263.74">30635 6608 9242,'15'14'899,"-1"-10"-809,4 11-90,-1-15-90,5 0 180,-1 0-180,3 0-1709,17 0 630,-7 0 1169,12 0 0,-13 0 0,-1 0 0</inkml:trace>
+  <inkml:trace contextRef="#ctx0" brushRef="#br1" timeOffset="-148829.74">31182 6417 9961,'0'39'0,"0"-6"90,12-2-180,-9-4 180,22 11-90,-22-9 0,18 9 90,-14-15-180,9-2 90,-3-5-180,10-3 180,-5-6 0,15-3 90,-15-24 90,14-8 90,-16-11 180,4-2 0,-10 9 89,-1 1-179,-3-3 360,0-8-630,-2 11-90,1-10 179,-3 24-268,-1 18 89,14 34-360,-11 4-135,11-5 0,1 0-134,-11 2-361,26 10-1348,-11-9 1258,8-12 1080,0 3 0,-8-20 0,-2-3 0</inkml:trace>
+  <inkml:trace contextRef="#ctx0" brushRef="#br1" timeOffset="-148545.74">31860 6416 9871,'0'-14'720,"0"1"539,0 4-1169,0 34-180,11-20 90,-5 30 0,-1 7 0,8-21 0,-4 12 0,-3 0 90,-4-10 900,10 5-721,-10-15-269,7-4-89,-6-5 178,6-27-178,-2 17 178,5-40-268,6 6-271,-3-9-270,0 13 1,1 2-589,3-7-41,5-7 179,-5 19-359,-1 5 1529,1 6 0,-1 8 0,-2 4 0</inkml:trace>
+  <inkml:trace contextRef="#ctx0" brushRef="#br1" timeOffset="-148212.74">32375 6731 11850,'17'-41'720,"-13"7"-540,33-1-90,-33 6-90,33 0 90,-32-2-90,30-2 90,-23-1 0,15-3-1,-3-20-89,-7 12 135,-3 3 0,-2 0-1533,1-7 1488,-6 16 0,-1-1 270,-2-27-270,-1 18 268,-3-15-538,0 34 180,0-2 0,-14 20 90,11 19-90,-11 20-720,6 22 1,3 5 404,3-22 0,1 0-74,-6 24 1,1-3-1231,6-3 1619,-1-18 0,2-1 0,19 19 0,-7-20 0,-1-1 0</inkml:trace>
+  <inkml:trace contextRef="#ctx0" brushRef="#br1" timeOffset="-148076.74">33030 6677 13739,'5'0'-809,"-1"0"809,0 0 0,-3 0 0,2 0 0</inkml:trace>
+  <inkml:trace contextRef="#ctx0" brushRef="#br1" timeOffset="-146408.74">23968 657 11490,'-27'25'90,"0"-1"0,-20 17-45,21-18 0,-1 0-616,-18 17 526,8-8 0,1 1-158,8-8 1,-1 1-428,-19 18 1,1 1-318,21-20 1,2-1 271,-8 8 1,2-1-855,-4 8 1529,6-3 0,4-5 0,5-2 0</inkml:trace>
+  <inkml:trace contextRef="#ctx0" brushRef="#br1" timeOffset="-145694.74">24530 498 10411,'0'-4'1259,"0"1"-899,2 0-270,0 2 0,2-1-180,-3 16 90,0 5 0,-1 9-270,0 3-269,0-4-1620,0 19 630,0-11 1529,0 23 0,0-26 0,0 7 0</inkml:trace>
+  <inkml:trace contextRef="#ctx0" brushRef="#br1" timeOffset="-145529.74">24677 313 8252,'0'-9'0,"1"0"-180,1 4-629,7-1 179,-2 4 630,8 0 0,-1 2 0,3 0 0</inkml:trace>
+  <inkml:trace contextRef="#ctx0" brushRef="#br1" timeOffset="-145158.74">25265 490 9242,'-55'1'1169,"10"0"-1169,1 3 0,10 0 0,-9 9 0,10-1 0,-2 15 90,15-8-90,10 19 0,2-13-90,8 8 180,27 0-270,10-12 90,-1-6 0,4-2 0,22-4 90,-15-3 0,-2-5-759,9-20 759,-17 18 0,-1-3 0,-3-23 0,-3-3 90,14 5 225,-13-11 0,-4-2 404,-3-3 1,1-11 89,-16 4-629,-5 14-503,-2-11 233,-2 26 90,0 0 0,0 13-179,0 25-271,0 9-180,0 17-359,0 4 283,0-6 706,-1-7 0,2 0 0,16 21 0,-7-19 0,0 1 0</inkml:trace>
+  <inkml:trace contextRef="#ctx0" brushRef="#br1" timeOffset="-144793.74">23938 1589 9332,'20'2'1799,"8"1"-1260,-25-1-89,25 1-180,-15-2 90,31 0-360,-12-1 0,17 0-45,-16 0 0,1 0-585,27 0-405,-2 0 1,3 0-57,-22 0 0,2 0 1091,9 0 0,4 0 0,-3 0 0,-2 0 0,-1 0 0,-4 0 0,0 0 0,0 0 0</inkml:trace>
+  <inkml:trace contextRef="#ctx0" brushRef="#br1" timeOffset="-144263.74">25762 1591 10141,'-11'-20'1619,"1"2"-1349,2 2 90,2 3-360,1 0-90,3 6 180,-1 0-90,0 6 0,1 22 90,-1 8-180,2 13 180,0 2-180,1 7 0,0-12-90,0 10-180,0-12 180,0-13-89,0 3-181,0-16 360,12-5-90,-9-23 180,20 12 0,-20-39 0,21 23 90,0-41-90,5 17-232,-5 7 1,0 0 501,5-8-180,-3 12 0,0 2 0,4-1 90,7-1-484,-6 19 304,-8 8 0,10 3 0,-17 27 0,8 9-360,-11 12-899,6 20 359,-8-25 91,5 13-990,8-8 1799,-1-14 0,10 3 0,-5-16 0</inkml:trace>
+  <inkml:trace contextRef="#ctx0" brushRef="#br1" timeOffset="-143913.74">26625 1545 10141,'0'-24'1349,"0"2"-1259,0 1-90,-17 3 0,13 2 90,-30 5-90,12 5 0,-19 3 0,17 21 0,-13 9 0,24 9-90,-6 20-179,10-23-408,9 13 317,0-17 180,22-2-180,-16-5 90,35-3 270,-14-6 0,19-6 0,-10-4 0,-3-24 270,-13 16 0,-2-38 630,-3 12-451,-2-10 228,-3 0-137,-1 4-540,-4 12-180,-2-4 270,0 14-270,-2 7-90,2 19-90,1-7-89,0 33-271,2-32-269,0 39-1,1-25-1349,9 31 2339,-4-22 0,7 4 0,-6-13 0</inkml:trace>
+  <inkml:trace contextRef="#ctx0" brushRef="#br1" timeOffset="-143211.74">27017 1492 10321,'0'-17'900,"0"25"-900,0 11 90,0 17-180,0-3 180,0 3-180,0-8 0,10 12-180,-7-21-450,7 3 630,-3-15 180,5-43-90,1 12 0,-2-12 0,1-1 90,1 1 90,8-11 180,-5 14-270,1 2-90,-2 5 899,5-4-899,-9 17 0,8-5 0,-10 17 90,8 12-180,-8 13 90,5 8 0,-6 6 0,-2-7-449,0 1-1,-3 1-90,1-2 0,-1-1-359,3 4 629,0-11-719,3 2 989,-2-18 0,8-19 180,-7 8 449,12-30-359,-11 10 450,9-18-451,-9 8-89,2 12 180,-5 2 90,0 17-450,-3-15 90,5 16-90,-2-4 90,10 6-180,-2 14 90,5-10 0,-1 23 0,3-24 0,0 23-180,4-23-180,2 22 90,2-22 180,16 16 90,-10-18 0,26 7 0,-24-8 90,18-18-90,-27-3 180,4 0 0,-17-18 90,-2 21 0,-6-19 269,-3-1-269,-2 9 90,-2-16-270,-22 24 90,3-7 90,-18 20-270,8 0 0,13 26 0,-4 9 90,17 12-270,-5 20-360,8-19-1214,20 3 0,6-1-225,1 0 1836,6-8 0,3-4 0,2-4 0,4-3 0</inkml:trace>
+  <inkml:trace contextRef="#ctx0" brushRef="#br1" timeOffset="-141412.74">27538 8048 10051,'-2'-4'1799,"1"1"-1619,-1 0 0,2 1-180,22-2 90,-17 1-90,43-1 0,-23-1-450,23 2 0,5 0-629,12-1-1251,-22 2 0,5 1 1,-4 0 2329,-6 0 0,-2 2 0,12-1 0,0 0 0,-14 0 0,0 0 0</inkml:trace>
+  <inkml:trace contextRef="#ctx0" brushRef="#br1" timeOffset="-140940.74">28792 7811 10861,'-3'-4'1349,"1"1"-1169,-1 1 180,1 0-360,1 15 0,0 10-990,1 27-89,0-3 1079,0-2 0,0 0 0,0 4 0,0-12 0,0 1 0</inkml:trace>
+  <inkml:trace contextRef="#ctx0" brushRef="#br1" timeOffset="-140774.74">28905 7634 9062,'2'-17'-90,"0"1"-90,0 8-360,3 2-179,2 5-361,4 0 1080,1 1 0,6 15 0,1 3 0</inkml:trace>
+  <inkml:trace contextRef="#ctx0" brushRef="#br1" timeOffset="-140380.74">29677 7867 9961,'-54'0'1799,"10"0"-1619,-3 0-90,-7 0-180,11 0 90,-9 17 0,20-13 0,6 32 0,6-20 0,8 29 0,6-16-180,6 21 180,23-22-360,11 12 271,15-23-1289,3-2 1198,-9-11 270,2-4 146,1-16-146,-14 3 0,0-4-180,13-22 135,-10 6 0,-2-2 40,-1-12 319,-11 4 1,-2-1-465,-4-10 330,-7 20 0,-1 0 425,-5-23-695,0 20-90,-2-8 90,0 29 90,0 29-539,0 26-91,0 19 45,0-9 0,0 1-120,0-15 1,0 0-646,0 29 1,0 1 405,0-26 0,0 0 854,0 12 0,0-2 0,0-14 0,0-3 0,0 34 0</inkml:trace>
+  <inkml:trace contextRef="#ctx0" brushRef="#br1" timeOffset="-139958.74">27710 8224 9332,'-1'-6'2428,"0"2"-1708,21 2-360,7 1-90,12 1-91,3 18-89,-6-14-1198,3 33 1108,5-19 0,-10 8 0,1 4 45,-7-11 0,1 1-135,5 6 0,4 3 0,-3-2-225,-1-1 0,0 0-958,14 11 1,-1 0 912,-12-10 0,-1 0-180,1 0 1,1 1-181,-1 0 1,1 0-91,-1 0 1,1 0 809,-2 0 0,0-1 0,-1 0 0,-1 0 0,-1-1 0,0 0 0</inkml:trace>
+  <inkml:trace contextRef="#ctx0" brushRef="#br1" timeOffset="-139445.74">29525 9036 11940,'-13'-12'0,"10"0"-90,-21 5 180,21-3 0,-18 7-90,14 18 0,-7 14 0,6 11 0,2 3 0,2-8 0,2 2 0,0-2-360,2 9 180,0-15-89,0 4 89,17-16 180,2-23 0,18-13 0,-10-15 90,-7 4 0,0-1 179,5-12-89,-1 5 0,0 0-90,4-8-45,-6 14 0,0 2 225,0-1-180,2 1 0,-6 20 0,-7 6-90,7 19 0,-7-11-540,10 46 90,-6-26-495,-2 11 1,0 2-45,4 1 0,5 14-900,10-9 1889,-7-13 0,12 2 0,-9-16 0</inkml:trace>
+  <inkml:trace contextRef="#ctx0" brushRef="#br1" timeOffset="-139096.74">30255 9145 10591,'0'-22'1709,"0"-1"-899,-18-4-810,14 7-90,-14-1 180,4 13-180,10 0 0,-25 7 90,14 17-90,-12 8 0,14 12-540,1 12 270,11-18-449,16 28 539,-10-32 90,27 11 90,-13-28 180,12-2 90,-2-26 0,-5-5 180,-10-12 629,-3-10-629,-10 17 0,3-15-450,-4 18 180,1 6-90,1 9 0,1 11-90,-1 0-270,2 0-180,2 21 90,1-16-1349,7 47 720,-2-32-1709,11 36 2788,-8-28 0,6 4 0,-6-12 0</inkml:trace>
+  <inkml:trace contextRef="#ctx0" brushRef="#br1" timeOffset="-138724.74">30585 9085 11131,'0'-17'629,"0"24"-629,0 14 0,0 14 0,0 1 0,0-8 0,0-1-270,0 10-269,0-14-91,0 8 630,0-42 0,15 16 0,3-59 0,0 31 180,13-29 0,-27 20-90,30 2 90,-22 2 629,20-3-809,-17 12 90,7 2-90,-12 12 90,7 25-90,-9-15-225,0 27 0,-2 6-494,0-9 179,-1 13 0,-1 0-179,-1-6-630,1 18 989,1-30-180,0 6 540,4-21 0,-1-3 0,1-6 0</inkml:trace>
+  <inkml:trace contextRef="#ctx0" brushRef="#br1" timeOffset="-138408.74">30963 9265 9691,'7'-21'630,"1"-10"-540,-2 20 180,1-4-270,-2 8 0,4 7 0,2 0 0,2 0 0,2 19 0,1-15 0,4 26 90,14-17-180,-5 0 180,24 6-90,-17-17 0,27 7 90,-24-9-90,8-14 90,-5-5-90,-13 1 449,7-29-179,-20 27 270,-2-41-450,-10 31 360,-3-19-360,-1 23-90,-20-5 90,-5 20-180,-12 2 90,15 32 90,3 10-810,15 7 0,6 3-179,11 17 146,-13-21 0,6-3 753,28-5 0,6-5 0,-2 13 0,4-14 0,0 0 0</inkml:trace>
+  <inkml:trace contextRef="#ctx0" brushRef="#br1" timeOffset="-137746.74">28765 10781 11760,'-20'0'1080,"1"0"-900,4 0-1,2 0 1081,6 0-1350,28 0 180,1 0-270,30 0-450,-10 0 1,2 0-16,-6 0 1,3 0-346,9 0 1,7 0 0,-3 0-697,0 0 0,0 0 1686,-6 0 0,2 0 0,-3 0 0,5 0 0,-2 0 0,1 0 0,-1 0 0</inkml:trace>
+  <inkml:trace contextRef="#ctx0" brushRef="#br1" timeOffset="-136930.74">30383 10730 7623,'6'-7'989,"-5"-1"-539,4 2 269,-5-3-359,0 3 180,0-4-180,0 5-180,0-1-1,0 1 1,0 3 0,0-2-180,0 2 90,0 0 720,0 0-810,0 13 0,0 4 0,0 10 0,0 2-90,0-3-270,0 3-989,0 15 269,0-8-1708,0 18 2788,0-25 0,0 6 0,0-14 0</inkml:trace>
+  <inkml:trace contextRef="#ctx0" brushRef="#br1" timeOffset="-136762.74">30350 10483 11041,'-8'-28'-450,"6"3"-180,-6 4-179,1 1 809,5 9 0,19 2 0,11 8 0</inkml:trace>
+  <inkml:trace contextRef="#ctx0" brushRef="#br1" timeOffset="-136363.74">31105 10754 11580,'-50'-15'90,"10"-5"-90,-1 18 0,13-6 0,0 8 90,-3 0-90,16 21-90,-7-16-180,20 36-89,-4-15-1,28 19 90,13-10 45,-2-17 0,2-4 135,26-3 45,-5-3 0,-1-6 135,5-20-90,-2 6 0,-3-4-68,-6-23 293,-12 7 0,-2-2 494,0-12 45,-11 2 1,-3-2 45,-3-11-1219,-8 19 0,-2 1 679,-3-10-90,-2 6-180,-3 7-180,0 2 180,0 14 0,0 22-719,-14 29 89,10 12 0,-10 14-270,8-20 1,2 0-417,1 24 11,-2-8 1,0 1 1427,5 7 0,0-22 1,0-2-1,0 14 1</inkml:trace>
+  <inkml:trace contextRef="#ctx0" brushRef="#br1" timeOffset="-135922.74">28815 10862 9961,'-6'0'1709,"3"14"-629,0 3-631,3 22-179,25-7-270,-19 8 90,14-14 0,4 1-180,7 16-497,-3-1 0,3 1 632,-5-16 0,0 0-90,3 9 0,-1 3-180,5 4 0,-1 0 0,-6-10 0,1 2-165,2 4 0,3 4 1,-3-4-106,-2-2 0,0-1-495,2 3 1,2 4 0,-3-4 989,-2-5 0,-1-1 0,6 9 0,0-1 0,-10-14 0,0-1 0</inkml:trace>
+  <inkml:trace contextRef="#ctx0" brushRef="#br1" timeOffset="-135464.74">30453 11867 12660,'6'-7'-90,"-1"-1"-90,-2 5 360,-2-1-180,-1 26 0,0 25-90,0 3 0,0 16-180,0-11 180,0-13-450,0 17 271,0-32-181,0 4-719,14-22 1169,4-21 0,14-18 89,-6-12 136,-6 8 0,-1 0 135,5-9-45,-3 5 0,1 2-135,0-2 359,14-10-449,-21 33-90,7 0 0,-15 31 0,6 13-180,-6 8-270,-1-4 1,-1 1-361,2 11 91,-1 16-1080,5 0 719,-2-17 903,7 10 1,0-23-1,4-2 1</inkml:trace>
+  <inkml:trace contextRef="#ctx0" brushRef="#br1" timeOffset="-135096.74">31322 12089 12210,'1'-28'810,"-1"3"-541,0 2-89,0 5-180,-20 2 0,14 3-90,-28 7 90,13 1 0,-14 20 0,-1 8 0,16 9-90,-5 3-359,22 6 269,-8-8-360,11 17 270,0-23 180,20 7-90,-1-23 180,18 0 180,-5-30-90,-3-7 630,-5-25-270,-11 9-1,1-11-359,-9 26-90,3 3 0,-5 4 0,-2 41-360,-1-13-269,0 34-451,0 11 361,0-11-272,0 16-268,0-21 180,18-2 179,-13-3 900,13-6 0,-1-4 0,3-3 0</inkml:trace>
+  <inkml:trace contextRef="#ctx0" brushRef="#br1" timeOffset="-134272.74">31648 12070 12210,'6'-19'-180,"-2"3"180,-3 7 0,0 0 180,1 7-180,0-2 0,1 4 0,0 17 0,-1 6 0,2 25 0,-2-10 0,0 4-90,-2-15-90,0-2 0,0-3-90,0-4-539,0 0 809,0-26 0,16-12 0,-13-16 0,29-7 180,-28 6 134,19 9 1,3 0 45,-4-14-270,6 10 0,1 1 0,-1 2 270,3-3-90,-11 22-270,-8 5 90,4 25 0,-11-16-90,4 41 0,-7-22 0,0 16 0,-2 4-270,0 4-45,0-4 0,0-1 135,0-7-629,-12 15 809,25-57 0,-7-3 179,12-16 1,3-6 90,9-12 45,-9 14 0,1 2 45,2-2-90,18-5-180,-21 15-180,7 11 90,-6 0-90,-6 9-360,12 20 270,-13 5-180,5 11-179,-8 0-91,-1-9-180,-2 2-719,1 9 810,-4-9-1,2 10 630,-5-21 90,1-2 630,0-6-91,0-9 811,11 4-631,-4-20 1,16 11-630,-10-27 0,7 27 0,0-25 0,-6 26-90,16-19 0,-14 12 90,10 0 0,5-9-270,-7 11 180,23-15 0,-19 10 0,7-4 0,-13 5-90,-4-2 90,-3 0 0,1-10 0,-10 6 539,0-17-179,-9 12 540,-21-31-810,16 27 0,-32-21 0,32 32-180,-25 0 180,12 12-90,-12 24 0,6-15 0,9 42-180,1-8-180,12 13-1123,-6 6 853,7-17-359,28 0-91,-21-2 45,30-14 1,6-1 1034,-6 11 0,4-14 0,3-2 0,14 4 0</inkml:trace>
   <inkml:trace contextRef="#ctx0" brushRef="#br0" timeOffset="-116546.73">16723 1868 24359,'0'-18'-6026,"0"2"3808,0 5 1063,0 4 607,0 2 212,0 3 392,0 0-194,0 0-1459,0-1 1777,0 1-180,0 0 0,0-2 90,-16-1 979,12-2-1404,-12 3 1404,16-5-1159,-11 4 903,9-5-1312,-15 4 1427,11-4-1326,-2 4-484,-8-8 1436,10 7-1725,-14-7 1628,10 7-811,-10-7 1243,6 5-1343,-5-5 1193,3 5-336,0-2-200,-4-1 573,-7-5-679,3 3 19,-15-11 62,14 9-124,-17-13-5,16 11-335,-7-9 241,9 9-305,0-1 125,0-2 1,-13-8-74,6 5 204,4 5 0,0-1 99,-8-3 37,4 4 1,-1 0 304,-8-3-148,-13-7 189,14 11 90,-2 0-38,0 1-173,9 6 1,-1 0 313,-17-6-323,3 3 0,-1 1 258,-14-4-263,5 4 0,-2 1-21,22 4 1,0 0 19,-14 0 0,-2-1 54,-6 2 1,1 0-49,11 3 0,-1 0-103,-6-1 1,-5 1 0,5 1 47,3 0 0,0 2-47,-6-1 0,-4 0 1,5 0 102,4 1 1,0 0-130,-5 0 0,-5 1 0,5-1 38,3 1 1,2 0-109,8 0 0,-2 0 0,-1 0 8,-1 0 1,0 0 0,2 0 7,-7 0 0,-1 0-41,-5 0 0,-5 0 1,6 0-51,6-1 0,1 2 59,-4 1 0,-4 2 1,5 0 8,5-3 1,2 0 7,-13 3 1,-2 2 72,3-1 0,2 0-80,14-4 1,-1 0 0,-2 4 1,-4 1 0,5 0 15,6-2 0,0 1 50,-21 2 0,1 1-10,25-1 0,2-1 24,-8 1 0,2-1 70,-15 3 45,1 2-37,-1 0-100,12-3 1,0 1 70,-23 6-81,8-2 1,-1 0-28,23-4 1,1-1-10,-11 3 1,0 0 28,-17 5 138,-1-1-163,-1 1 23,1 0-110,0-1 39,3 1 26,18-7 0,0 0-109,-19 5-12,11-3 1,0 0-173,-8 1 301,21-4 0,-1 0-209,-17 5 39,-2 1-62,-1 1 40,2-1 13,1-1-28,3 1-107,-12 4-56,19-4-505,-16 8 313,31-11-281,-2 2 777,15-4 0,4-1 0,2 0 0</inkml:trace>
   <inkml:trace contextRef="#ctx0" brushRef="#br0" timeOffset="-116090.73">11457 752 22200,'-14'-3'-800,"10"0"-2136,-10 2 3775,3-1-371,-1 1-74,-12 0 33,2 1-58,-1 18-67,-4-13 455,-4 35 271,-9-20-185,-6 22-686,7-14 1,-4 0 156,11-5 0,-3 2-234,-5 3 1,-4 3-1,3-3 104,2 0 0,1-1-152,-12 8 1,-2 1-61,2-1 0,2 0 302,13-9 1,-1 0-389,-1 2 1,-3 2 0,5-3 125,6-3 1,2-1-174,-14 13 1,2 0-99,4 1-3,13-5 0,4 1-622,6-4-425,26 21-1261,-8-30 1360,30-4 1,8-3 215,-5 2 103,18-3 1,4-2 843,-26-4 0,-1 0 0,13 2 0,0-2 0,-12-1 0,0 0 1</inkml:trace>
   <inkml:trace contextRef="#ctx0" brushRef="#br0" timeOffset="-115346.73">16427 1027 22740,'12'-18'-732,"1"1"379,1-5-150,0-3 183,1-4 19,1-4 127,10-18 229,-6 9-219,-1 7 0,0 0 160,2-7 40,7-12 214,-11 20-117,-2 3 145,-3 2-36,0-3-456,-5 11-120,0-3 28,-5 17-199,-1 23-445,-1 18-32,0 17 213,0 6-285,0-18 1,0 2-920,0 24 202,0-7 0,0 0 1677,0-22 0,0-2 0,0 10 0,0-1 1,0 16-1</inkml:trace>
@@ -2407,7 +2817,7 @@
           <a:p>
             <a:fld id="{7C3644F0-B0FA-B24F-93B4-DEF87B7BA9CC}" type="datetimeFigureOut">
               <a:rPr lang="en-VN" smtClean="0"/>
-              <a:t>22/07/2021</a:t>
+              <a:t>01/08/2021</a:t>
             </a:fld>
             <a:endParaRPr lang="en-VN"/>
           </a:p>
@@ -2607,7 +3017,7 @@
           <a:p>
             <a:fld id="{7C3644F0-B0FA-B24F-93B4-DEF87B7BA9CC}" type="datetimeFigureOut">
               <a:rPr lang="en-VN" smtClean="0"/>
-              <a:t>22/07/2021</a:t>
+              <a:t>01/08/2021</a:t>
             </a:fld>
             <a:endParaRPr lang="en-VN"/>
           </a:p>
@@ -2817,7 +3227,7 @@
           <a:p>
             <a:fld id="{7C3644F0-B0FA-B24F-93B4-DEF87B7BA9CC}" type="datetimeFigureOut">
               <a:rPr lang="en-VN" smtClean="0"/>
-              <a:t>22/07/2021</a:t>
+              <a:t>01/08/2021</a:t>
             </a:fld>
             <a:endParaRPr lang="en-VN"/>
           </a:p>
@@ -3017,7 +3427,7 @@
           <a:p>
             <a:fld id="{7C3644F0-B0FA-B24F-93B4-DEF87B7BA9CC}" type="datetimeFigureOut">
               <a:rPr lang="en-VN" smtClean="0"/>
-              <a:t>22/07/2021</a:t>
+              <a:t>01/08/2021</a:t>
             </a:fld>
             <a:endParaRPr lang="en-VN"/>
           </a:p>
@@ -3293,7 +3703,7 @@
           <a:p>
             <a:fld id="{7C3644F0-B0FA-B24F-93B4-DEF87B7BA9CC}" type="datetimeFigureOut">
               <a:rPr lang="en-VN" smtClean="0"/>
-              <a:t>22/07/2021</a:t>
+              <a:t>01/08/2021</a:t>
             </a:fld>
             <a:endParaRPr lang="en-VN"/>
           </a:p>
@@ -3561,7 +3971,7 @@
           <a:p>
             <a:fld id="{7C3644F0-B0FA-B24F-93B4-DEF87B7BA9CC}" type="datetimeFigureOut">
               <a:rPr lang="en-VN" smtClean="0"/>
-              <a:t>22/07/2021</a:t>
+              <a:t>01/08/2021</a:t>
             </a:fld>
             <a:endParaRPr lang="en-VN"/>
           </a:p>
@@ -3976,7 +4386,7 @@
           <a:p>
             <a:fld id="{7C3644F0-B0FA-B24F-93B4-DEF87B7BA9CC}" type="datetimeFigureOut">
               <a:rPr lang="en-VN" smtClean="0"/>
-              <a:t>22/07/2021</a:t>
+              <a:t>01/08/2021</a:t>
             </a:fld>
             <a:endParaRPr lang="en-VN"/>
           </a:p>
@@ -4118,7 +4528,7 @@
           <a:p>
             <a:fld id="{7C3644F0-B0FA-B24F-93B4-DEF87B7BA9CC}" type="datetimeFigureOut">
               <a:rPr lang="en-VN" smtClean="0"/>
-              <a:t>22/07/2021</a:t>
+              <a:t>01/08/2021</a:t>
             </a:fld>
             <a:endParaRPr lang="en-VN"/>
           </a:p>
@@ -4231,7 +4641,7 @@
           <a:p>
             <a:fld id="{7C3644F0-B0FA-B24F-93B4-DEF87B7BA9CC}" type="datetimeFigureOut">
               <a:rPr lang="en-VN" smtClean="0"/>
-              <a:t>22/07/2021</a:t>
+              <a:t>01/08/2021</a:t>
             </a:fld>
             <a:endParaRPr lang="en-VN"/>
           </a:p>
@@ -4544,7 +4954,7 @@
           <a:p>
             <a:fld id="{7C3644F0-B0FA-B24F-93B4-DEF87B7BA9CC}" type="datetimeFigureOut">
               <a:rPr lang="en-VN" smtClean="0"/>
-              <a:t>22/07/2021</a:t>
+              <a:t>01/08/2021</a:t>
             </a:fld>
             <a:endParaRPr lang="en-VN"/>
           </a:p>
@@ -4833,7 +5243,7 @@
           <a:p>
             <a:fld id="{7C3644F0-B0FA-B24F-93B4-DEF87B7BA9CC}" type="datetimeFigureOut">
               <a:rPr lang="en-VN" smtClean="0"/>
-              <a:t>22/07/2021</a:t>
+              <a:t>01/08/2021</a:t>
             </a:fld>
             <a:endParaRPr lang="en-VN"/>
           </a:p>
@@ -5076,7 +5486,7 @@
           <a:p>
             <a:fld id="{7C3644F0-B0FA-B24F-93B4-DEF87B7BA9CC}" type="datetimeFigureOut">
               <a:rPr lang="en-VN" smtClean="0"/>
-              <a:t>22/07/2021</a:t>
+              <a:t>01/08/2021</a:t>
             </a:fld>
             <a:endParaRPr lang="en-VN"/>
           </a:p>
@@ -5685,8 +6095,8 @@
           <a:chExt cx="0" cy="0"/>
         </a:xfrm>
       </p:grpSpPr>
-      <mc:AlternateContent xmlns:mc="http://schemas.openxmlformats.org/markup-compatibility/2006">
-        <mc:Choice xmlns:p14="http://schemas.microsoft.com/office/powerpoint/2010/main" Requires="p14">
+      <mc:AlternateContent xmlns:mc="http://schemas.openxmlformats.org/markup-compatibility/2006" xmlns:p14="http://schemas.microsoft.com/office/powerpoint/2010/main">
+        <mc:Choice Requires="p14">
           <p:contentPart p14:bwMode="auto" r:id="rId2">
             <p14:nvContentPartPr>
               <p14:cNvPr id="2" name="Ink 1">
@@ -5705,7 +6115,7 @@
             </p14:xfrm>
           </p:contentPart>
         </mc:Choice>
-        <mc:Fallback>
+        <mc:Fallback xmlns="">
           <p:pic>
             <p:nvPicPr>
               <p:cNvPr id="2" name="Ink 1">
@@ -5766,6 +6176,57 @@
           <a:chExt cx="0" cy="0"/>
         </a:xfrm>
       </p:grpSpPr>
+      <mc:AlternateContent xmlns:mc="http://schemas.openxmlformats.org/markup-compatibility/2006">
+        <mc:Choice xmlns:p14="http://schemas.microsoft.com/office/powerpoint/2010/main" Requires="p14">
+          <p:contentPart p14:bwMode="auto" r:id="rId2">
+            <p14:nvContentPartPr>
+              <p14:cNvPr id="2" name="Ink 1">
+                <a:extLst>
+                  <a:ext uri="{FF2B5EF4-FFF2-40B4-BE49-F238E27FC236}">
+                    <a16:creationId xmlns:a16="http://schemas.microsoft.com/office/drawing/2014/main" id="{5E99AC7D-3326-4F4F-B7A8-E1B9C758B69E}"/>
+                  </a:ext>
+                </a:extLst>
+              </p14:cNvPr>
+              <p14:cNvContentPartPr/>
+              <p14:nvPr/>
+            </p14:nvContentPartPr>
+            <p14:xfrm>
+              <a:off x="593280" y="249840"/>
+              <a:ext cx="11149200" cy="5866560"/>
+            </p14:xfrm>
+          </p:contentPart>
+        </mc:Choice>
+        <mc:Fallback>
+          <p:pic>
+            <p:nvPicPr>
+              <p:cNvPr id="2" name="Ink 1">
+                <a:extLst>
+                  <a:ext uri="{FF2B5EF4-FFF2-40B4-BE49-F238E27FC236}">
+                    <a16:creationId xmlns:a16="http://schemas.microsoft.com/office/drawing/2014/main" id="{5E99AC7D-3326-4F4F-B7A8-E1B9C758B69E}"/>
+                  </a:ext>
+                </a:extLst>
+              </p:cNvPr>
+              <p:cNvPicPr/>
+              <p:nvPr/>
+            </p:nvPicPr>
+            <p:blipFill>
+              <a:blip r:embed="rId3"/>
+              <a:stretch>
+                <a:fillRect/>
+              </a:stretch>
+            </p:blipFill>
+            <p:spPr>
+              <a:xfrm>
+                <a:off x="571680" y="228240"/>
+                <a:ext cx="11192400" cy="5909760"/>
+              </a:xfrm>
+              <a:prstGeom prst="rect">
+                <a:avLst/>
+              </a:prstGeom>
+            </p:spPr>
+          </p:pic>
+        </mc:Fallback>
+      </mc:AlternateContent>
     </p:spTree>
     <p:extLst>
       <p:ext uri="{BB962C8B-B14F-4D97-AF65-F5344CB8AC3E}">
@@ -5796,6 +6257,57 @@
           <a:chExt cx="0" cy="0"/>
         </a:xfrm>
       </p:grpSpPr>
+      <mc:AlternateContent xmlns:mc="http://schemas.openxmlformats.org/markup-compatibility/2006">
+        <mc:Choice xmlns:p14="http://schemas.microsoft.com/office/powerpoint/2010/main" Requires="p14">
+          <p:contentPart p14:bwMode="auto" r:id="rId2">
+            <p14:nvContentPartPr>
+              <p14:cNvPr id="2" name="Ink 1">
+                <a:extLst>
+                  <a:ext uri="{FF2B5EF4-FFF2-40B4-BE49-F238E27FC236}">
+                    <a16:creationId xmlns:a16="http://schemas.microsoft.com/office/drawing/2014/main" id="{411C0A04-6949-2941-B24F-B89EA9F52FF5}"/>
+                  </a:ext>
+                </a:extLst>
+              </p14:cNvPr>
+              <p14:cNvContentPartPr/>
+              <p14:nvPr/>
+            </p14:nvContentPartPr>
+            <p14:xfrm>
+              <a:off x="11880" y="272520"/>
+              <a:ext cx="11763720" cy="4854240"/>
+            </p14:xfrm>
+          </p:contentPart>
+        </mc:Choice>
+        <mc:Fallback>
+          <p:pic>
+            <p:nvPicPr>
+              <p:cNvPr id="2" name="Ink 1">
+                <a:extLst>
+                  <a:ext uri="{FF2B5EF4-FFF2-40B4-BE49-F238E27FC236}">
+                    <a16:creationId xmlns:a16="http://schemas.microsoft.com/office/drawing/2014/main" id="{411C0A04-6949-2941-B24F-B89EA9F52FF5}"/>
+                  </a:ext>
+                </a:extLst>
+              </p:cNvPr>
+              <p:cNvPicPr/>
+              <p:nvPr/>
+            </p:nvPicPr>
+            <p:blipFill>
+              <a:blip r:embed="rId3"/>
+              <a:stretch>
+                <a:fillRect/>
+              </a:stretch>
+            </p:blipFill>
+            <p:spPr>
+              <a:xfrm>
+                <a:off x="-9720" y="250920"/>
+                <a:ext cx="11806920" cy="4897440"/>
+              </a:xfrm>
+              <a:prstGeom prst="rect">
+                <a:avLst/>
+              </a:prstGeom>
+            </p:spPr>
+          </p:pic>
+        </mc:Fallback>
+      </mc:AlternateContent>
     </p:spTree>
     <p:extLst>
       <p:ext uri="{BB962C8B-B14F-4D97-AF65-F5344CB8AC3E}">

</xml_diff>